<commit_message>
chore(群の気持ち) update group action and examples
</commit_message>
<xml_diff>
--- a/群の気持ち.pptx
+++ b/群の気持ち.pptx
@@ -5,7 +5,7 @@
     <p:sldMasterId id="2147483648" r:id="rId1"/>
   </p:sldMasterIdLst>
   <p:notesMasterIdLst>
-    <p:notesMasterId r:id="rId16"/>
+    <p:notesMasterId r:id="rId21"/>
   </p:notesMasterIdLst>
   <p:sldIdLst>
     <p:sldId id="256" r:id="rId2"/>
@@ -21,7 +21,12 @@
     <p:sldId id="262" r:id="rId12"/>
     <p:sldId id="263" r:id="rId13"/>
     <p:sldId id="293" r:id="rId14"/>
-    <p:sldId id="297" r:id="rId15"/>
+    <p:sldId id="300" r:id="rId15"/>
+    <p:sldId id="301" r:id="rId16"/>
+    <p:sldId id="297" r:id="rId17"/>
+    <p:sldId id="302" r:id="rId18"/>
+    <p:sldId id="303" r:id="rId19"/>
+    <p:sldId id="304" r:id="rId20"/>
   </p:sldIdLst>
   <p:sldSz cx="12192000" cy="6858000"/>
   <p:notesSz cx="6858000" cy="9144000"/>
@@ -718,6 +723,199 @@
     <p:extLst>
       <p:ext uri="{BB962C8B-B14F-4D97-AF65-F5344CB8AC3E}">
         <p14:creationId xmlns:p14="http://schemas.microsoft.com/office/powerpoint/2010/main" val="782246260"/>
+      </p:ext>
+    </p:extLst>
+  </p:cSld>
+  <p:clrMapOvr>
+    <a:masterClrMapping/>
+  </p:clrMapOvr>
+</p:notes>
+</file>
+
+<file path=ppt/notesSlides/notesSlide3.xml><?xml version="1.0" encoding="utf-8"?>
+<p:notes xmlns:a="http://schemas.openxmlformats.org/drawingml/2006/main" xmlns:r="http://schemas.openxmlformats.org/officeDocument/2006/relationships" xmlns:p="http://schemas.openxmlformats.org/presentationml/2006/main">
+  <p:cSld>
+    <p:spTree>
+      <p:nvGrpSpPr>
+        <p:cNvPr id="1" name=""/>
+        <p:cNvGrpSpPr/>
+        <p:nvPr/>
+      </p:nvGrpSpPr>
+      <p:grpSpPr>
+        <a:xfrm>
+          <a:off x="0" y="0"/>
+          <a:ext cx="0" cy="0"/>
+          <a:chOff x="0" y="0"/>
+          <a:chExt cx="0" cy="0"/>
+        </a:xfrm>
+      </p:grpSpPr>
+      <p:sp>
+        <p:nvSpPr>
+          <p:cNvPr id="2" name="スライド イメージ プレースホルダー 1"/>
+          <p:cNvSpPr>
+            <a:spLocks noGrp="1" noRot="1" noChangeAspect="1"/>
+          </p:cNvSpPr>
+          <p:nvPr>
+            <p:ph type="sldImg"/>
+          </p:nvPr>
+        </p:nvSpPr>
+        <p:spPr/>
+      </p:sp>
+      <p:sp>
+        <p:nvSpPr>
+          <p:cNvPr id="3" name="ノート プレースホルダー 2"/>
+          <p:cNvSpPr>
+            <a:spLocks noGrp="1"/>
+          </p:cNvSpPr>
+          <p:nvPr>
+            <p:ph type="body" idx="1"/>
+          </p:nvPr>
+        </p:nvSpPr>
+        <p:spPr/>
+        <p:txBody>
+          <a:bodyPr/>
+          <a:lstStyle/>
+          <a:p>
+            <a:endParaRPr kumimoji="1" lang="ja-JP" altLang="en-US"/>
+          </a:p>
+        </p:txBody>
+      </p:sp>
+      <p:sp>
+        <p:nvSpPr>
+          <p:cNvPr id="4" name="スライド番号プレースホルダー 3"/>
+          <p:cNvSpPr>
+            <a:spLocks noGrp="1"/>
+          </p:cNvSpPr>
+          <p:nvPr>
+            <p:ph type="sldNum" sz="quarter" idx="5"/>
+          </p:nvPr>
+        </p:nvSpPr>
+        <p:spPr/>
+        <p:txBody>
+          <a:bodyPr/>
+          <a:lstStyle/>
+          <a:p>
+            <a:fld id="{4F6631D1-B60D-8B42-827D-93EFDA4DE72F}" type="slidenum">
+              <a:rPr kumimoji="1" lang="ja-JP" altLang="en-US" smtClean="0"/>
+              <a:t>17</a:t>
+            </a:fld>
+            <a:endParaRPr kumimoji="1" lang="ja-JP" altLang="en-US"/>
+          </a:p>
+        </p:txBody>
+      </p:sp>
+    </p:spTree>
+    <p:extLst>
+      <p:ext uri="{BB962C8B-B14F-4D97-AF65-F5344CB8AC3E}">
+        <p14:creationId xmlns:p14="http://schemas.microsoft.com/office/powerpoint/2010/main" val="823625560"/>
+      </p:ext>
+    </p:extLst>
+  </p:cSld>
+  <p:clrMapOvr>
+    <a:masterClrMapping/>
+  </p:clrMapOvr>
+</p:notes>
+</file>
+
+<file path=ppt/notesSlides/notesSlide4.xml><?xml version="1.0" encoding="utf-8"?>
+<p:notes xmlns:a="http://schemas.openxmlformats.org/drawingml/2006/main" xmlns:r="http://schemas.openxmlformats.org/officeDocument/2006/relationships" xmlns:p="http://schemas.openxmlformats.org/presentationml/2006/main" showMasterSp="0" showMasterPhAnim="0">
+  <p:cSld>
+    <p:spTree>
+      <p:nvGrpSpPr>
+        <p:cNvPr id="1" name="Shape 396"/>
+        <p:cNvGrpSpPr/>
+        <p:nvPr/>
+      </p:nvGrpSpPr>
+      <p:grpSpPr>
+        <a:xfrm>
+          <a:off x="0" y="0"/>
+          <a:ext cx="0" cy="0"/>
+          <a:chOff x="0" y="0"/>
+          <a:chExt cx="0" cy="0"/>
+        </a:xfrm>
+      </p:grpSpPr>
+      <p:sp>
+        <p:nvSpPr>
+          <p:cNvPr id="397" name="Google Shape;397;g5f765d7e0f_0_84:notes"/>
+          <p:cNvSpPr>
+            <a:spLocks noGrp="1" noRot="1" noChangeAspect="1"/>
+          </p:cNvSpPr>
+          <p:nvPr>
+            <p:ph type="sldImg" idx="2"/>
+          </p:nvPr>
+        </p:nvSpPr>
+        <p:spPr>
+          <a:xfrm>
+            <a:off x="381000" y="685800"/>
+            <a:ext cx="6096000" cy="3429000"/>
+          </a:xfrm>
+          <a:custGeom>
+            <a:avLst/>
+            <a:gdLst/>
+            <a:ahLst/>
+            <a:cxnLst/>
+            <a:rect l="l" t="t" r="r" b="b"/>
+            <a:pathLst>
+              <a:path w="120000" h="120000" extrusionOk="0">
+                <a:moveTo>
+                  <a:pt x="0" y="0"/>
+                </a:moveTo>
+                <a:lnTo>
+                  <a:pt x="120000" y="0"/>
+                </a:lnTo>
+                <a:lnTo>
+                  <a:pt x="120000" y="120000"/>
+                </a:lnTo>
+                <a:lnTo>
+                  <a:pt x="0" y="120000"/>
+                </a:lnTo>
+                <a:close/>
+              </a:path>
+            </a:pathLst>
+          </a:custGeom>
+        </p:spPr>
+      </p:sp>
+      <p:sp>
+        <p:nvSpPr>
+          <p:cNvPr id="398" name="Google Shape;398;g5f765d7e0f_0_84:notes"/>
+          <p:cNvSpPr txBox="1">
+            <a:spLocks noGrp="1"/>
+          </p:cNvSpPr>
+          <p:nvPr>
+            <p:ph type="body" idx="1"/>
+          </p:nvPr>
+        </p:nvSpPr>
+        <p:spPr>
+          <a:xfrm>
+            <a:off x="685800" y="4343400"/>
+            <a:ext cx="5486400" cy="4114800"/>
+          </a:xfrm>
+          <a:prstGeom prst="rect">
+            <a:avLst/>
+          </a:prstGeom>
+        </p:spPr>
+        <p:txBody>
+          <a:bodyPr spcFirstLastPara="1" wrap="square" lIns="91425" tIns="91425" rIns="91425" bIns="91425" anchor="t" anchorCtr="0">
+            <a:noAutofit/>
+          </a:bodyPr>
+          <a:lstStyle/>
+          <a:p>
+            <a:pPr marL="0" lvl="0" indent="0" algn="l" rtl="0">
+              <a:spcBef>
+                <a:spcPts val="0"/>
+              </a:spcBef>
+              <a:spcAft>
+                <a:spcPts val="0"/>
+              </a:spcAft>
+              <a:buNone/>
+            </a:pPr>
+            <a:endParaRPr/>
+          </a:p>
+        </p:txBody>
+      </p:sp>
+    </p:spTree>
+    <p:extLst>
+      <p:ext uri="{BB962C8B-B14F-4D97-AF65-F5344CB8AC3E}">
+        <p14:creationId xmlns:p14="http://schemas.microsoft.com/office/powerpoint/2010/main" val="3877744605"/>
       </p:ext>
     </p:extLst>
   </p:cSld>
@@ -4388,7 +4586,7 @@
               <a:p>
                 <a:r>
                   <a:rPr kumimoji="1" lang="ja-JP" altLang="en-US"/>
-                  <a:t>群の例１：</a:t>
+                  <a:t>群の例：</a:t>
                 </a:r>
                 <a:r>
                   <a:rPr lang="fr-CA" altLang="ja" dirty="0"/>
@@ -4453,8 +4651,28 @@
               </a:p>
               <a:p>
                 <a:r>
+                  <a:rPr lang="ja-JP" altLang="en-US"/>
+                  <a:t>部分群</a:t>
+                </a:r>
+                <a:endParaRPr lang="en-US" altLang="ja-JP" dirty="0"/>
+              </a:p>
+              <a:p>
+                <a:pPr lvl="1"/>
+                <a:r>
                   <a:rPr kumimoji="1" lang="ja-JP" altLang="en-US"/>
-                  <a:t>群の例２：</a:t>
+                  <a:t>定義</a:t>
+                </a:r>
+                <a:r>
+                  <a:rPr lang="ja-JP" altLang="en-US"/>
+                  <a:t>・性質</a:t>
+                </a:r>
+                <a:endParaRPr lang="en-US" altLang="ja-JP" dirty="0"/>
+              </a:p>
+              <a:p>
+                <a:pPr lvl="1"/>
+                <a:r>
+                  <a:rPr kumimoji="1" lang="ja-JP" altLang="en-US"/>
+                  <a:t>例：</a:t>
                 </a:r>
                 <a:r>
                   <a:rPr lang="en-US" altLang="ja-JP" dirty="0"/>
@@ -4500,7 +4718,30 @@
                     </m:r>
                   </m:oMath>
                 </a14:m>
-                <a:endParaRPr kumimoji="1" lang="ja-JP" altLang="en-US"/>
+                <a:endParaRPr kumimoji="1" lang="en-US" altLang="ja-JP" dirty="0"/>
+              </a:p>
+              <a:p>
+                <a:r>
+                  <a:rPr lang="ja-JP" altLang="en-US"/>
+                  <a:t>群の作用</a:t>
+                </a:r>
+                <a:endParaRPr lang="en-US" altLang="ja-JP" dirty="0"/>
+              </a:p>
+              <a:p>
+                <a:pPr lvl="1"/>
+                <a:r>
+                  <a:rPr lang="ja-JP" altLang="en-US"/>
+                  <a:t>定義</a:t>
+                </a:r>
+                <a:endParaRPr lang="en-US" altLang="ja-JP" dirty="0"/>
+              </a:p>
+              <a:p>
+                <a:pPr lvl="1"/>
+                <a:r>
+                  <a:rPr lang="ja-JP" altLang="en-US"/>
+                  <a:t>例：</a:t>
+                </a:r>
+                <a:endParaRPr lang="en-US" altLang="ja-JP" dirty="0"/>
               </a:p>
             </p:txBody>
           </p:sp>
@@ -5897,6 +6138,164 @@
                   <a:rPr lang="ja-JP" altLang="en-US" sz="2400"/>
                   <a:t>群をなす．</a:t>
                 </a:r>
+                <a:endParaRPr lang="en-US" altLang="ja-JP" sz="2400" dirty="0"/>
+              </a:p>
+              <a:p>
+                <a:pPr marL="0" indent="0">
+                  <a:buNone/>
+                </a:pPr>
+                <a:endParaRPr lang="en-US" altLang="ja-JP" sz="2400" dirty="0"/>
+              </a:p>
+              <a:p>
+                <a:pPr marL="0" indent="0">
+                  <a:buNone/>
+                </a:pPr>
+                <a:r>
+                  <a:rPr lang="en-US" altLang="ja-JP" sz="2400" dirty="0"/>
+                  <a:t>【</a:t>
+                </a:r>
+                <a:r>
+                  <a:rPr lang="ja-JP" altLang="en-US" sz="2400"/>
+                  <a:t>群である確認</a:t>
+                </a:r>
+                <a:r>
+                  <a:rPr lang="en-US" altLang="ja-JP" sz="2400" dirty="0"/>
+                  <a:t>】</a:t>
+                </a:r>
+              </a:p>
+              <a:p>
+                <a:r>
+                  <a:rPr lang="en-US" altLang="ja-JP" sz="2400" dirty="0"/>
+                  <a:t>n</a:t>
+                </a:r>
+                <a:r>
+                  <a:rPr lang="ja-JP" altLang="en-US" sz="2400"/>
+                  <a:t>次複素正則行列の積は</a:t>
+                </a:r>
+                <a:r>
+                  <a:rPr lang="en-US" altLang="ja-JP" sz="2400" dirty="0"/>
+                  <a:t>n</a:t>
+                </a:r>
+                <a:r>
+                  <a:rPr lang="ja-JP" altLang="en-US" sz="2400"/>
+                  <a:t>次複素正則行列</a:t>
+                </a:r>
+                <a:endParaRPr lang="en-US" altLang="ja-JP" sz="2400" dirty="0"/>
+              </a:p>
+              <a:p>
+                <a:r>
+                  <a:rPr lang="ja-JP" altLang="en-US" sz="2400"/>
+                  <a:t>結合則は行列の性質より成立</a:t>
+                </a:r>
+                <a:endParaRPr lang="en-US" altLang="ja-JP" sz="2400" dirty="0"/>
+              </a:p>
+              <a:p>
+                <a:r>
+                  <a:rPr lang="ja-JP" altLang="en-US" sz="2400"/>
+                  <a:t>単位元は単位行列</a:t>
+                </a:r>
+                <a:endParaRPr lang="en-US" altLang="ja-JP" sz="2400" dirty="0"/>
+              </a:p>
+              <a:p>
+                <a:r>
+                  <a:rPr lang="ja-JP" altLang="en-US" sz="2400"/>
+                  <a:t>逆元は逆行列</a:t>
+                </a:r>
+                <a:endParaRPr lang="en-US" altLang="ja-JP" sz="2400" dirty="0"/>
+              </a:p>
+              <a:p>
+                <a:pPr marL="0" indent="0">
+                  <a:buNone/>
+                </a:pPr>
+                <a:r>
+                  <a:rPr lang="ja-JP" altLang="en-US" sz="2400"/>
+                  <a:t>以上より，</a:t>
+                </a:r>
+                <a:r>
+                  <a:rPr lang="en-US" altLang="ja" sz="2400" dirty="0"/>
+                  <a:t> </a:t>
+                </a:r>
+                <a14:m>
+                  <m:oMath xmlns:m="http://schemas.openxmlformats.org/officeDocument/2006/math">
+                    <m:r>
+                      <a:rPr lang="en-US" altLang="ja" sz="2400">
+                        <a:latin typeface="Cambria Math" panose="02040503050406030204" pitchFamily="18" charset="0"/>
+                      </a:rPr>
+                      <m:t>(</m:t>
+                    </m:r>
+                    <m:r>
+                      <m:rPr>
+                        <m:sty m:val="p"/>
+                      </m:rPr>
+                      <a:rPr lang="fr-CA" altLang="ja" sz="2400">
+                        <a:latin typeface="Cambria Math" panose="02040503050406030204" pitchFamily="18" charset="0"/>
+                      </a:rPr>
+                      <m:t>G</m:t>
+                    </m:r>
+                    <m:r>
+                      <m:rPr>
+                        <m:sty m:val="p"/>
+                      </m:rPr>
+                      <a:rPr lang="en-US" altLang="ja" sz="2400">
+                        <a:latin typeface="Cambria Math" panose="02040503050406030204" pitchFamily="18" charset="0"/>
+                      </a:rPr>
+                      <m:t>L</m:t>
+                    </m:r>
+                    <m:d>
+                      <m:dPr>
+                        <m:ctrlPr>
+                          <a:rPr lang="en-US" altLang="ja" sz="2400" i="1">
+                            <a:latin typeface="Cambria Math" panose="02040503050406030204" pitchFamily="18" charset="0"/>
+                          </a:rPr>
+                        </m:ctrlPr>
+                      </m:dPr>
+                      <m:e>
+                        <m:r>
+                          <m:rPr>
+                            <m:sty m:val="p"/>
+                          </m:rPr>
+                          <a:rPr lang="en-US" altLang="ja" sz="2400">
+                            <a:latin typeface="Cambria Math" panose="02040503050406030204" pitchFamily="18" charset="0"/>
+                          </a:rPr>
+                          <m:t>n</m:t>
+                        </m:r>
+                        <m:r>
+                          <a:rPr lang="en-US" altLang="ja" sz="2400">
+                            <a:latin typeface="Cambria Math" panose="02040503050406030204" pitchFamily="18" charset="0"/>
+                          </a:rPr>
+                          <m:t>;</m:t>
+                        </m:r>
+                        <m:r>
+                          <a:rPr lang="en-US" altLang="ja" sz="2400">
+                            <a:latin typeface="Cambria Math" panose="02040503050406030204" pitchFamily="18" charset="0"/>
+                            <a:ea typeface="Cambria Math" panose="02040503050406030204" pitchFamily="18" charset="0"/>
+                          </a:rPr>
+                          <m:t>ℂ</m:t>
+                        </m:r>
+                      </m:e>
+                    </m:d>
+                    <m:r>
+                      <a:rPr lang="en-US" altLang="ja" sz="2400" i="1">
+                        <a:latin typeface="Cambria Math" panose="02040503050406030204" pitchFamily="18" charset="0"/>
+                        <a:ea typeface="Cambria Math" panose="02040503050406030204" pitchFamily="18" charset="0"/>
+                      </a:rPr>
+                      <m:t>,  ∙  )</m:t>
+                    </m:r>
+                  </m:oMath>
+                </a14:m>
+                <a:r>
+                  <a:rPr lang="ja-JP" altLang="en-US" sz="2400"/>
+                  <a:t>は群をなす．</a:t>
+                </a:r>
+                <a:endParaRPr lang="en-US" altLang="ja-JP" sz="2400" dirty="0"/>
+              </a:p>
+              <a:p>
+                <a:endParaRPr lang="en-US" altLang="ja-JP" sz="2400" dirty="0"/>
+              </a:p>
+              <a:p>
+                <a:endParaRPr lang="en-US" altLang="ja-JP" sz="2400" dirty="0"/>
+              </a:p>
+              <a:p>
                 <a:endParaRPr lang="ja-JP" altLang="en-US" sz="2400" dirty="0"/>
               </a:p>
             </p:txBody>
@@ -5924,7 +6323,7 @@
               <a:blipFill>
                 <a:blip r:embed="rId3"/>
                 <a:stretch>
-                  <a:fillRect l="-844"/>
+                  <a:fillRect l="-844" b="-10526"/>
                 </a:stretch>
               </a:blipFill>
             </p:spPr>
@@ -5977,7 +6376,7 @@
                 </a:pPr>
                 <a:r>
                   <a:rPr lang="ja" dirty="0"/>
-                  <a:t>群の例１</a:t>
+                  <a:t>群の例</a:t>
                 </a:r>
                 <a:r>
                   <a:rPr lang="en-US" altLang="ja" sz="2800" dirty="0"/>
@@ -6102,6 +6501,1329 @@
 </file>
 
 <file path=ppt/slides/slide14.xml><?xml version="1.0" encoding="utf-8"?>
+<p:sld xmlns:a="http://schemas.openxmlformats.org/drawingml/2006/main" xmlns:r="http://schemas.openxmlformats.org/officeDocument/2006/relationships" xmlns:p="http://schemas.openxmlformats.org/presentationml/2006/main">
+  <p:cSld>
+    <p:spTree>
+      <p:nvGrpSpPr>
+        <p:cNvPr id="1" name=""/>
+        <p:cNvGrpSpPr/>
+        <p:nvPr/>
+      </p:nvGrpSpPr>
+      <p:grpSpPr>
+        <a:xfrm>
+          <a:off x="0" y="0"/>
+          <a:ext cx="0" cy="0"/>
+          <a:chOff x="0" y="0"/>
+          <a:chExt cx="0" cy="0"/>
+        </a:xfrm>
+      </p:grpSpPr>
+      <p:sp>
+        <p:nvSpPr>
+          <p:cNvPr id="2" name="タイトル 1">
+            <a:extLst>
+              <a:ext uri="{FF2B5EF4-FFF2-40B4-BE49-F238E27FC236}">
+                <a16:creationId xmlns:a16="http://schemas.microsoft.com/office/drawing/2014/main" id="{E320B755-DEB7-2A49-B195-7EA88F7704E5}"/>
+              </a:ext>
+            </a:extLst>
+          </p:cNvPr>
+          <p:cNvSpPr>
+            <a:spLocks noGrp="1"/>
+          </p:cNvSpPr>
+          <p:nvPr>
+            <p:ph type="title"/>
+          </p:nvPr>
+        </p:nvSpPr>
+        <p:spPr/>
+        <p:txBody>
+          <a:bodyPr/>
+          <a:lstStyle/>
+          <a:p>
+            <a:r>
+              <a:rPr kumimoji="1" lang="ja-JP" altLang="en-US"/>
+              <a:t>部分群</a:t>
+            </a:r>
+          </a:p>
+        </p:txBody>
+      </p:sp>
+      <mc:AlternateContent xmlns:mc="http://schemas.openxmlformats.org/markup-compatibility/2006">
+        <mc:Choice xmlns:a14="http://schemas.microsoft.com/office/drawing/2010/main" Requires="a14">
+          <p:sp>
+            <p:nvSpPr>
+              <p:cNvPr id="3" name="コンテンツ プレースホルダー 2">
+                <a:extLst>
+                  <a:ext uri="{FF2B5EF4-FFF2-40B4-BE49-F238E27FC236}">
+                    <a16:creationId xmlns:a16="http://schemas.microsoft.com/office/drawing/2014/main" id="{4CFFDBD8-61F8-A249-9F49-5222F027E088}"/>
+                  </a:ext>
+                </a:extLst>
+              </p:cNvPr>
+              <p:cNvSpPr>
+                <a:spLocks noGrp="1"/>
+              </p:cNvSpPr>
+              <p:nvPr>
+                <p:ph idx="1"/>
+              </p:nvPr>
+            </p:nvSpPr>
+            <p:spPr/>
+            <p:txBody>
+              <a:bodyPr/>
+              <a:lstStyle/>
+              <a:p>
+                <a:r>
+                  <a:rPr kumimoji="1" lang="ja-JP" altLang="en-US"/>
+                  <a:t>群の一部分を取り出して群となるもの．</a:t>
+                </a:r>
+                <a:endParaRPr kumimoji="1" lang="en-US" altLang="ja-JP" dirty="0"/>
+              </a:p>
+              <a:p>
+                <a:r>
+                  <a:rPr lang="ja-JP" altLang="en-US"/>
+                  <a:t>親となる群の構造を部分的に引き継ぐ．</a:t>
+                </a:r>
+                <a:endParaRPr lang="en-US" altLang="ja-JP" dirty="0"/>
+              </a:p>
+              <a:p>
+                <a:endParaRPr kumimoji="1" lang="en-US" altLang="ja-JP" dirty="0"/>
+              </a:p>
+              <a:p>
+                <a:pPr marL="0" indent="0">
+                  <a:buNone/>
+                </a:pPr>
+                <a:r>
+                  <a:rPr lang="en-US" altLang="ja-JP" i="1" dirty="0">
+                    <a:solidFill>
+                      <a:schemeClr val="tx1">
+                        <a:lumMod val="50000"/>
+                        <a:lumOff val="50000"/>
+                      </a:schemeClr>
+                    </a:solidFill>
+                    <a:latin typeface="Times New Roman" panose="02020603050405020304" pitchFamily="18" charset="0"/>
+                    <a:cs typeface="Times New Roman" panose="02020603050405020304" pitchFamily="18" charset="0"/>
+                  </a:rPr>
+                  <a:t>def</a:t>
+                </a:r>
+                <a:r>
+                  <a:rPr lang="en-US" altLang="ja-JP" dirty="0"/>
+                  <a:t> </a:t>
+                </a:r>
+              </a:p>
+              <a:p>
+                <a:pPr marL="0" indent="0">
+                  <a:buNone/>
+                </a:pPr>
+                <a14:m>
+                  <m:oMathPara xmlns:m="http://schemas.openxmlformats.org/officeDocument/2006/math">
+                    <m:oMathParaPr>
+                      <m:jc m:val="centerGroup"/>
+                    </m:oMathParaPr>
+                    <m:oMath xmlns:m="http://schemas.openxmlformats.org/officeDocument/2006/math">
+                      <m:r>
+                        <m:rPr>
+                          <m:sty m:val="p"/>
+                        </m:rPr>
+                        <a:rPr lang="en-US" altLang="ja-JP" b="0" i="0" smtClean="0">
+                          <a:latin typeface="Cambria Math" panose="02040503050406030204" pitchFamily="18" charset="0"/>
+                        </a:rPr>
+                        <m:t>G</m:t>
+                      </m:r>
+                      <m:r>
+                        <a:rPr lang="en-US" altLang="ja-JP" b="0" i="0" smtClean="0">
+                          <a:latin typeface="Cambria Math" panose="02040503050406030204" pitchFamily="18" charset="0"/>
+                        </a:rPr>
+                        <m:t>,</m:t>
+                      </m:r>
+                      <m:r>
+                        <m:rPr>
+                          <m:sty m:val="p"/>
+                        </m:rPr>
+                        <a:rPr lang="en-US" altLang="ja-JP" b="0" i="0" smtClean="0">
+                          <a:latin typeface="Cambria Math" panose="02040503050406030204" pitchFamily="18" charset="0"/>
+                        </a:rPr>
+                        <m:t>H</m:t>
+                      </m:r>
+                      <m:r>
+                        <a:rPr lang="en-US" altLang="ja-JP" b="0" i="0" smtClean="0">
+                          <a:latin typeface="Cambria Math" panose="02040503050406030204" pitchFamily="18" charset="0"/>
+                        </a:rPr>
+                        <m:t>:</m:t>
+                      </m:r>
+                      <m:r>
+                        <a:rPr lang="ja-JP" altLang="en-US" i="0">
+                          <a:latin typeface="Cambria Math" panose="02040503050406030204" pitchFamily="18" charset="0"/>
+                        </a:rPr>
+                        <m:t>集合</m:t>
+                      </m:r>
+                      <m:r>
+                        <a:rPr lang="ja-JP" altLang="en-US" i="0" smtClean="0">
+                          <a:latin typeface="Cambria Math" panose="02040503050406030204" pitchFamily="18" charset="0"/>
+                        </a:rPr>
+                        <m:t>，</m:t>
+                      </m:r>
+                      <m:r>
+                        <m:rPr>
+                          <m:sty m:val="p"/>
+                        </m:rPr>
+                        <a:rPr lang="en-US" altLang="ja-JP" b="0" i="0" smtClean="0">
+                          <a:latin typeface="Cambria Math" panose="02040503050406030204" pitchFamily="18" charset="0"/>
+                        </a:rPr>
+                        <m:t>H</m:t>
+                      </m:r>
+                      <m:r>
+                        <a:rPr lang="en-US" altLang="ja-JP" b="0" i="0" smtClean="0">
+                          <a:latin typeface="Cambria Math" panose="02040503050406030204" pitchFamily="18" charset="0"/>
+                          <a:ea typeface="Cambria Math" panose="02040503050406030204" pitchFamily="18" charset="0"/>
+                        </a:rPr>
+                        <m:t>⊂</m:t>
+                      </m:r>
+                      <m:r>
+                        <m:rPr>
+                          <m:sty m:val="p"/>
+                        </m:rPr>
+                        <a:rPr lang="en-US" altLang="ja-JP" b="0" i="0" smtClean="0">
+                          <a:latin typeface="Cambria Math" panose="02040503050406030204" pitchFamily="18" charset="0"/>
+                        </a:rPr>
+                        <m:t>G</m:t>
+                      </m:r>
+                    </m:oMath>
+                  </m:oMathPara>
+                </a14:m>
+                <a:endParaRPr lang="en-US" altLang="ja-JP" i="1" dirty="0">
+                  <a:latin typeface="Cambria Math" panose="02040503050406030204" pitchFamily="18" charset="0"/>
+                </a:endParaRPr>
+              </a:p>
+              <a:p>
+                <a:pPr marL="0" indent="0">
+                  <a:buNone/>
+                </a:pPr>
+                <a14:m>
+                  <m:oMathPara xmlns:m="http://schemas.openxmlformats.org/officeDocument/2006/math">
+                    <m:oMathParaPr>
+                      <m:jc m:val="centerGroup"/>
+                    </m:oMathParaPr>
+                    <m:oMath xmlns:m="http://schemas.openxmlformats.org/officeDocument/2006/math">
+                      <m:r>
+                        <a:rPr lang="en-US" altLang="ja-JP" b="0" i="1" smtClean="0">
+                          <a:latin typeface="Cambria Math" panose="02040503050406030204" pitchFamily="18" charset="0"/>
+                        </a:rPr>
+                        <m:t>(</m:t>
+                      </m:r>
+                      <m:r>
+                        <a:rPr lang="en-US" altLang="ja-JP">
+                          <a:latin typeface="Cambria Math" panose="02040503050406030204" pitchFamily="18" charset="0"/>
+                          <a:ea typeface="Cambria Math" panose="02040503050406030204" pitchFamily="18" charset="0"/>
+                        </a:rPr>
+                        <m:t>∀</m:t>
+                      </m:r>
+                      <m:r>
+                        <m:rPr>
+                          <m:sty m:val="p"/>
+                        </m:rPr>
+                        <a:rPr lang="en-US" altLang="ja-JP" b="0" i="0" smtClean="0">
+                          <a:latin typeface="Cambria Math" panose="02040503050406030204" pitchFamily="18" charset="0"/>
+                          <a:ea typeface="Cambria Math" panose="02040503050406030204" pitchFamily="18" charset="0"/>
+                        </a:rPr>
+                        <m:t>a</m:t>
+                      </m:r>
+                      <m:r>
+                        <a:rPr lang="en-US" altLang="ja-JP" b="0" i="0" smtClean="0">
+                          <a:latin typeface="Cambria Math" panose="02040503050406030204" pitchFamily="18" charset="0"/>
+                          <a:ea typeface="Cambria Math" panose="02040503050406030204" pitchFamily="18" charset="0"/>
+                        </a:rPr>
+                        <m:t>,</m:t>
+                      </m:r>
+                      <m:r>
+                        <m:rPr>
+                          <m:sty m:val="p"/>
+                        </m:rPr>
+                        <a:rPr lang="en-US" altLang="ja-JP" b="0" i="0" smtClean="0">
+                          <a:latin typeface="Cambria Math" panose="02040503050406030204" pitchFamily="18" charset="0"/>
+                          <a:ea typeface="Cambria Math" panose="02040503050406030204" pitchFamily="18" charset="0"/>
+                        </a:rPr>
+                        <m:t>b</m:t>
+                      </m:r>
+                      <m:r>
+                        <a:rPr lang="en-US" altLang="ja-JP" b="0" i="1" smtClean="0">
+                          <a:latin typeface="Cambria Math" panose="02040503050406030204" pitchFamily="18" charset="0"/>
+                          <a:ea typeface="Cambria Math" panose="02040503050406030204" pitchFamily="18" charset="0"/>
+                        </a:rPr>
+                        <m:t>∈</m:t>
+                      </m:r>
+                      <m:r>
+                        <m:rPr>
+                          <m:sty m:val="p"/>
+                        </m:rPr>
+                        <a:rPr lang="en-US" altLang="ja-JP" b="0" i="0" smtClean="0">
+                          <a:latin typeface="Cambria Math" panose="02040503050406030204" pitchFamily="18" charset="0"/>
+                          <a:ea typeface="Cambria Math" panose="02040503050406030204" pitchFamily="18" charset="0"/>
+                        </a:rPr>
+                        <m:t>H</m:t>
+                      </m:r>
+                      <m:r>
+                        <a:rPr lang="en-US" altLang="ja-JP" b="0" i="1" smtClean="0">
+                          <a:latin typeface="Cambria Math" panose="02040503050406030204" pitchFamily="18" charset="0"/>
+                          <a:ea typeface="Cambria Math" panose="02040503050406030204" pitchFamily="18" charset="0"/>
+                        </a:rPr>
+                        <m:t>⇒</m:t>
+                      </m:r>
+                      <m:r>
+                        <m:rPr>
+                          <m:sty m:val="p"/>
+                        </m:rPr>
+                        <a:rPr lang="en-US" altLang="ja-JP" b="0" i="0" smtClean="0">
+                          <a:latin typeface="Cambria Math" panose="02040503050406030204" pitchFamily="18" charset="0"/>
+                          <a:ea typeface="Cambria Math" panose="02040503050406030204" pitchFamily="18" charset="0"/>
+                        </a:rPr>
+                        <m:t>ab</m:t>
+                      </m:r>
+                      <m:r>
+                        <a:rPr lang="en-US" altLang="ja-JP" i="1">
+                          <a:latin typeface="Cambria Math" panose="02040503050406030204" pitchFamily="18" charset="0"/>
+                          <a:ea typeface="Cambria Math" panose="02040503050406030204" pitchFamily="18" charset="0"/>
+                        </a:rPr>
+                        <m:t>∈</m:t>
+                      </m:r>
+                      <m:r>
+                        <m:rPr>
+                          <m:sty m:val="p"/>
+                        </m:rPr>
+                        <a:rPr lang="en-US" altLang="ja-JP">
+                          <a:latin typeface="Cambria Math" panose="02040503050406030204" pitchFamily="18" charset="0"/>
+                          <a:ea typeface="Cambria Math" panose="02040503050406030204" pitchFamily="18" charset="0"/>
+                        </a:rPr>
+                        <m:t>H</m:t>
+                      </m:r>
+                      <m:r>
+                        <a:rPr lang="en-US" altLang="ja-JP" b="0" i="0" smtClean="0">
+                          <a:latin typeface="Cambria Math" panose="02040503050406030204" pitchFamily="18" charset="0"/>
+                          <a:ea typeface="Cambria Math" panose="02040503050406030204" pitchFamily="18" charset="0"/>
+                        </a:rPr>
+                        <m:t>)</m:t>
+                      </m:r>
+                      <m:r>
+                        <a:rPr lang="ja-JP" altLang="en-US" i="1">
+                          <a:latin typeface="Cambria Math" panose="02040503050406030204" pitchFamily="18" charset="0"/>
+                          <a:ea typeface="Cambria Math" panose="02040503050406030204" pitchFamily="18" charset="0"/>
+                        </a:rPr>
+                        <m:t>かつ</m:t>
+                      </m:r>
+                      <m:r>
+                        <a:rPr lang="en-US" altLang="ja-JP" b="0" i="1" smtClean="0">
+                          <a:latin typeface="Cambria Math" panose="02040503050406030204" pitchFamily="18" charset="0"/>
+                          <a:ea typeface="Cambria Math" panose="02040503050406030204" pitchFamily="18" charset="0"/>
+                        </a:rPr>
+                        <m:t>(</m:t>
+                      </m:r>
+                      <m:r>
+                        <a:rPr lang="en-US" altLang="ja-JP">
+                          <a:latin typeface="Cambria Math" panose="02040503050406030204" pitchFamily="18" charset="0"/>
+                          <a:ea typeface="Cambria Math" panose="02040503050406030204" pitchFamily="18" charset="0"/>
+                        </a:rPr>
+                        <m:t>∀</m:t>
+                      </m:r>
+                      <m:r>
+                        <m:rPr>
+                          <m:sty m:val="p"/>
+                        </m:rPr>
+                        <a:rPr lang="en-US" altLang="ja-JP">
+                          <a:latin typeface="Cambria Math" panose="02040503050406030204" pitchFamily="18" charset="0"/>
+                          <a:ea typeface="Cambria Math" panose="02040503050406030204" pitchFamily="18" charset="0"/>
+                        </a:rPr>
+                        <m:t>a</m:t>
+                      </m:r>
+                      <m:r>
+                        <a:rPr lang="en-US" altLang="ja-JP" i="1">
+                          <a:latin typeface="Cambria Math" panose="02040503050406030204" pitchFamily="18" charset="0"/>
+                          <a:ea typeface="Cambria Math" panose="02040503050406030204" pitchFamily="18" charset="0"/>
+                        </a:rPr>
+                        <m:t>∈</m:t>
+                      </m:r>
+                      <m:r>
+                        <m:rPr>
+                          <m:sty m:val="p"/>
+                        </m:rPr>
+                        <a:rPr lang="en-US" altLang="ja-JP">
+                          <a:latin typeface="Cambria Math" panose="02040503050406030204" pitchFamily="18" charset="0"/>
+                          <a:ea typeface="Cambria Math" panose="02040503050406030204" pitchFamily="18" charset="0"/>
+                        </a:rPr>
+                        <m:t>H</m:t>
+                      </m:r>
+                      <m:r>
+                        <a:rPr lang="en-US" altLang="ja-JP" b="0" i="0" smtClean="0">
+                          <a:latin typeface="Cambria Math" panose="02040503050406030204" pitchFamily="18" charset="0"/>
+                          <a:ea typeface="Cambria Math" panose="02040503050406030204" pitchFamily="18" charset="0"/>
+                        </a:rPr>
+                        <m:t> </m:t>
+                      </m:r>
+                      <m:r>
+                        <a:rPr lang="en-US" altLang="ja-JP" b="0" i="1" smtClean="0">
+                          <a:latin typeface="Cambria Math" panose="02040503050406030204" pitchFamily="18" charset="0"/>
+                          <a:ea typeface="Cambria Math" panose="02040503050406030204" pitchFamily="18" charset="0"/>
+                        </a:rPr>
+                        <m:t>,∃</m:t>
+                      </m:r>
+                      <m:sSup>
+                        <m:sSupPr>
+                          <m:ctrlPr>
+                            <a:rPr lang="en-US" altLang="ja-JP" b="0" i="1" smtClean="0">
+                              <a:latin typeface="Cambria Math" panose="02040503050406030204" pitchFamily="18" charset="0"/>
+                              <a:ea typeface="Cambria Math" panose="02040503050406030204" pitchFamily="18" charset="0"/>
+                            </a:rPr>
+                          </m:ctrlPr>
+                        </m:sSupPr>
+                        <m:e>
+                          <m:r>
+                            <a:rPr lang="en-US" altLang="ja-JP" b="0" i="1" smtClean="0">
+                              <a:latin typeface="Cambria Math" panose="02040503050406030204" pitchFamily="18" charset="0"/>
+                              <a:ea typeface="Cambria Math" panose="02040503050406030204" pitchFamily="18" charset="0"/>
+                            </a:rPr>
+                            <m:t>𝑎</m:t>
+                          </m:r>
+                        </m:e>
+                        <m:sup>
+                          <m:r>
+                            <a:rPr lang="en-US" altLang="ja-JP" b="0" i="1" smtClean="0">
+                              <a:latin typeface="Cambria Math" panose="02040503050406030204" pitchFamily="18" charset="0"/>
+                              <a:ea typeface="Cambria Math" panose="02040503050406030204" pitchFamily="18" charset="0"/>
+                            </a:rPr>
+                            <m:t>−1</m:t>
+                          </m:r>
+                        </m:sup>
+                      </m:sSup>
+                      <m:r>
+                        <a:rPr lang="en-US" altLang="ja-JP" i="1">
+                          <a:latin typeface="Cambria Math" panose="02040503050406030204" pitchFamily="18" charset="0"/>
+                          <a:ea typeface="Cambria Math" panose="02040503050406030204" pitchFamily="18" charset="0"/>
+                        </a:rPr>
+                        <m:t>∈</m:t>
+                      </m:r>
+                      <m:r>
+                        <m:rPr>
+                          <m:sty m:val="p"/>
+                        </m:rPr>
+                        <a:rPr lang="en-US" altLang="ja-JP">
+                          <a:latin typeface="Cambria Math" panose="02040503050406030204" pitchFamily="18" charset="0"/>
+                          <a:ea typeface="Cambria Math" panose="02040503050406030204" pitchFamily="18" charset="0"/>
+                        </a:rPr>
+                        <m:t>H</m:t>
+                      </m:r>
+                      <m:r>
+                        <a:rPr lang="en-US" altLang="ja-JP" b="0" i="1" smtClean="0">
+                          <a:latin typeface="Cambria Math" panose="02040503050406030204" pitchFamily="18" charset="0"/>
+                          <a:ea typeface="Cambria Math" panose="02040503050406030204" pitchFamily="18" charset="0"/>
+                        </a:rPr>
+                        <m:t> </m:t>
+                      </m:r>
+                      <m:r>
+                        <a:rPr lang="en-US" altLang="ja-JP" b="0" i="1" smtClean="0">
+                          <a:latin typeface="Cambria Math" panose="02040503050406030204" pitchFamily="18" charset="0"/>
+                          <a:ea typeface="Cambria Math" panose="02040503050406030204" pitchFamily="18" charset="0"/>
+                        </a:rPr>
+                        <m:t>𝑠</m:t>
+                      </m:r>
+                      <m:r>
+                        <a:rPr lang="en-US" altLang="ja-JP" b="0" i="1" smtClean="0">
+                          <a:latin typeface="Cambria Math" panose="02040503050406030204" pitchFamily="18" charset="0"/>
+                          <a:ea typeface="Cambria Math" panose="02040503050406030204" pitchFamily="18" charset="0"/>
+                        </a:rPr>
+                        <m:t>.</m:t>
+                      </m:r>
+                      <m:r>
+                        <a:rPr lang="en-US" altLang="ja-JP" b="0" i="1" smtClean="0">
+                          <a:latin typeface="Cambria Math" panose="02040503050406030204" pitchFamily="18" charset="0"/>
+                          <a:ea typeface="Cambria Math" panose="02040503050406030204" pitchFamily="18" charset="0"/>
+                        </a:rPr>
+                        <m:t>𝑡</m:t>
+                      </m:r>
+                      <m:r>
+                        <a:rPr lang="en-US" altLang="ja-JP" b="0" i="1" smtClean="0">
+                          <a:latin typeface="Cambria Math" panose="02040503050406030204" pitchFamily="18" charset="0"/>
+                          <a:ea typeface="Cambria Math" panose="02040503050406030204" pitchFamily="18" charset="0"/>
+                        </a:rPr>
+                        <m:t>.</m:t>
+                      </m:r>
+                      <m:sSup>
+                        <m:sSupPr>
+                          <m:ctrlPr>
+                            <a:rPr lang="en-US" altLang="ja-JP" i="1">
+                              <a:latin typeface="Cambria Math" panose="02040503050406030204" pitchFamily="18" charset="0"/>
+                              <a:ea typeface="Cambria Math" panose="02040503050406030204" pitchFamily="18" charset="0"/>
+                            </a:rPr>
+                          </m:ctrlPr>
+                        </m:sSupPr>
+                        <m:e>
+                          <m:r>
+                            <a:rPr lang="en-US" altLang="ja-JP" b="0" i="1" smtClean="0">
+                              <a:latin typeface="Cambria Math" panose="02040503050406030204" pitchFamily="18" charset="0"/>
+                              <a:ea typeface="Cambria Math" panose="02040503050406030204" pitchFamily="18" charset="0"/>
+                            </a:rPr>
+                            <m:t> </m:t>
+                          </m:r>
+                          <m:r>
+                            <a:rPr lang="en-US" altLang="ja-JP" i="1">
+                              <a:latin typeface="Cambria Math" panose="02040503050406030204" pitchFamily="18" charset="0"/>
+                              <a:ea typeface="Cambria Math" panose="02040503050406030204" pitchFamily="18" charset="0"/>
+                            </a:rPr>
+                            <m:t>𝑎</m:t>
+                          </m:r>
+                        </m:e>
+                        <m:sup>
+                          <m:r>
+                            <a:rPr lang="en-US" altLang="ja-JP" i="1">
+                              <a:latin typeface="Cambria Math" panose="02040503050406030204" pitchFamily="18" charset="0"/>
+                              <a:ea typeface="Cambria Math" panose="02040503050406030204" pitchFamily="18" charset="0"/>
+                            </a:rPr>
+                            <m:t>−1</m:t>
+                          </m:r>
+                        </m:sup>
+                      </m:sSup>
+                      <m:r>
+                        <a:rPr lang="en-US" altLang="ja-JP" b="0" i="1" smtClean="0">
+                          <a:latin typeface="Cambria Math" panose="02040503050406030204" pitchFamily="18" charset="0"/>
+                          <a:ea typeface="Cambria Math" panose="02040503050406030204" pitchFamily="18" charset="0"/>
+                        </a:rPr>
+                        <m:t>:</m:t>
+                      </m:r>
+                      <m:r>
+                        <a:rPr lang="ja-JP" altLang="en-US" i="1">
+                          <a:latin typeface="Cambria Math" panose="02040503050406030204" pitchFamily="18" charset="0"/>
+                          <a:ea typeface="Cambria Math" panose="02040503050406030204" pitchFamily="18" charset="0"/>
+                        </a:rPr>
+                        <m:t>逆元</m:t>
+                      </m:r>
+                      <m:r>
+                        <a:rPr lang="en-US" altLang="ja-JP" b="0" i="1" smtClean="0">
+                          <a:latin typeface="Cambria Math" panose="02040503050406030204" pitchFamily="18" charset="0"/>
+                          <a:ea typeface="Cambria Math" panose="02040503050406030204" pitchFamily="18" charset="0"/>
+                        </a:rPr>
+                        <m:t>)</m:t>
+                      </m:r>
+                    </m:oMath>
+                  </m:oMathPara>
+                </a14:m>
+                <a:endParaRPr lang="en-US" altLang="ja-JP" dirty="0"/>
+              </a:p>
+              <a:p>
+                <a:pPr marL="0" indent="0">
+                  <a:buNone/>
+                </a:pPr>
+                <a:endParaRPr lang="en-US" altLang="ja-JP" dirty="0"/>
+              </a:p>
+              <a:p>
+                <a:pPr marL="0" indent="0">
+                  <a:buNone/>
+                </a:pPr>
+                <a:r>
+                  <a:rPr lang="en-US" altLang="ja-JP" dirty="0"/>
+                  <a:t>H</a:t>
+                </a:r>
+                <a:r>
+                  <a:rPr lang="ja-JP" altLang="en-US"/>
+                  <a:t>が</a:t>
+                </a:r>
+                <a:r>
+                  <a:rPr lang="en-US" altLang="ja-JP" dirty="0"/>
+                  <a:t>G</a:t>
+                </a:r>
+                <a:r>
+                  <a:rPr lang="ja-JP" altLang="en-US"/>
+                  <a:t>の部分集合で，</a:t>
+                </a:r>
+                <a:r>
+                  <a:rPr lang="en-US" altLang="ja-JP" dirty="0"/>
+                  <a:t>H</a:t>
+                </a:r>
+                <a:r>
+                  <a:rPr lang="ja-JP" altLang="en-US"/>
+                  <a:t>が演算で閉じていて，かつ，任意の元に対して逆元が存在するならば，</a:t>
+                </a:r>
+                <a:r>
+                  <a:rPr lang="en-US" altLang="ja-JP" dirty="0"/>
+                  <a:t>H</a:t>
+                </a:r>
+                <a:r>
+                  <a:rPr lang="ja-JP" altLang="en-US"/>
+                  <a:t>は</a:t>
+                </a:r>
+                <a:r>
+                  <a:rPr lang="en-US" altLang="ja-JP" dirty="0"/>
+                  <a:t>G</a:t>
+                </a:r>
+                <a:r>
+                  <a:rPr lang="ja-JP" altLang="en-US"/>
+                  <a:t>の部分群という．</a:t>
+                </a:r>
+                <a:endParaRPr lang="en-US" altLang="ja-JP" dirty="0"/>
+              </a:p>
+            </p:txBody>
+          </p:sp>
+        </mc:Choice>
+        <mc:Fallback>
+          <p:sp>
+            <p:nvSpPr>
+              <p:cNvPr id="3" name="コンテンツ プレースホルダー 2">
+                <a:extLst>
+                  <a:ext uri="{FF2B5EF4-FFF2-40B4-BE49-F238E27FC236}">
+                    <a16:creationId xmlns:a16="http://schemas.microsoft.com/office/drawing/2014/main" id="{4CFFDBD8-61F8-A249-9F49-5222F027E088}"/>
+                  </a:ext>
+                </a:extLst>
+              </p:cNvPr>
+              <p:cNvSpPr>
+                <a:spLocks noGrp="1" noRot="1" noChangeAspect="1" noMove="1" noResize="1" noEditPoints="1" noAdjustHandles="1" noChangeArrowheads="1" noChangeShapeType="1" noTextEdit="1"/>
+              </p:cNvSpPr>
+              <p:nvPr>
+                <p:ph idx="1"/>
+              </p:nvPr>
+            </p:nvSpPr>
+            <p:spPr>
+              <a:blipFill>
+                <a:blip r:embed="rId2"/>
+                <a:stretch>
+                  <a:fillRect l="-1086" t="-2632" b="-292"/>
+                </a:stretch>
+              </a:blipFill>
+            </p:spPr>
+            <p:txBody>
+              <a:bodyPr/>
+              <a:lstStyle/>
+              <a:p>
+                <a:r>
+                  <a:rPr lang="ja-JP" altLang="en-US">
+                    <a:noFill/>
+                  </a:rPr>
+                  <a:t> </a:t>
+                </a:r>
+              </a:p>
+            </p:txBody>
+          </p:sp>
+        </mc:Fallback>
+      </mc:AlternateContent>
+    </p:spTree>
+    <p:extLst>
+      <p:ext uri="{BB962C8B-B14F-4D97-AF65-F5344CB8AC3E}">
+        <p14:creationId xmlns:p14="http://schemas.microsoft.com/office/powerpoint/2010/main" val="3687277012"/>
+      </p:ext>
+    </p:extLst>
+  </p:cSld>
+  <p:clrMapOvr>
+    <a:masterClrMapping/>
+  </p:clrMapOvr>
+</p:sld>
+</file>
+
+<file path=ppt/slides/slide15.xml><?xml version="1.0" encoding="utf-8"?>
+<p:sld xmlns:a="http://schemas.openxmlformats.org/drawingml/2006/main" xmlns:r="http://schemas.openxmlformats.org/officeDocument/2006/relationships" xmlns:p="http://schemas.openxmlformats.org/presentationml/2006/main">
+  <p:cSld>
+    <p:spTree>
+      <p:nvGrpSpPr>
+        <p:cNvPr id="1" name=""/>
+        <p:cNvGrpSpPr/>
+        <p:nvPr/>
+      </p:nvGrpSpPr>
+      <p:grpSpPr>
+        <a:xfrm>
+          <a:off x="0" y="0"/>
+          <a:ext cx="0" cy="0"/>
+          <a:chOff x="0" y="0"/>
+          <a:chExt cx="0" cy="0"/>
+        </a:xfrm>
+      </p:grpSpPr>
+      <p:sp>
+        <p:nvSpPr>
+          <p:cNvPr id="2" name="タイトル 1">
+            <a:extLst>
+              <a:ext uri="{FF2B5EF4-FFF2-40B4-BE49-F238E27FC236}">
+                <a16:creationId xmlns:a16="http://schemas.microsoft.com/office/drawing/2014/main" id="{8B433D15-7C44-7344-9853-7EA68A9C4971}"/>
+              </a:ext>
+            </a:extLst>
+          </p:cNvPr>
+          <p:cNvSpPr>
+            <a:spLocks noGrp="1"/>
+          </p:cNvSpPr>
+          <p:nvPr>
+            <p:ph type="title"/>
+          </p:nvPr>
+        </p:nvSpPr>
+        <p:spPr/>
+        <p:txBody>
+          <a:bodyPr/>
+          <a:lstStyle/>
+          <a:p>
+            <a:r>
+              <a:rPr kumimoji="1" lang="ja-JP" altLang="en-US"/>
+              <a:t>部分群の性質</a:t>
+            </a:r>
+          </a:p>
+        </p:txBody>
+      </p:sp>
+      <mc:AlternateContent xmlns:mc="http://schemas.openxmlformats.org/markup-compatibility/2006">
+        <mc:Choice xmlns:a14="http://schemas.microsoft.com/office/drawing/2010/main" Requires="a14">
+          <p:sp>
+            <p:nvSpPr>
+              <p:cNvPr id="3" name="コンテンツ プレースホルダー 2">
+                <a:extLst>
+                  <a:ext uri="{FF2B5EF4-FFF2-40B4-BE49-F238E27FC236}">
+                    <a16:creationId xmlns:a16="http://schemas.microsoft.com/office/drawing/2014/main" id="{505E0EA2-8D86-2749-9EAB-DE074A886DB0}"/>
+                  </a:ext>
+                </a:extLst>
+              </p:cNvPr>
+              <p:cNvSpPr>
+                <a:spLocks noGrp="1"/>
+              </p:cNvSpPr>
+              <p:nvPr>
+                <p:ph idx="1"/>
+              </p:nvPr>
+            </p:nvSpPr>
+            <p:spPr/>
+            <p:txBody>
+              <a:bodyPr/>
+              <a:lstStyle/>
+              <a:p>
+                <a:pPr marL="0" lvl="0" indent="0">
+                  <a:buNone/>
+                </a:pPr>
+                <a14:m>
+                  <m:oMathPara xmlns:m="http://schemas.openxmlformats.org/officeDocument/2006/math">
+                    <m:oMathParaPr>
+                      <m:jc m:val="centerGroup"/>
+                    </m:oMathParaPr>
+                    <m:oMath xmlns:m="http://schemas.openxmlformats.org/officeDocument/2006/math">
+                      <m:d>
+                        <m:dPr>
+                          <m:ctrlPr>
+                            <a:rPr lang="en-US" altLang="ja-JP" i="1" smtClean="0">
+                              <a:latin typeface="Cambria Math" panose="02040503050406030204" pitchFamily="18" charset="0"/>
+                            </a:rPr>
+                          </m:ctrlPr>
+                        </m:dPr>
+                        <m:e>
+                          <m:r>
+                            <a:rPr lang="en-US" altLang="ja-JP" i="1">
+                              <a:latin typeface="Cambria Math" panose="02040503050406030204" pitchFamily="18" charset="0"/>
+                            </a:rPr>
+                            <m:t>𝐺</m:t>
+                          </m:r>
+                          <m:r>
+                            <a:rPr lang="en-US" altLang="ja-JP" i="1">
+                              <a:latin typeface="Cambria Math" panose="02040503050406030204" pitchFamily="18" charset="0"/>
+                            </a:rPr>
+                            <m:t>, ・</m:t>
+                          </m:r>
+                        </m:e>
+                      </m:d>
+                      <m:r>
+                        <a:rPr lang="en-US" altLang="ja-JP" i="1">
+                          <a:latin typeface="Cambria Math" panose="02040503050406030204" pitchFamily="18" charset="0"/>
+                        </a:rPr>
+                        <m:t>:</m:t>
+                      </m:r>
+                      <m:r>
+                        <a:rPr lang="ja-JP" altLang="en-US" i="1" smtClean="0">
+                          <a:latin typeface="Cambria Math" panose="02040503050406030204" pitchFamily="18" charset="0"/>
+                        </a:rPr>
+                        <m:t>集合</m:t>
+                      </m:r>
+                      <m:r>
+                        <a:rPr lang="en-US" altLang="ja-JP" i="1">
+                          <a:latin typeface="Cambria Math" panose="02040503050406030204" pitchFamily="18" charset="0"/>
+                        </a:rPr>
+                        <m:t>, </m:t>
+                      </m:r>
+                      <m:r>
+                        <a:rPr lang="en-US" altLang="ja-JP" i="1">
+                          <a:latin typeface="Cambria Math" panose="02040503050406030204" pitchFamily="18" charset="0"/>
+                        </a:rPr>
+                        <m:t>𝐻</m:t>
+                      </m:r>
+                      <m:r>
+                        <a:rPr lang="en-US" altLang="ja-JP" i="1">
+                          <a:latin typeface="Cambria Math" panose="02040503050406030204" pitchFamily="18" charset="0"/>
+                          <a:ea typeface="Cambria Math" panose="02040503050406030204" pitchFamily="18" charset="0"/>
+                        </a:rPr>
+                        <m:t>⊂</m:t>
+                      </m:r>
+                      <m:r>
+                        <a:rPr lang="en-US" altLang="ja-JP" i="1">
+                          <a:latin typeface="Cambria Math" panose="02040503050406030204" pitchFamily="18" charset="0"/>
+                        </a:rPr>
+                        <m:t>𝐺</m:t>
+                      </m:r>
+                      <m:r>
+                        <a:rPr lang="en-US" altLang="ja-JP" i="1" smtClean="0">
+                          <a:latin typeface="Cambria Math" panose="02040503050406030204" pitchFamily="18" charset="0"/>
+                        </a:rPr>
+                        <m:t>:</m:t>
+                      </m:r>
+                      <m:r>
+                        <a:rPr lang="ja-JP" altLang="en-US" i="1">
+                          <a:latin typeface="Cambria Math" panose="02040503050406030204" pitchFamily="18" charset="0"/>
+                        </a:rPr>
+                        <m:t>部分集合</m:t>
+                      </m:r>
+                    </m:oMath>
+                  </m:oMathPara>
+                </a14:m>
+                <a:endParaRPr lang="en-US" altLang="ja-JP" i="1" dirty="0">
+                  <a:latin typeface="Cambria Math" panose="02040503050406030204" pitchFamily="18" charset="0"/>
+                </a:endParaRPr>
+              </a:p>
+              <a:p>
+                <a:pPr marL="514350" lvl="0" indent="-514350">
+                  <a:buFont typeface="+mj-lt"/>
+                  <a:buAutoNum type="romanLcPeriod"/>
+                </a:pPr>
+                <a14:m>
+                  <m:oMath xmlns:m="http://schemas.openxmlformats.org/officeDocument/2006/math">
+                    <m:sSub>
+                      <m:sSubPr>
+                        <m:ctrlPr>
+                          <a:rPr lang="en-US" altLang="ja-JP" i="1">
+                            <a:latin typeface="Cambria Math" panose="02040503050406030204" pitchFamily="18" charset="0"/>
+                          </a:rPr>
+                        </m:ctrlPr>
+                      </m:sSubPr>
+                      <m:e>
+                        <m:r>
+                          <a:rPr lang="en-US" altLang="ja-JP" i="1">
+                            <a:latin typeface="Cambria Math" panose="02040503050406030204" pitchFamily="18" charset="0"/>
+                          </a:rPr>
+                          <m:t>h</m:t>
+                        </m:r>
+                      </m:e>
+                      <m:sub>
+                        <m:r>
+                          <a:rPr lang="en-US" altLang="ja-JP" i="1">
+                            <a:latin typeface="Cambria Math" panose="02040503050406030204" pitchFamily="18" charset="0"/>
+                          </a:rPr>
+                          <m:t>1</m:t>
+                        </m:r>
+                      </m:sub>
+                    </m:sSub>
+                    <m:sSub>
+                      <m:sSubPr>
+                        <m:ctrlPr>
+                          <a:rPr lang="en-US" altLang="ja-JP" i="1">
+                            <a:latin typeface="Cambria Math" panose="02040503050406030204" pitchFamily="18" charset="0"/>
+                          </a:rPr>
+                        </m:ctrlPr>
+                      </m:sSubPr>
+                      <m:e>
+                        <m:r>
+                          <a:rPr lang="en-US" altLang="ja-JP" i="1">
+                            <a:latin typeface="Cambria Math" panose="02040503050406030204" pitchFamily="18" charset="0"/>
+                          </a:rPr>
+                          <m:t>,</m:t>
+                        </m:r>
+                        <m:r>
+                          <a:rPr lang="en-US" altLang="ja-JP" i="1">
+                            <a:latin typeface="Cambria Math" panose="02040503050406030204" pitchFamily="18" charset="0"/>
+                          </a:rPr>
+                          <m:t>h</m:t>
+                        </m:r>
+                      </m:e>
+                      <m:sub>
+                        <m:r>
+                          <a:rPr lang="en-US" altLang="ja-JP" i="1">
+                            <a:latin typeface="Cambria Math" panose="02040503050406030204" pitchFamily="18" charset="0"/>
+                          </a:rPr>
+                          <m:t>2</m:t>
+                        </m:r>
+                      </m:sub>
+                    </m:sSub>
+                    <m:r>
+                      <a:rPr lang="en-US" altLang="ja-JP" i="1">
+                        <a:latin typeface="Cambria Math" panose="02040503050406030204" pitchFamily="18" charset="0"/>
+                        <a:ea typeface="Cambria Math" panose="02040503050406030204" pitchFamily="18" charset="0"/>
+                      </a:rPr>
+                      <m:t>∈</m:t>
+                    </m:r>
+                    <m:r>
+                      <a:rPr lang="en-US" altLang="ja-JP" i="1">
+                        <a:latin typeface="Cambria Math" panose="02040503050406030204" pitchFamily="18" charset="0"/>
+                        <a:ea typeface="Cambria Math" panose="02040503050406030204" pitchFamily="18" charset="0"/>
+                      </a:rPr>
+                      <m:t>𝐻</m:t>
+                    </m:r>
+                    <m:r>
+                      <a:rPr lang="en-US" altLang="ja" i="1">
+                        <a:latin typeface="Cambria Math" panose="02040503050406030204" pitchFamily="18" charset="0"/>
+                        <a:ea typeface="Cambria Math" panose="02040503050406030204" pitchFamily="18" charset="0"/>
+                      </a:rPr>
+                      <m:t>⟹</m:t>
+                    </m:r>
+                    <m:sSub>
+                      <m:sSubPr>
+                        <m:ctrlPr>
+                          <a:rPr lang="en-US" altLang="ja-JP" i="1">
+                            <a:latin typeface="Cambria Math" panose="02040503050406030204" pitchFamily="18" charset="0"/>
+                          </a:rPr>
+                        </m:ctrlPr>
+                      </m:sSubPr>
+                      <m:e>
+                        <m:r>
+                          <a:rPr lang="en-US" altLang="ja-JP" i="1">
+                            <a:latin typeface="Cambria Math" panose="02040503050406030204" pitchFamily="18" charset="0"/>
+                          </a:rPr>
+                          <m:t>h</m:t>
+                        </m:r>
+                      </m:e>
+                      <m:sub>
+                        <m:r>
+                          <a:rPr lang="en-US" altLang="ja-JP" i="1">
+                            <a:latin typeface="Cambria Math" panose="02040503050406030204" pitchFamily="18" charset="0"/>
+                          </a:rPr>
+                          <m:t>1</m:t>
+                        </m:r>
+                      </m:sub>
+                    </m:sSub>
+                    <m:sSub>
+                      <m:sSubPr>
+                        <m:ctrlPr>
+                          <a:rPr lang="en-US" altLang="ja-JP" i="1">
+                            <a:latin typeface="Cambria Math" panose="02040503050406030204" pitchFamily="18" charset="0"/>
+                          </a:rPr>
+                        </m:ctrlPr>
+                      </m:sSubPr>
+                      <m:e>
+                        <m:r>
+                          <a:rPr lang="ja-JP" altLang="en-US" i="1">
+                            <a:latin typeface="Cambria Math" panose="02040503050406030204" pitchFamily="18" charset="0"/>
+                          </a:rPr>
+                          <m:t>・</m:t>
+                        </m:r>
+                        <m:r>
+                          <a:rPr lang="en-US" altLang="ja-JP" i="1">
+                            <a:latin typeface="Cambria Math" panose="02040503050406030204" pitchFamily="18" charset="0"/>
+                          </a:rPr>
+                          <m:t>h</m:t>
+                        </m:r>
+                      </m:e>
+                      <m:sub>
+                        <m:r>
+                          <a:rPr lang="en-US" altLang="ja-JP" i="1">
+                            <a:latin typeface="Cambria Math" panose="02040503050406030204" pitchFamily="18" charset="0"/>
+                          </a:rPr>
+                          <m:t>2</m:t>
+                        </m:r>
+                      </m:sub>
+                    </m:sSub>
+                    <m:r>
+                      <a:rPr lang="en-US" altLang="ja-JP" i="1">
+                        <a:latin typeface="Cambria Math" panose="02040503050406030204" pitchFamily="18" charset="0"/>
+                        <a:ea typeface="Cambria Math" panose="02040503050406030204" pitchFamily="18" charset="0"/>
+                      </a:rPr>
+                      <m:t>∈</m:t>
+                    </m:r>
+                    <m:r>
+                      <a:rPr lang="en-US" altLang="ja-JP" i="1">
+                        <a:latin typeface="Cambria Math" panose="02040503050406030204" pitchFamily="18" charset="0"/>
+                        <a:ea typeface="Cambria Math" panose="02040503050406030204" pitchFamily="18" charset="0"/>
+                      </a:rPr>
+                      <m:t>𝐻</m:t>
+                    </m:r>
+                  </m:oMath>
+                </a14:m>
+                <a:br>
+                  <a:rPr lang="en-US" altLang="ja-JP" dirty="0">
+                    <a:solidFill>
+                      <a:schemeClr val="tx1">
+                        <a:lumMod val="50000"/>
+                        <a:lumOff val="50000"/>
+                      </a:schemeClr>
+                    </a:solidFill>
+                    <a:ea typeface="Cambria Math" panose="02040503050406030204" pitchFamily="18" charset="0"/>
+                  </a:rPr>
+                </a:br>
+                <a:r>
+                  <a:rPr lang="ja-JP" altLang="en-US">
+                    <a:solidFill>
+                      <a:schemeClr val="tx1">
+                        <a:lumMod val="50000"/>
+                        <a:lumOff val="50000"/>
+                      </a:schemeClr>
+                    </a:solidFill>
+                    <a:ea typeface="Cambria Math" panose="02040503050406030204" pitchFamily="18" charset="0"/>
+                  </a:rPr>
+                  <a:t>演算が閉じている</a:t>
+                </a:r>
+                <a:endParaRPr lang="en-US" altLang="ja-JP" dirty="0">
+                  <a:solidFill>
+                    <a:schemeClr val="tx1">
+                      <a:lumMod val="50000"/>
+                      <a:lumOff val="50000"/>
+                    </a:schemeClr>
+                  </a:solidFill>
+                  <a:ea typeface="Cambria Math" panose="02040503050406030204" pitchFamily="18" charset="0"/>
+                </a:endParaRPr>
+              </a:p>
+              <a:p>
+                <a:pPr marL="514350" lvl="0" indent="-514350">
+                  <a:buFont typeface="+mj-lt"/>
+                  <a:buAutoNum type="romanLcPeriod"/>
+                </a:pPr>
+                <a14:m>
+                  <m:oMath xmlns:m="http://schemas.openxmlformats.org/officeDocument/2006/math">
+                    <m:r>
+                      <a:rPr lang="en-US" altLang="ja-JP" i="1">
+                        <a:latin typeface="Cambria Math" panose="02040503050406030204" pitchFamily="18" charset="0"/>
+                      </a:rPr>
+                      <m:t>𝑒</m:t>
+                    </m:r>
+                    <m:r>
+                      <a:rPr lang="en-US" altLang="ja-JP" i="1">
+                        <a:latin typeface="Cambria Math" panose="02040503050406030204" pitchFamily="18" charset="0"/>
+                        <a:ea typeface="Cambria Math" panose="02040503050406030204" pitchFamily="18" charset="0"/>
+                      </a:rPr>
+                      <m:t>∈</m:t>
+                    </m:r>
+                    <m:r>
+                      <a:rPr lang="en-US" altLang="ja-JP" i="1">
+                        <a:latin typeface="Cambria Math" panose="02040503050406030204" pitchFamily="18" charset="0"/>
+                        <a:ea typeface="Cambria Math" panose="02040503050406030204" pitchFamily="18" charset="0"/>
+                      </a:rPr>
+                      <m:t>𝐺</m:t>
+                    </m:r>
+                    <m:r>
+                      <a:rPr lang="ja-JP" altLang="en-US" i="1" smtClean="0">
+                        <a:latin typeface="Cambria Math" panose="02040503050406030204" pitchFamily="18" charset="0"/>
+                        <a:ea typeface="Cambria Math" panose="02040503050406030204" pitchFamily="18" charset="0"/>
+                      </a:rPr>
+                      <m:t>：</m:t>
+                    </m:r>
+                    <m:r>
+                      <a:rPr lang="ja-JP" altLang="en-US" i="1">
+                        <a:latin typeface="Cambria Math" panose="02040503050406030204" pitchFamily="18" charset="0"/>
+                        <a:ea typeface="Cambria Math" panose="02040503050406030204" pitchFamily="18" charset="0"/>
+                      </a:rPr>
+                      <m:t>単位元</m:t>
+                    </m:r>
+                    <m:r>
+                      <a:rPr lang="en-US" altLang="ja-JP" i="1">
+                        <a:latin typeface="Cambria Math" panose="02040503050406030204" pitchFamily="18" charset="0"/>
+                      </a:rPr>
+                      <m:t>, </m:t>
+                    </m:r>
+                    <m:r>
+                      <a:rPr lang="en-US" altLang="ja-JP" i="1">
+                        <a:latin typeface="Cambria Math" panose="02040503050406030204" pitchFamily="18" charset="0"/>
+                      </a:rPr>
+                      <m:t>𝑒</m:t>
+                    </m:r>
+                    <m:r>
+                      <a:rPr lang="en-US" altLang="ja-JP" i="1">
+                        <a:latin typeface="Cambria Math" panose="02040503050406030204" pitchFamily="18" charset="0"/>
+                        <a:ea typeface="Cambria Math" panose="02040503050406030204" pitchFamily="18" charset="0"/>
+                      </a:rPr>
+                      <m:t>∈</m:t>
+                    </m:r>
+                    <m:r>
+                      <a:rPr lang="en-US" altLang="ja-JP" i="1">
+                        <a:latin typeface="Cambria Math" panose="02040503050406030204" pitchFamily="18" charset="0"/>
+                        <a:ea typeface="Cambria Math" panose="02040503050406030204" pitchFamily="18" charset="0"/>
+                      </a:rPr>
+                      <m:t>𝐻</m:t>
+                    </m:r>
+                  </m:oMath>
+                </a14:m>
+                <a:br>
+                  <a:rPr lang="en-US" altLang="ja-JP" dirty="0">
+                    <a:solidFill>
+                      <a:schemeClr val="tx1">
+                        <a:lumMod val="50000"/>
+                        <a:lumOff val="50000"/>
+                      </a:schemeClr>
+                    </a:solidFill>
+                  </a:rPr>
+                </a:br>
+                <a:r>
+                  <a:rPr lang="ja-JP" altLang="en-US">
+                    <a:solidFill>
+                      <a:schemeClr val="tx1">
+                        <a:lumMod val="50000"/>
+                        <a:lumOff val="50000"/>
+                      </a:schemeClr>
+                    </a:solidFill>
+                  </a:rPr>
+                  <a:t>単位元は</a:t>
+                </a:r>
+                <a:r>
+                  <a:rPr lang="en-US" altLang="ja-JP" dirty="0">
+                    <a:solidFill>
+                      <a:schemeClr val="tx1">
+                        <a:lumMod val="50000"/>
+                        <a:lumOff val="50000"/>
+                      </a:schemeClr>
+                    </a:solidFill>
+                  </a:rPr>
+                  <a:t>G,H</a:t>
+                </a:r>
+                <a:r>
+                  <a:rPr lang="ja-JP" altLang="en-US">
+                    <a:solidFill>
+                      <a:schemeClr val="tx1">
+                        <a:lumMod val="50000"/>
+                        <a:lumOff val="50000"/>
+                      </a:schemeClr>
+                    </a:solidFill>
+                  </a:rPr>
+                  <a:t>共通</a:t>
+                </a:r>
+                <a:endParaRPr lang="en-US" altLang="ja-JP" dirty="0">
+                  <a:solidFill>
+                    <a:schemeClr val="tx1">
+                      <a:lumMod val="50000"/>
+                      <a:lumOff val="50000"/>
+                    </a:schemeClr>
+                  </a:solidFill>
+                </a:endParaRPr>
+              </a:p>
+              <a:p>
+                <a:pPr marL="514350" lvl="0" indent="-514350">
+                  <a:buFont typeface="+mj-lt"/>
+                  <a:buAutoNum type="romanLcPeriod"/>
+                </a:pPr>
+                <a14:m>
+                  <m:oMath xmlns:m="http://schemas.openxmlformats.org/officeDocument/2006/math">
+                    <m:r>
+                      <a:rPr lang="en-US" altLang="ja-JP" i="1">
+                        <a:latin typeface="Cambria Math" panose="02040503050406030204" pitchFamily="18" charset="0"/>
+                        <a:ea typeface="Cambria Math" panose="02040503050406030204" pitchFamily="18" charset="0"/>
+                      </a:rPr>
+                      <m:t>h</m:t>
+                    </m:r>
+                    <m:r>
+                      <a:rPr lang="en-US" altLang="ja-JP" i="1">
+                        <a:latin typeface="Cambria Math" panose="02040503050406030204" pitchFamily="18" charset="0"/>
+                        <a:ea typeface="Cambria Math" panose="02040503050406030204" pitchFamily="18" charset="0"/>
+                      </a:rPr>
+                      <m:t>∈</m:t>
+                    </m:r>
+                    <m:r>
+                      <a:rPr lang="en-US" altLang="ja-JP" i="1">
+                        <a:latin typeface="Cambria Math" panose="02040503050406030204" pitchFamily="18" charset="0"/>
+                        <a:ea typeface="Cambria Math" panose="02040503050406030204" pitchFamily="18" charset="0"/>
+                      </a:rPr>
+                      <m:t>𝐻</m:t>
+                    </m:r>
+                    <m:r>
+                      <a:rPr lang="en-US" altLang="ja-JP" b="0" i="1" smtClean="0">
+                        <a:latin typeface="Cambria Math" panose="02040503050406030204" pitchFamily="18" charset="0"/>
+                        <a:ea typeface="Cambria Math" panose="02040503050406030204" pitchFamily="18" charset="0"/>
+                      </a:rPr>
+                      <m:t>,</m:t>
+                    </m:r>
+                    <m:sSup>
+                      <m:sSupPr>
+                        <m:ctrlPr>
+                          <a:rPr lang="en-US" altLang="ja" i="1">
+                            <a:latin typeface="Cambria Math" panose="02040503050406030204" pitchFamily="18" charset="0"/>
+                            <a:ea typeface="Cambria Math" panose="02040503050406030204" pitchFamily="18" charset="0"/>
+                          </a:rPr>
+                        </m:ctrlPr>
+                      </m:sSupPr>
+                      <m:e>
+                        <m:r>
+                          <a:rPr lang="en-US" altLang="ja" i="1">
+                            <a:latin typeface="Cambria Math" panose="02040503050406030204" pitchFamily="18" charset="0"/>
+                            <a:ea typeface="Cambria Math" panose="02040503050406030204" pitchFamily="18" charset="0"/>
+                          </a:rPr>
+                          <m:t>h</m:t>
+                        </m:r>
+                      </m:e>
+                      <m:sup>
+                        <m:r>
+                          <a:rPr lang="en-US" altLang="ja" i="1">
+                            <a:latin typeface="Cambria Math" panose="02040503050406030204" pitchFamily="18" charset="0"/>
+                            <a:ea typeface="Cambria Math" panose="02040503050406030204" pitchFamily="18" charset="0"/>
+                          </a:rPr>
+                          <m:t>−1</m:t>
+                        </m:r>
+                      </m:sup>
+                    </m:sSup>
+                    <m:r>
+                      <a:rPr lang="en-US" altLang="ja-JP" i="1">
+                        <a:latin typeface="Cambria Math" panose="02040503050406030204" pitchFamily="18" charset="0"/>
+                        <a:ea typeface="Cambria Math" panose="02040503050406030204" pitchFamily="18" charset="0"/>
+                      </a:rPr>
+                      <m:t>∈</m:t>
+                    </m:r>
+                    <m:r>
+                      <a:rPr lang="en-US" altLang="ja-JP" i="1">
+                        <a:latin typeface="Cambria Math" panose="02040503050406030204" pitchFamily="18" charset="0"/>
+                        <a:ea typeface="Cambria Math" panose="02040503050406030204" pitchFamily="18" charset="0"/>
+                      </a:rPr>
+                      <m:t>𝐻</m:t>
+                    </m:r>
+                    <m:r>
+                      <a:rPr lang="en-US" altLang="ja-JP" b="0" i="1" smtClean="0">
+                        <a:latin typeface="Cambria Math" panose="02040503050406030204" pitchFamily="18" charset="0"/>
+                        <a:ea typeface="Cambria Math" panose="02040503050406030204" pitchFamily="18" charset="0"/>
+                      </a:rPr>
+                      <m:t> </m:t>
+                    </m:r>
+                    <m:r>
+                      <a:rPr lang="en-US" altLang="ja-JP" b="0" i="1" smtClean="0">
+                        <a:latin typeface="Cambria Math" panose="02040503050406030204" pitchFamily="18" charset="0"/>
+                        <a:ea typeface="Cambria Math" panose="02040503050406030204" pitchFamily="18" charset="0"/>
+                      </a:rPr>
+                      <m:t>𝑠</m:t>
+                    </m:r>
+                    <m:r>
+                      <a:rPr lang="en-US" altLang="ja-JP" b="0" i="1" smtClean="0">
+                        <a:latin typeface="Cambria Math" panose="02040503050406030204" pitchFamily="18" charset="0"/>
+                        <a:ea typeface="Cambria Math" panose="02040503050406030204" pitchFamily="18" charset="0"/>
+                      </a:rPr>
+                      <m:t>.</m:t>
+                    </m:r>
+                    <m:r>
+                      <a:rPr lang="en-US" altLang="ja-JP" b="0" i="1" smtClean="0">
+                        <a:latin typeface="Cambria Math" panose="02040503050406030204" pitchFamily="18" charset="0"/>
+                        <a:ea typeface="Cambria Math" panose="02040503050406030204" pitchFamily="18" charset="0"/>
+                      </a:rPr>
+                      <m:t>𝑡</m:t>
+                    </m:r>
+                    <m:r>
+                      <a:rPr lang="en-US" altLang="ja-JP" b="0" i="1" smtClean="0">
+                        <a:latin typeface="Cambria Math" panose="02040503050406030204" pitchFamily="18" charset="0"/>
+                        <a:ea typeface="Cambria Math" panose="02040503050406030204" pitchFamily="18" charset="0"/>
+                      </a:rPr>
+                      <m:t>.  </m:t>
+                    </m:r>
+                    <m:sSup>
+                      <m:sSupPr>
+                        <m:ctrlPr>
+                          <a:rPr lang="en-US" altLang="ja" i="1">
+                            <a:latin typeface="Cambria Math" panose="02040503050406030204" pitchFamily="18" charset="0"/>
+                            <a:ea typeface="Cambria Math" panose="02040503050406030204" pitchFamily="18" charset="0"/>
+                          </a:rPr>
+                        </m:ctrlPr>
+                      </m:sSupPr>
+                      <m:e>
+                        <m:r>
+                          <a:rPr lang="en-US" altLang="ja" i="1">
+                            <a:latin typeface="Cambria Math" panose="02040503050406030204" pitchFamily="18" charset="0"/>
+                            <a:ea typeface="Cambria Math" panose="02040503050406030204" pitchFamily="18" charset="0"/>
+                          </a:rPr>
+                          <m:t>h</m:t>
+                        </m:r>
+                      </m:e>
+                      <m:sup>
+                        <m:r>
+                          <a:rPr lang="en-US" altLang="ja" i="1">
+                            <a:latin typeface="Cambria Math" panose="02040503050406030204" pitchFamily="18" charset="0"/>
+                            <a:ea typeface="Cambria Math" panose="02040503050406030204" pitchFamily="18" charset="0"/>
+                          </a:rPr>
+                          <m:t>−1</m:t>
+                        </m:r>
+                      </m:sup>
+                    </m:sSup>
+                    <m:r>
+                      <a:rPr lang="en-US" altLang="ja" b="0" i="1" smtClean="0">
+                        <a:latin typeface="Cambria Math" panose="02040503050406030204" pitchFamily="18" charset="0"/>
+                        <a:ea typeface="Cambria Math" panose="02040503050406030204" pitchFamily="18" charset="0"/>
+                      </a:rPr>
+                      <m:t>:</m:t>
+                    </m:r>
+                    <m:r>
+                      <a:rPr lang="ja-JP" altLang="en-US" i="1">
+                        <a:latin typeface="Cambria Math" panose="02040503050406030204" pitchFamily="18" charset="0"/>
+                        <a:ea typeface="Cambria Math" panose="02040503050406030204" pitchFamily="18" charset="0"/>
+                      </a:rPr>
+                      <m:t>逆元</m:t>
+                    </m:r>
+                  </m:oMath>
+                </a14:m>
+                <a:br>
+                  <a:rPr lang="en-US" altLang="ja-JP" dirty="0">
+                    <a:solidFill>
+                      <a:schemeClr val="tx1">
+                        <a:lumMod val="50000"/>
+                        <a:lumOff val="50000"/>
+                      </a:schemeClr>
+                    </a:solidFill>
+                    <a:ea typeface="Cambria Math" panose="02040503050406030204" pitchFamily="18" charset="0"/>
+                  </a:rPr>
+                </a:br>
+                <a:r>
+                  <a:rPr lang="ja-JP" altLang="en-US">
+                    <a:solidFill>
+                      <a:schemeClr val="tx1">
+                        <a:lumMod val="50000"/>
+                        <a:lumOff val="50000"/>
+                      </a:schemeClr>
+                    </a:solidFill>
+                    <a:ea typeface="Cambria Math" panose="02040503050406030204" pitchFamily="18" charset="0"/>
+                  </a:rPr>
+                  <a:t>逆元が存在する</a:t>
+                </a:r>
+                <a:endParaRPr lang="en-US" altLang="ja-JP" dirty="0">
+                  <a:solidFill>
+                    <a:schemeClr val="tx1">
+                      <a:lumMod val="50000"/>
+                      <a:lumOff val="50000"/>
+                    </a:schemeClr>
+                  </a:solidFill>
+                  <a:ea typeface="Cambria Math" panose="02040503050406030204" pitchFamily="18" charset="0"/>
+                </a:endParaRPr>
+              </a:p>
+              <a:p>
+                <a:endParaRPr kumimoji="1" lang="ja-JP" altLang="en-US"/>
+              </a:p>
+            </p:txBody>
+          </p:sp>
+        </mc:Choice>
+        <mc:Fallback>
+          <p:sp>
+            <p:nvSpPr>
+              <p:cNvPr id="3" name="コンテンツ プレースホルダー 2">
+                <a:extLst>
+                  <a:ext uri="{FF2B5EF4-FFF2-40B4-BE49-F238E27FC236}">
+                    <a16:creationId xmlns:a16="http://schemas.microsoft.com/office/drawing/2014/main" id="{505E0EA2-8D86-2749-9EAB-DE074A886DB0}"/>
+                  </a:ext>
+                </a:extLst>
+              </p:cNvPr>
+              <p:cNvSpPr>
+                <a:spLocks noGrp="1" noRot="1" noChangeAspect="1" noMove="1" noResize="1" noEditPoints="1" noAdjustHandles="1" noChangeArrowheads="1" noChangeShapeType="1" noTextEdit="1"/>
+              </p:cNvSpPr>
+              <p:nvPr>
+                <p:ph idx="1"/>
+              </p:nvPr>
+            </p:nvSpPr>
+            <p:spPr>
+              <a:blipFill>
+                <a:blip r:embed="rId2"/>
+                <a:stretch>
+                  <a:fillRect l="-724" t="-1170"/>
+                </a:stretch>
+              </a:blipFill>
+            </p:spPr>
+            <p:txBody>
+              <a:bodyPr/>
+              <a:lstStyle/>
+              <a:p>
+                <a:r>
+                  <a:rPr lang="ja-JP" altLang="en-US">
+                    <a:noFill/>
+                  </a:rPr>
+                  <a:t> </a:t>
+                </a:r>
+              </a:p>
+            </p:txBody>
+          </p:sp>
+        </mc:Fallback>
+      </mc:AlternateContent>
+    </p:spTree>
+    <p:extLst>
+      <p:ext uri="{BB962C8B-B14F-4D97-AF65-F5344CB8AC3E}">
+        <p14:creationId xmlns:p14="http://schemas.microsoft.com/office/powerpoint/2010/main" val="4221972902"/>
+      </p:ext>
+    </p:extLst>
+  </p:cSld>
+  <p:clrMapOvr>
+    <a:masterClrMapping/>
+  </p:clrMapOvr>
+</p:sld>
+</file>
+
+<file path=ppt/slides/slide16.xml><?xml version="1.0" encoding="utf-8"?>
 <p:sld xmlns:a="http://schemas.openxmlformats.org/drawingml/2006/main" xmlns:r="http://schemas.openxmlformats.org/officeDocument/2006/relationships" xmlns:p="http://schemas.openxmlformats.org/presentationml/2006/main">
   <p:cSld>
     <p:spTree>
@@ -6152,7 +7874,11 @@
                 </a:pPr>
                 <a:r>
                   <a:rPr lang="ja-JP" altLang="en-US"/>
-                  <a:t>群の例２</a:t>
+                  <a:t>群の例</a:t>
+                </a:r>
+                <a:r>
+                  <a:rPr lang="en-US" altLang="ja-JP" sz="2800" dirty="0"/>
+                  <a:t>~</a:t>
                 </a:r>
                 <a14:m>
                   <m:oMath xmlns:m="http://schemas.openxmlformats.org/officeDocument/2006/math">
@@ -6160,7 +7886,7 @@
                       <m:rPr>
                         <m:sty m:val="p"/>
                       </m:rPr>
-                      <a:rPr lang="en-US" altLang="ja-JP">
+                      <a:rPr lang="en-US" altLang="ja-JP" sz="2800">
                         <a:latin typeface="Cambria Math" panose="02040503050406030204" pitchFamily="18" charset="0"/>
                       </a:rPr>
                       <m:t>O</m:t>
@@ -6168,7 +7894,7 @@
                     <m:d>
                       <m:dPr>
                         <m:ctrlPr>
-                          <a:rPr lang="en-US" altLang="ja" i="1">
+                          <a:rPr lang="en-US" altLang="ja" sz="2800" i="1">
                             <a:latin typeface="Cambria Math" panose="02040503050406030204" pitchFamily="18" charset="0"/>
                           </a:rPr>
                         </m:ctrlPr>
@@ -6178,7 +7904,7 @@
                           <m:rPr>
                             <m:sty m:val="p"/>
                           </m:rPr>
-                          <a:rPr lang="en-US" altLang="ja">
+                          <a:rPr lang="en-US" altLang="ja" sz="2800">
                             <a:latin typeface="Cambria Math" panose="02040503050406030204" pitchFamily="18" charset="0"/>
                           </a:rPr>
                           <m:t>n</m:t>
@@ -6186,7 +7912,7 @@
                       </m:e>
                     </m:d>
                     <m:r>
-                      <a:rPr lang="en-US" altLang="ja" i="1" smtClean="0">
+                      <a:rPr lang="en-US" altLang="ja" sz="2800" i="1" smtClean="0">
                         <a:latin typeface="Cambria Math" panose="02040503050406030204" pitchFamily="18" charset="0"/>
                         <a:ea typeface="Cambria Math" panose="02040503050406030204" pitchFamily="18" charset="0"/>
                       </a:rPr>
@@ -6194,6 +7920,13 @@
                     </m:r>
                   </m:oMath>
                 </a14:m>
+                <a:r>
+                  <a:rPr lang="en-US" altLang="ja" sz="2400" dirty="0">
+                    <a:latin typeface="Times New Roman" panose="02020603050405020304" pitchFamily="18" charset="0"/>
+                    <a:cs typeface="Times New Roman" panose="02020603050405020304" pitchFamily="18" charset="0"/>
+                  </a:rPr>
+                  <a:t>~ </a:t>
+                </a:r>
                 <a:r>
                   <a:rPr lang="en-US" altLang="ja" sz="2400" i="1" dirty="0">
                     <a:solidFill>
@@ -6207,7 +7940,7 @@
                   </a:rPr>
                   <a:t>orthogonal group</a:t>
                 </a:r>
-                <a:endParaRPr sz="5867" dirty="0">
+                <a:endParaRPr sz="2800" dirty="0">
                   <a:latin typeface="Times New Roman" panose="02020603050405020304" pitchFamily="18" charset="0"/>
                   <a:cs typeface="Times New Roman" panose="02020603050405020304" pitchFamily="18" charset="0"/>
                 </a:endParaRPr>
@@ -6364,6 +8097,17 @@
                   </a:spcBef>
                   <a:buNone/>
                 </a:pPr>
+                <a:endParaRPr lang="en-US" altLang="ja-JP" sz="2400" dirty="0">
+                  <a:ea typeface="MS PGothic" panose="020B0600070205080204" pitchFamily="34" charset="-128"/>
+                </a:endParaRPr>
+              </a:p>
+              <a:p>
+                <a:pPr marL="0" indent="0">
+                  <a:spcBef>
+                    <a:spcPts val="1067"/>
+                  </a:spcBef>
+                  <a:buNone/>
+                </a:pPr>
                 <a:r>
                   <a:rPr lang="en-US" altLang="ja" sz="2400" i="1" dirty="0">
                     <a:solidFill>
@@ -6379,7 +8123,19 @@
                 </a:r>
                 <a:r>
                   <a:rPr lang="en-US" altLang="ja" sz="2400" dirty="0"/>
-                  <a:t>  </a:t>
+                  <a:t> </a:t>
+                </a:r>
+              </a:p>
+              <a:p>
+                <a:pPr marL="0" indent="0">
+                  <a:spcBef>
+                    <a:spcPts val="1067"/>
+                  </a:spcBef>
+                  <a:buNone/>
+                </a:pPr>
+                <a:r>
+                  <a:rPr lang="en-US" altLang="ja" sz="2400" dirty="0"/>
+                  <a:t> </a:t>
                 </a:r>
                 <a14:m>
                   <m:oMath xmlns:m="http://schemas.openxmlformats.org/officeDocument/2006/math">
@@ -6595,7 +8351,7 @@
                   </a:spcBef>
                   <a:buNone/>
                 </a:pPr>
-                <a:endParaRPr lang="ja-JP" altLang="en-US" dirty="0"/>
+                <a:endParaRPr lang="en-US" altLang="ja-JP" dirty="0"/>
               </a:p>
               <a:p>
                 <a:pPr marL="0" indent="0">
@@ -6605,60 +8361,141 @@
                   <a:buNone/>
                 </a:pPr>
                 <a:r>
-                  <a:rPr lang="fr-CA" altLang="ja" dirty="0"/>
-                  <a:t>O(n)</a:t>
-                </a:r>
-                <a:r>
-                  <a:rPr lang="ja-JP" altLang="en-US" dirty="0"/>
-                  <a:t>が</a:t>
-                </a:r>
-                <a:r>
-                  <a:rPr lang="fr-CA" altLang="ja" dirty="0"/>
-                  <a:t>GL(n;R)</a:t>
-                </a:r>
-                <a:r>
-                  <a:rPr lang="ja-JP" altLang="en-US" dirty="0"/>
-                  <a:t>の部分群であるためには</a:t>
+                  <a:rPr lang="en-US" altLang="ja-JP" dirty="0"/>
+                  <a:t>【</a:t>
+                </a:r>
+                <a:r>
+                  <a:rPr lang="ja-JP" altLang="en-US"/>
+                  <a:t>部分群である確認</a:t>
+                </a:r>
+                <a:r>
+                  <a:rPr lang="en-US" altLang="ja-JP" dirty="0"/>
+                  <a:t>】</a:t>
                 </a:r>
               </a:p>
               <a:p>
-                <a:pPr marL="609585" indent="-423323">
+                <a:pPr>
                   <a:spcBef>
                     <a:spcPts val="1067"/>
                   </a:spcBef>
-                  <a:buSzPts val="1400"/>
-                  <a:buChar char="-"/>
                 </a:pPr>
-                <a:r>
-                  <a:rPr lang="ja-JP" altLang="en-US" dirty="0"/>
-                  <a:t>２つの直交行列の積は直交行列である</a:t>
-                </a:r>
+                <a14:m>
+                  <m:oMath xmlns:m="http://schemas.openxmlformats.org/officeDocument/2006/math">
+                    <m:r>
+                      <m:rPr>
+                        <m:sty m:val="p"/>
+                      </m:rPr>
+                      <a:rPr lang="fr-CA" altLang="ja">
+                        <a:latin typeface="Cambria Math" panose="02040503050406030204" pitchFamily="18" charset="0"/>
+                      </a:rPr>
+                      <m:t>O</m:t>
+                    </m:r>
+                    <m:d>
+                      <m:dPr>
+                        <m:ctrlPr>
+                          <a:rPr lang="ar-AE" altLang="ja" i="1">
+                            <a:latin typeface="Cambria Math" panose="02040503050406030204" pitchFamily="18" charset="0"/>
+                          </a:rPr>
+                        </m:ctrlPr>
+                      </m:dPr>
+                      <m:e>
+                        <m:r>
+                          <m:rPr>
+                            <m:sty m:val="p"/>
+                          </m:rPr>
+                          <a:rPr lang="fr-CA" altLang="ja">
+                            <a:latin typeface="Cambria Math" panose="02040503050406030204" pitchFamily="18" charset="0"/>
+                          </a:rPr>
+                          <m:t>n</m:t>
+                        </m:r>
+                        <m:r>
+                          <a:rPr lang="fr-CA" altLang="ja">
+                            <a:latin typeface="Cambria Math" panose="02040503050406030204" pitchFamily="18" charset="0"/>
+                          </a:rPr>
+                          <m:t>;</m:t>
+                        </m:r>
+                        <m:r>
+                          <a:rPr lang="fr-CA" altLang="ja">
+                            <a:latin typeface="Cambria Math" panose="02040503050406030204" pitchFamily="18" charset="0"/>
+                            <a:ea typeface="Cambria Math" panose="02040503050406030204" pitchFamily="18" charset="0"/>
+                          </a:rPr>
+                          <m:t>ℂ</m:t>
+                        </m:r>
+                      </m:e>
+                    </m:d>
+                    <m:r>
+                      <a:rPr lang="fr-CA" altLang="ja" i="1" smtClean="0">
+                        <a:latin typeface="Cambria Math" panose="02040503050406030204" pitchFamily="18" charset="0"/>
+                        <a:ea typeface="Cambria Math" panose="02040503050406030204" pitchFamily="18" charset="0"/>
+                      </a:rPr>
+                      <m:t>⊂</m:t>
+                    </m:r>
+                    <m:r>
+                      <m:rPr>
+                        <m:sty m:val="p"/>
+                      </m:rPr>
+                      <a:rPr lang="fr-CA" altLang="ja">
+                        <a:latin typeface="Cambria Math" panose="02040503050406030204" pitchFamily="18" charset="0"/>
+                      </a:rPr>
+                      <m:t>G</m:t>
+                    </m:r>
+                    <m:r>
+                      <m:rPr>
+                        <m:sty m:val="p"/>
+                      </m:rPr>
+                      <a:rPr lang="en-US" altLang="ja">
+                        <a:latin typeface="Cambria Math" panose="02040503050406030204" pitchFamily="18" charset="0"/>
+                      </a:rPr>
+                      <m:t>L</m:t>
+                    </m:r>
+                    <m:d>
+                      <m:dPr>
+                        <m:ctrlPr>
+                          <a:rPr lang="en-US" altLang="ja" i="1">
+                            <a:latin typeface="Cambria Math" panose="02040503050406030204" pitchFamily="18" charset="0"/>
+                          </a:rPr>
+                        </m:ctrlPr>
+                      </m:dPr>
+                      <m:e>
+                        <m:r>
+                          <m:rPr>
+                            <m:sty m:val="p"/>
+                          </m:rPr>
+                          <a:rPr lang="en-US" altLang="ja">
+                            <a:latin typeface="Cambria Math" panose="02040503050406030204" pitchFamily="18" charset="0"/>
+                          </a:rPr>
+                          <m:t>n</m:t>
+                        </m:r>
+                        <m:r>
+                          <a:rPr lang="en-US" altLang="ja">
+                            <a:latin typeface="Cambria Math" panose="02040503050406030204" pitchFamily="18" charset="0"/>
+                          </a:rPr>
+                          <m:t>;</m:t>
+                        </m:r>
+                        <m:r>
+                          <a:rPr lang="en-US" altLang="ja">
+                            <a:latin typeface="Cambria Math" panose="02040503050406030204" pitchFamily="18" charset="0"/>
+                            <a:ea typeface="Cambria Math" panose="02040503050406030204" pitchFamily="18" charset="0"/>
+                          </a:rPr>
+                          <m:t>ℂ</m:t>
+                        </m:r>
+                      </m:e>
+                    </m:d>
+                  </m:oMath>
+                </a14:m>
+                <a:endParaRPr lang="en-US" altLang="ja-JP" dirty="0"/>
               </a:p>
               <a:p>
-                <a:pPr marL="609585" indent="-423323">
+                <a:pPr>
                   <a:spcBef>
-                    <a:spcPts val="0"/>
+                    <a:spcPts val="1067"/>
                   </a:spcBef>
-                  <a:buSzPts val="1400"/>
-                  <a:buChar char="-"/>
                 </a:pPr>
                 <a:r>
-                  <a:rPr lang="ja-JP" altLang="en-US" dirty="0"/>
-                  <a:t>単位行列は直交行列である</a:t>
-                </a:r>
-              </a:p>
-              <a:p>
-                <a:pPr marL="609585" indent="-423323">
-                  <a:spcBef>
-                    <a:spcPts val="0"/>
-                  </a:spcBef>
-                  <a:buSzPts val="1400"/>
-                  <a:buChar char="-"/>
-                </a:pPr>
-                <a:r>
-                  <a:rPr lang="ja-JP" altLang="en-US" dirty="0"/>
-                  <a:t>直交行列の逆行列は直交行列である</a:t>
-                </a:r>
+                  <a:rPr lang="ja-JP" altLang="en-US"/>
+                  <a:t>直交行列には逆元（＝逆行列）が存在する</a:t>
+                </a:r>
+                <a:endParaRPr lang="en-US" altLang="ja-JP" dirty="0"/>
               </a:p>
               <a:p>
                 <a:pPr marL="0" indent="0">
@@ -6668,10 +8505,90 @@
                   <a:buNone/>
                 </a:pPr>
                 <a:r>
+                  <a:rPr lang="ja-JP" altLang="en-US"/>
+                  <a:t>これらより，</a:t>
+                </a:r>
+                <a:r>
+                  <a:rPr lang="en-US" altLang="ja" dirty="0"/>
+                  <a:t> </a:t>
+                </a:r>
+                <a14:m>
+                  <m:oMath xmlns:m="http://schemas.openxmlformats.org/officeDocument/2006/math">
+                    <m:r>
+                      <a:rPr lang="en-US" altLang="ja">
+                        <a:latin typeface="Cambria Math" panose="02040503050406030204" pitchFamily="18" charset="0"/>
+                      </a:rPr>
+                      <m:t>(</m:t>
+                    </m:r>
+                    <m:r>
+                      <m:rPr>
+                        <m:sty m:val="p"/>
+                      </m:rPr>
+                      <a:rPr lang="fr-CA" altLang="ja">
+                        <a:latin typeface="Cambria Math" panose="02040503050406030204" pitchFamily="18" charset="0"/>
+                      </a:rPr>
+                      <m:t>G</m:t>
+                    </m:r>
+                    <m:r>
+                      <m:rPr>
+                        <m:sty m:val="p"/>
+                      </m:rPr>
+                      <a:rPr lang="en-US" altLang="ja">
+                        <a:latin typeface="Cambria Math" panose="02040503050406030204" pitchFamily="18" charset="0"/>
+                      </a:rPr>
+                      <m:t>L</m:t>
+                    </m:r>
+                    <m:d>
+                      <m:dPr>
+                        <m:ctrlPr>
+                          <a:rPr lang="en-US" altLang="ja" i="1">
+                            <a:latin typeface="Cambria Math" panose="02040503050406030204" pitchFamily="18" charset="0"/>
+                          </a:rPr>
+                        </m:ctrlPr>
+                      </m:dPr>
+                      <m:e>
+                        <m:r>
+                          <m:rPr>
+                            <m:sty m:val="p"/>
+                          </m:rPr>
+                          <a:rPr lang="en-US" altLang="ja">
+                            <a:latin typeface="Cambria Math" panose="02040503050406030204" pitchFamily="18" charset="0"/>
+                          </a:rPr>
+                          <m:t>n</m:t>
+                        </m:r>
+                        <m:r>
+                          <a:rPr lang="en-US" altLang="ja">
+                            <a:latin typeface="Cambria Math" panose="02040503050406030204" pitchFamily="18" charset="0"/>
+                          </a:rPr>
+                          <m:t>;</m:t>
+                        </m:r>
+                        <m:r>
+                          <a:rPr lang="en-US" altLang="ja">
+                            <a:latin typeface="Cambria Math" panose="02040503050406030204" pitchFamily="18" charset="0"/>
+                            <a:ea typeface="Cambria Math" panose="02040503050406030204" pitchFamily="18" charset="0"/>
+                          </a:rPr>
+                          <m:t>ℂ</m:t>
+                        </m:r>
+                      </m:e>
+                    </m:d>
+                    <m:r>
+                      <a:rPr lang="en-US" altLang="ja" i="1">
+                        <a:latin typeface="Cambria Math" panose="02040503050406030204" pitchFamily="18" charset="0"/>
+                        <a:ea typeface="Cambria Math" panose="02040503050406030204" pitchFamily="18" charset="0"/>
+                      </a:rPr>
+                      <m:t>,  ∙  )</m:t>
+                    </m:r>
+                  </m:oMath>
+                </a14:m>
+                <a:r>
                   <a:rPr lang="ja-JP" altLang="en-US" dirty="0"/>
-                  <a:t>の３つを満たす必要がある</a:t>
-                </a:r>
-                <a:endParaRPr dirty="0"/>
+                  <a:t>は</a:t>
+                </a:r>
+                <a:r>
+                  <a:rPr lang="ja-JP" altLang="en-US"/>
+                  <a:t>群をなすことがわかる．</a:t>
+                </a:r>
+                <a:endParaRPr lang="ja-JP" altLang="en-US" dirty="0"/>
               </a:p>
             </p:txBody>
           </p:sp>
@@ -6698,7 +8615,7 @@
               <a:blipFill>
                 <a:blip r:embed="rId4"/>
                 <a:stretch>
-                  <a:fillRect l="-1086"/>
+                  <a:fillRect l="-1086" b="-9357"/>
                 </a:stretch>
               </a:blipFill>
             </p:spPr>
@@ -6721,6 +8638,2019 @@
     <p:extLst>
       <p:ext uri="{BB962C8B-B14F-4D97-AF65-F5344CB8AC3E}">
         <p14:creationId xmlns:p14="http://schemas.microsoft.com/office/powerpoint/2010/main" val="1085884508"/>
+      </p:ext>
+    </p:extLst>
+  </p:cSld>
+  <p:clrMapOvr>
+    <a:masterClrMapping/>
+  </p:clrMapOvr>
+</p:sld>
+</file>
+
+<file path=ppt/slides/slide17.xml><?xml version="1.0" encoding="utf-8"?>
+<p:sld xmlns:a="http://schemas.openxmlformats.org/drawingml/2006/main" xmlns:r="http://schemas.openxmlformats.org/officeDocument/2006/relationships" xmlns:p="http://schemas.openxmlformats.org/presentationml/2006/main">
+  <p:cSld>
+    <p:spTree>
+      <p:nvGrpSpPr>
+        <p:cNvPr id="1" name=""/>
+        <p:cNvGrpSpPr/>
+        <p:nvPr/>
+      </p:nvGrpSpPr>
+      <p:grpSpPr>
+        <a:xfrm>
+          <a:off x="0" y="0"/>
+          <a:ext cx="0" cy="0"/>
+          <a:chOff x="0" y="0"/>
+          <a:chExt cx="0" cy="0"/>
+        </a:xfrm>
+      </p:grpSpPr>
+      <p:sp>
+        <p:nvSpPr>
+          <p:cNvPr id="2" name="タイトル 1">
+            <a:extLst>
+              <a:ext uri="{FF2B5EF4-FFF2-40B4-BE49-F238E27FC236}">
+                <a16:creationId xmlns:a16="http://schemas.microsoft.com/office/drawing/2014/main" id="{C283853C-3287-254C-9A3E-571C1751B619}"/>
+              </a:ext>
+            </a:extLst>
+          </p:cNvPr>
+          <p:cNvSpPr>
+            <a:spLocks noGrp="1"/>
+          </p:cNvSpPr>
+          <p:nvPr>
+            <p:ph type="title"/>
+          </p:nvPr>
+        </p:nvSpPr>
+        <p:spPr/>
+        <p:txBody>
+          <a:bodyPr/>
+          <a:lstStyle/>
+          <a:p>
+            <a:r>
+              <a:rPr kumimoji="1" lang="ja-JP" altLang="en-US"/>
+              <a:t>群の作用の定義</a:t>
+            </a:r>
+          </a:p>
+        </p:txBody>
+      </p:sp>
+      <mc:AlternateContent xmlns:mc="http://schemas.openxmlformats.org/markup-compatibility/2006">
+        <mc:Choice xmlns:a14="http://schemas.microsoft.com/office/drawing/2010/main" Requires="a14">
+          <p:sp>
+            <p:nvSpPr>
+              <p:cNvPr id="3" name="コンテンツ プレースホルダー 2">
+                <a:extLst>
+                  <a:ext uri="{FF2B5EF4-FFF2-40B4-BE49-F238E27FC236}">
+                    <a16:creationId xmlns:a16="http://schemas.microsoft.com/office/drawing/2014/main" id="{12638679-C706-144C-BEC3-AF506BD633B2}"/>
+                  </a:ext>
+                </a:extLst>
+              </p:cNvPr>
+              <p:cNvSpPr>
+                <a:spLocks noGrp="1"/>
+              </p:cNvSpPr>
+              <p:nvPr>
+                <p:ph idx="1"/>
+              </p:nvPr>
+            </p:nvSpPr>
+            <p:spPr/>
+            <p:txBody>
+              <a:bodyPr/>
+              <a:lstStyle/>
+              <a:p>
+                <a:pPr marL="0" indent="0">
+                  <a:buNone/>
+                </a:pPr>
+                <a:r>
+                  <a:rPr kumimoji="1" lang="en-US" altLang="ja-JP" dirty="0"/>
+                  <a:t>G</a:t>
+                </a:r>
+                <a:r>
+                  <a:rPr kumimoji="1" lang="ja-JP" altLang="en-US"/>
+                  <a:t>：群，</a:t>
+                </a:r>
+                <a:r>
+                  <a:rPr kumimoji="1" lang="en-US" altLang="ja-JP" dirty="0"/>
+                  <a:t>X</a:t>
+                </a:r>
+                <a:r>
+                  <a:rPr kumimoji="1" lang="ja-JP" altLang="en-US"/>
+                  <a:t>：集合</a:t>
+                </a:r>
+                <a:r>
+                  <a:rPr lang="ja-JP" altLang="en-US"/>
+                  <a:t>，・：</a:t>
+                </a:r>
+                <a:r>
+                  <a:rPr lang="en-US" altLang="ja-JP" dirty="0"/>
+                  <a:t>G×X</a:t>
+                </a:r>
+                <a:r>
+                  <a:rPr lang="ja-JP" altLang="en-US"/>
+                  <a:t>から</a:t>
+                </a:r>
+                <a:r>
+                  <a:rPr lang="en-US" altLang="ja-JP" dirty="0"/>
+                  <a:t>X</a:t>
+                </a:r>
+                <a:r>
+                  <a:rPr lang="ja-JP" altLang="en-US"/>
+                  <a:t>への写像</a:t>
+                </a:r>
+                <a:endParaRPr lang="en-US" altLang="ja-JP" dirty="0"/>
+              </a:p>
+              <a:p>
+                <a:pPr marL="0" indent="0">
+                  <a:buNone/>
+                </a:pPr>
+                <a:r>
+                  <a:rPr lang="ja-JP" altLang="en-US"/>
+                  <a:t>写像・が</a:t>
+                </a:r>
+                <a:endParaRPr lang="en-US" altLang="ja-JP" dirty="0"/>
+              </a:p>
+              <a:p>
+                <a14:m>
+                  <m:oMath xmlns:m="http://schemas.openxmlformats.org/officeDocument/2006/math">
+                    <m:r>
+                      <a:rPr lang="en-US" altLang="ja-JP" i="1" smtClean="0">
+                        <a:latin typeface="Cambria Math" panose="02040503050406030204" pitchFamily="18" charset="0"/>
+                        <a:ea typeface="Cambria Math" panose="02040503050406030204" pitchFamily="18" charset="0"/>
+                      </a:rPr>
+                      <m:t>∀</m:t>
+                    </m:r>
+                    <m:sSub>
+                      <m:sSubPr>
+                        <m:ctrlPr>
+                          <a:rPr lang="en-US" altLang="ja-JP" i="1">
+                            <a:latin typeface="Cambria Math" panose="02040503050406030204" pitchFamily="18" charset="0"/>
+                          </a:rPr>
+                        </m:ctrlPr>
+                      </m:sSubPr>
+                      <m:e>
+                        <m:r>
+                          <a:rPr lang="en-US" altLang="ja-JP" i="1">
+                            <a:latin typeface="Cambria Math" panose="02040503050406030204" pitchFamily="18" charset="0"/>
+                          </a:rPr>
+                          <m:t>𝑔</m:t>
+                        </m:r>
+                      </m:e>
+                      <m:sub>
+                        <m:r>
+                          <a:rPr lang="en-US" altLang="ja-JP" i="1">
+                            <a:latin typeface="Cambria Math" panose="02040503050406030204" pitchFamily="18" charset="0"/>
+                          </a:rPr>
+                          <m:t>1</m:t>
+                        </m:r>
+                      </m:sub>
+                    </m:sSub>
+                    <m:r>
+                      <a:rPr lang="en-US" altLang="ja-JP" b="0" i="1" smtClean="0">
+                        <a:latin typeface="Cambria Math" panose="02040503050406030204" pitchFamily="18" charset="0"/>
+                      </a:rPr>
+                      <m:t>,</m:t>
+                    </m:r>
+                    <m:r>
+                      <a:rPr lang="en-US" altLang="ja-JP" i="1">
+                        <a:latin typeface="Cambria Math" panose="02040503050406030204" pitchFamily="18" charset="0"/>
+                        <a:ea typeface="Cambria Math" panose="02040503050406030204" pitchFamily="18" charset="0"/>
+                      </a:rPr>
+                      <m:t>∀</m:t>
+                    </m:r>
+                    <m:sSub>
+                      <m:sSubPr>
+                        <m:ctrlPr>
+                          <a:rPr lang="en-US" altLang="ja-JP" i="1">
+                            <a:latin typeface="Cambria Math" panose="02040503050406030204" pitchFamily="18" charset="0"/>
+                          </a:rPr>
+                        </m:ctrlPr>
+                      </m:sSubPr>
+                      <m:e>
+                        <m:r>
+                          <a:rPr lang="en-US" altLang="ja-JP" i="1">
+                            <a:latin typeface="Cambria Math" panose="02040503050406030204" pitchFamily="18" charset="0"/>
+                          </a:rPr>
+                          <m:t>𝑔</m:t>
+                        </m:r>
+                      </m:e>
+                      <m:sub>
+                        <m:r>
+                          <a:rPr lang="en-US" altLang="ja-JP" b="0" i="1" smtClean="0">
+                            <a:latin typeface="Cambria Math" panose="02040503050406030204" pitchFamily="18" charset="0"/>
+                          </a:rPr>
+                          <m:t>2</m:t>
+                        </m:r>
+                      </m:sub>
+                    </m:sSub>
+                    <m:r>
+                      <a:rPr lang="en-US" altLang="ja-JP" i="1" smtClean="0">
+                        <a:latin typeface="Cambria Math" panose="02040503050406030204" pitchFamily="18" charset="0"/>
+                        <a:ea typeface="Cambria Math" panose="02040503050406030204" pitchFamily="18" charset="0"/>
+                      </a:rPr>
+                      <m:t>∈</m:t>
+                    </m:r>
+                    <m:r>
+                      <a:rPr lang="en-US" altLang="ja-JP" b="0" i="1" smtClean="0">
+                        <a:latin typeface="Cambria Math" panose="02040503050406030204" pitchFamily="18" charset="0"/>
+                        <a:ea typeface="Cambria Math" panose="02040503050406030204" pitchFamily="18" charset="0"/>
+                      </a:rPr>
+                      <m:t>𝐺</m:t>
+                    </m:r>
+                    <m:r>
+                      <a:rPr lang="en-US" altLang="ja-JP" b="0" i="1" smtClean="0">
+                        <a:latin typeface="Cambria Math" panose="02040503050406030204" pitchFamily="18" charset="0"/>
+                        <a:ea typeface="Cambria Math" panose="02040503050406030204" pitchFamily="18" charset="0"/>
+                      </a:rPr>
+                      <m:t>,∀</m:t>
+                    </m:r>
+                    <m:r>
+                      <a:rPr lang="en-US" altLang="ja-JP" b="0" i="1" smtClean="0">
+                        <a:latin typeface="Cambria Math" panose="02040503050406030204" pitchFamily="18" charset="0"/>
+                        <a:ea typeface="Cambria Math" panose="02040503050406030204" pitchFamily="18" charset="0"/>
+                      </a:rPr>
+                      <m:t>𝑥</m:t>
+                    </m:r>
+                    <m:r>
+                      <a:rPr lang="en-US" altLang="ja-JP" i="1">
+                        <a:latin typeface="Cambria Math" panose="02040503050406030204" pitchFamily="18" charset="0"/>
+                        <a:ea typeface="Cambria Math" panose="02040503050406030204" pitchFamily="18" charset="0"/>
+                      </a:rPr>
+                      <m:t>∈</m:t>
+                    </m:r>
+                    <m:r>
+                      <a:rPr lang="en-US" altLang="ja-JP" b="0" i="1" smtClean="0">
+                        <a:latin typeface="Cambria Math" panose="02040503050406030204" pitchFamily="18" charset="0"/>
+                        <a:ea typeface="Cambria Math" panose="02040503050406030204" pitchFamily="18" charset="0"/>
+                      </a:rPr>
+                      <m:t>𝑋</m:t>
+                    </m:r>
+                    <m:r>
+                      <a:rPr lang="en-US" altLang="ja-JP" b="0" i="1" smtClean="0">
+                        <a:latin typeface="Cambria Math" panose="02040503050406030204" pitchFamily="18" charset="0"/>
+                        <a:ea typeface="Cambria Math" panose="02040503050406030204" pitchFamily="18" charset="0"/>
+                      </a:rPr>
+                      <m:t>,  </m:t>
+                    </m:r>
+                    <m:d>
+                      <m:dPr>
+                        <m:ctrlPr>
+                          <a:rPr kumimoji="1" lang="en-US" altLang="ja-JP" b="0" i="1" smtClean="0">
+                            <a:latin typeface="Cambria Math" panose="02040503050406030204" pitchFamily="18" charset="0"/>
+                          </a:rPr>
+                        </m:ctrlPr>
+                      </m:dPr>
+                      <m:e>
+                        <m:sSub>
+                          <m:sSubPr>
+                            <m:ctrlPr>
+                              <a:rPr kumimoji="1" lang="en-US" altLang="ja-JP" b="0" i="1" smtClean="0">
+                                <a:latin typeface="Cambria Math" panose="02040503050406030204" pitchFamily="18" charset="0"/>
+                              </a:rPr>
+                            </m:ctrlPr>
+                          </m:sSubPr>
+                          <m:e>
+                            <m:r>
+                              <a:rPr kumimoji="1" lang="en-US" altLang="ja-JP" b="0" i="1" smtClean="0">
+                                <a:latin typeface="Cambria Math" panose="02040503050406030204" pitchFamily="18" charset="0"/>
+                              </a:rPr>
+                              <m:t>𝑔</m:t>
+                            </m:r>
+                          </m:e>
+                          <m:sub>
+                            <m:r>
+                              <a:rPr kumimoji="1" lang="en-US" altLang="ja-JP" b="0" i="1" smtClean="0">
+                                <a:latin typeface="Cambria Math" panose="02040503050406030204" pitchFamily="18" charset="0"/>
+                              </a:rPr>
+                              <m:t>1</m:t>
+                            </m:r>
+                          </m:sub>
+                        </m:sSub>
+                        <m:r>
+                          <a:rPr lang="en-US" altLang="ja-JP" i="1">
+                            <a:latin typeface="Cambria Math" panose="02040503050406030204" pitchFamily="18" charset="0"/>
+                            <a:ea typeface="Cambria Math" panose="02040503050406030204" pitchFamily="18" charset="0"/>
+                          </a:rPr>
+                          <m:t>∙</m:t>
+                        </m:r>
+                        <m:sSub>
+                          <m:sSubPr>
+                            <m:ctrlPr>
+                              <a:rPr lang="en-US" altLang="ja-JP" i="1">
+                                <a:latin typeface="Cambria Math" panose="02040503050406030204" pitchFamily="18" charset="0"/>
+                              </a:rPr>
+                            </m:ctrlPr>
+                          </m:sSubPr>
+                          <m:e>
+                            <m:r>
+                              <a:rPr lang="en-US" altLang="ja-JP" b="0" i="1" smtClean="0">
+                                <a:latin typeface="Cambria Math" panose="02040503050406030204" pitchFamily="18" charset="0"/>
+                              </a:rPr>
+                              <m:t>𝑔</m:t>
+                            </m:r>
+                          </m:e>
+                          <m:sub>
+                            <m:r>
+                              <a:rPr lang="en-US" altLang="ja-JP" b="0" i="1" smtClean="0">
+                                <a:latin typeface="Cambria Math" panose="02040503050406030204" pitchFamily="18" charset="0"/>
+                              </a:rPr>
+                              <m:t>2</m:t>
+                            </m:r>
+                          </m:sub>
+                        </m:sSub>
+                      </m:e>
+                    </m:d>
+                    <m:r>
+                      <a:rPr kumimoji="1" lang="en-US" altLang="ja-JP" b="0" i="1" smtClean="0">
+                        <a:latin typeface="Cambria Math" panose="02040503050406030204" pitchFamily="18" charset="0"/>
+                        <a:ea typeface="Cambria Math" panose="02040503050406030204" pitchFamily="18" charset="0"/>
+                      </a:rPr>
+                      <m:t>∙</m:t>
+                    </m:r>
+                    <m:r>
+                      <a:rPr kumimoji="1" lang="en-US" altLang="ja-JP" b="0" i="1" smtClean="0">
+                        <a:latin typeface="Cambria Math" panose="02040503050406030204" pitchFamily="18" charset="0"/>
+                        <a:ea typeface="Cambria Math" panose="02040503050406030204" pitchFamily="18" charset="0"/>
+                      </a:rPr>
+                      <m:t>𝑥</m:t>
+                    </m:r>
+                    <m:r>
+                      <a:rPr kumimoji="1" lang="en-US" altLang="ja-JP" b="0" i="1" smtClean="0">
+                        <a:latin typeface="Cambria Math" panose="02040503050406030204" pitchFamily="18" charset="0"/>
+                        <a:ea typeface="Cambria Math" panose="02040503050406030204" pitchFamily="18" charset="0"/>
+                      </a:rPr>
+                      <m:t>=</m:t>
+                    </m:r>
+                    <m:sSub>
+                      <m:sSubPr>
+                        <m:ctrlPr>
+                          <a:rPr lang="en-US" altLang="ja-JP" i="1">
+                            <a:latin typeface="Cambria Math" panose="02040503050406030204" pitchFamily="18" charset="0"/>
+                          </a:rPr>
+                        </m:ctrlPr>
+                      </m:sSubPr>
+                      <m:e>
+                        <m:r>
+                          <a:rPr lang="en-US" altLang="ja-JP" i="1">
+                            <a:latin typeface="Cambria Math" panose="02040503050406030204" pitchFamily="18" charset="0"/>
+                          </a:rPr>
+                          <m:t>𝑔</m:t>
+                        </m:r>
+                      </m:e>
+                      <m:sub>
+                        <m:r>
+                          <a:rPr lang="en-US" altLang="ja-JP" i="1">
+                            <a:latin typeface="Cambria Math" panose="02040503050406030204" pitchFamily="18" charset="0"/>
+                          </a:rPr>
+                          <m:t>1</m:t>
+                        </m:r>
+                      </m:sub>
+                    </m:sSub>
+                    <m:sSub>
+                      <m:sSubPr>
+                        <m:ctrlPr>
+                          <a:rPr lang="en-US" altLang="ja-JP" i="1">
+                            <a:latin typeface="Cambria Math" panose="02040503050406030204" pitchFamily="18" charset="0"/>
+                          </a:rPr>
+                        </m:ctrlPr>
+                      </m:sSubPr>
+                      <m:e>
+                        <m:r>
+                          <a:rPr lang="en-US" altLang="ja-JP" i="1">
+                            <a:latin typeface="Cambria Math" panose="02040503050406030204" pitchFamily="18" charset="0"/>
+                            <a:ea typeface="Cambria Math" panose="02040503050406030204" pitchFamily="18" charset="0"/>
+                          </a:rPr>
+                          <m:t>∙</m:t>
+                        </m:r>
+                        <m:r>
+                          <a:rPr lang="en-US" altLang="ja-JP" b="0" i="1" smtClean="0">
+                            <a:latin typeface="Cambria Math" panose="02040503050406030204" pitchFamily="18" charset="0"/>
+                          </a:rPr>
+                          <m:t>(</m:t>
+                        </m:r>
+                        <m:r>
+                          <a:rPr lang="en-US" altLang="ja-JP" i="1">
+                            <a:latin typeface="Cambria Math" panose="02040503050406030204" pitchFamily="18" charset="0"/>
+                          </a:rPr>
+                          <m:t>𝑔</m:t>
+                        </m:r>
+                      </m:e>
+                      <m:sub>
+                        <m:r>
+                          <a:rPr lang="en-US" altLang="ja-JP" i="1">
+                            <a:latin typeface="Cambria Math" panose="02040503050406030204" pitchFamily="18" charset="0"/>
+                          </a:rPr>
+                          <m:t>2</m:t>
+                        </m:r>
+                      </m:sub>
+                    </m:sSub>
+                    <m:r>
+                      <a:rPr lang="en-US" altLang="ja-JP" i="1">
+                        <a:latin typeface="Cambria Math" panose="02040503050406030204" pitchFamily="18" charset="0"/>
+                        <a:ea typeface="Cambria Math" panose="02040503050406030204" pitchFamily="18" charset="0"/>
+                      </a:rPr>
+                      <m:t>∙</m:t>
+                    </m:r>
+                    <m:r>
+                      <a:rPr lang="en-US" altLang="ja-JP" b="0" i="1" smtClean="0">
+                        <a:latin typeface="Cambria Math" panose="02040503050406030204" pitchFamily="18" charset="0"/>
+                      </a:rPr>
+                      <m:t>𝑥</m:t>
+                    </m:r>
+                    <m:r>
+                      <a:rPr lang="en-US" altLang="ja-JP" b="0" i="1" smtClean="0">
+                        <a:latin typeface="Cambria Math" panose="02040503050406030204" pitchFamily="18" charset="0"/>
+                      </a:rPr>
+                      <m:t>)</m:t>
+                    </m:r>
+                  </m:oMath>
+                </a14:m>
+                <a:br>
+                  <a:rPr kumimoji="1" lang="en-US" altLang="ja-JP" dirty="0"/>
+                </a:br>
+                <a:r>
+                  <a:rPr kumimoji="1" lang="ja-JP" altLang="en-US">
+                    <a:solidFill>
+                      <a:schemeClr val="tx1">
+                        <a:lumMod val="50000"/>
+                        <a:lumOff val="50000"/>
+                      </a:schemeClr>
+                    </a:solidFill>
+                  </a:rPr>
+                  <a:t>合成してから飛ばしても，</a:t>
+                </a:r>
+                <a:r>
+                  <a:rPr kumimoji="1" lang="en-US" altLang="ja-JP" dirty="0">
+                    <a:solidFill>
+                      <a:schemeClr val="tx1">
+                        <a:lumMod val="50000"/>
+                        <a:lumOff val="50000"/>
+                      </a:schemeClr>
+                    </a:solidFill>
+                  </a:rPr>
+                  <a:t>2</a:t>
+                </a:r>
+                <a:r>
+                  <a:rPr kumimoji="1" lang="ja-JP" altLang="en-US">
+                    <a:solidFill>
+                      <a:schemeClr val="tx1">
+                        <a:lumMod val="50000"/>
+                        <a:lumOff val="50000"/>
+                      </a:schemeClr>
+                    </a:solidFill>
+                  </a:rPr>
+                  <a:t>回飛ばしても同じ</a:t>
+                </a:r>
+                <a:endParaRPr kumimoji="1" lang="en-US" altLang="ja-JP" dirty="0">
+                  <a:solidFill>
+                    <a:schemeClr val="tx1">
+                      <a:lumMod val="50000"/>
+                      <a:lumOff val="50000"/>
+                    </a:schemeClr>
+                  </a:solidFill>
+                </a:endParaRPr>
+              </a:p>
+              <a:p>
+                <a:r>
+                  <a:rPr kumimoji="1" lang="en-US" altLang="ja-JP" dirty="0"/>
+                  <a:t>e</a:t>
+                </a:r>
+                <a:r>
+                  <a:rPr lang="en-US" altLang="ja-JP" dirty="0">
+                    <a:ea typeface="Cambria Math" panose="02040503050406030204" pitchFamily="18" charset="0"/>
+                  </a:rPr>
+                  <a:t> </a:t>
+                </a:r>
+                <a14:m>
+                  <m:oMath xmlns:m="http://schemas.openxmlformats.org/officeDocument/2006/math">
+                    <m:r>
+                      <a:rPr lang="en-US" altLang="ja-JP" i="1">
+                        <a:latin typeface="Cambria Math" panose="02040503050406030204" pitchFamily="18" charset="0"/>
+                        <a:ea typeface="Cambria Math" panose="02040503050406030204" pitchFamily="18" charset="0"/>
+                      </a:rPr>
+                      <m:t>∈</m:t>
+                    </m:r>
+                    <m:r>
+                      <a:rPr lang="en-US" altLang="ja-JP" i="1">
+                        <a:latin typeface="Cambria Math" panose="02040503050406030204" pitchFamily="18" charset="0"/>
+                        <a:ea typeface="Cambria Math" panose="02040503050406030204" pitchFamily="18" charset="0"/>
+                      </a:rPr>
+                      <m:t>𝐺</m:t>
+                    </m:r>
+                  </m:oMath>
+                </a14:m>
+                <a:r>
+                  <a:rPr kumimoji="1" lang="en-US" altLang="ja-JP" dirty="0"/>
+                  <a:t>:</a:t>
+                </a:r>
+                <a:r>
+                  <a:rPr kumimoji="1" lang="ja-JP" altLang="en-US"/>
+                  <a:t>単位元</a:t>
+                </a:r>
+                <a:r>
+                  <a:rPr lang="en-US" altLang="ja-JP" dirty="0"/>
+                  <a:t>, </a:t>
+                </a:r>
+                <a14:m>
+                  <m:oMath xmlns:m="http://schemas.openxmlformats.org/officeDocument/2006/math">
+                    <m:r>
+                      <a:rPr lang="en-US" altLang="ja-JP" i="1">
+                        <a:latin typeface="Cambria Math" panose="02040503050406030204" pitchFamily="18" charset="0"/>
+                        <a:ea typeface="Cambria Math" panose="02040503050406030204" pitchFamily="18" charset="0"/>
+                      </a:rPr>
+                      <m:t>∀</m:t>
+                    </m:r>
+                    <m:r>
+                      <a:rPr lang="en-US" altLang="ja-JP" i="1">
+                        <a:latin typeface="Cambria Math" panose="02040503050406030204" pitchFamily="18" charset="0"/>
+                        <a:ea typeface="Cambria Math" panose="02040503050406030204" pitchFamily="18" charset="0"/>
+                      </a:rPr>
+                      <m:t>𝑥</m:t>
+                    </m:r>
+                    <m:r>
+                      <a:rPr lang="en-US" altLang="ja-JP" i="1">
+                        <a:latin typeface="Cambria Math" panose="02040503050406030204" pitchFamily="18" charset="0"/>
+                        <a:ea typeface="Cambria Math" panose="02040503050406030204" pitchFamily="18" charset="0"/>
+                      </a:rPr>
+                      <m:t>∈</m:t>
+                    </m:r>
+                    <m:r>
+                      <a:rPr lang="en-US" altLang="ja-JP" i="1">
+                        <a:latin typeface="Cambria Math" panose="02040503050406030204" pitchFamily="18" charset="0"/>
+                        <a:ea typeface="Cambria Math" panose="02040503050406030204" pitchFamily="18" charset="0"/>
+                      </a:rPr>
+                      <m:t>𝑋</m:t>
+                    </m:r>
+                    <m:r>
+                      <a:rPr lang="en-US" altLang="ja-JP" b="0" i="0" smtClean="0">
+                        <a:latin typeface="Cambria Math" panose="02040503050406030204" pitchFamily="18" charset="0"/>
+                        <a:ea typeface="Cambria Math" panose="02040503050406030204" pitchFamily="18" charset="0"/>
+                      </a:rPr>
+                      <m:t>, </m:t>
+                    </m:r>
+                    <m:r>
+                      <m:rPr>
+                        <m:sty m:val="p"/>
+                      </m:rPr>
+                      <a:rPr lang="en-US" altLang="ja-JP" b="0" i="0" smtClean="0">
+                        <a:latin typeface="Cambria Math" panose="02040503050406030204" pitchFamily="18" charset="0"/>
+                        <a:ea typeface="Cambria Math" panose="02040503050406030204" pitchFamily="18" charset="0"/>
+                      </a:rPr>
+                      <m:t>e</m:t>
+                    </m:r>
+                    <m:r>
+                      <a:rPr lang="en-US" altLang="ja-JP" i="1">
+                        <a:latin typeface="Cambria Math" panose="02040503050406030204" pitchFamily="18" charset="0"/>
+                        <a:ea typeface="Cambria Math" panose="02040503050406030204" pitchFamily="18" charset="0"/>
+                      </a:rPr>
+                      <m:t>∙</m:t>
+                    </m:r>
+                    <m:r>
+                      <m:rPr>
+                        <m:sty m:val="p"/>
+                      </m:rPr>
+                      <a:rPr lang="en-US" altLang="ja-JP" b="0" i="0" smtClean="0">
+                        <a:latin typeface="Cambria Math" panose="02040503050406030204" pitchFamily="18" charset="0"/>
+                        <a:ea typeface="Cambria Math" panose="02040503050406030204" pitchFamily="18" charset="0"/>
+                      </a:rPr>
+                      <m:t>x</m:t>
+                    </m:r>
+                    <m:r>
+                      <a:rPr lang="en-US" altLang="ja-JP" b="0" i="0" smtClean="0">
+                        <a:latin typeface="Cambria Math" panose="02040503050406030204" pitchFamily="18" charset="0"/>
+                        <a:ea typeface="Cambria Math" panose="02040503050406030204" pitchFamily="18" charset="0"/>
+                      </a:rPr>
+                      <m:t>=</m:t>
+                    </m:r>
+                    <m:r>
+                      <m:rPr>
+                        <m:sty m:val="p"/>
+                      </m:rPr>
+                      <a:rPr lang="en-US" altLang="ja-JP" b="0" i="0" smtClean="0">
+                        <a:latin typeface="Cambria Math" panose="02040503050406030204" pitchFamily="18" charset="0"/>
+                        <a:ea typeface="Cambria Math" panose="02040503050406030204" pitchFamily="18" charset="0"/>
+                      </a:rPr>
+                      <m:t>x</m:t>
+                    </m:r>
+                  </m:oMath>
+                </a14:m>
+                <a:r>
+                  <a:rPr kumimoji="1" lang="en-US" altLang="ja-JP" dirty="0"/>
+                  <a:t> </a:t>
+                </a:r>
+                <a:br>
+                  <a:rPr kumimoji="1" lang="en-US" altLang="ja-JP" dirty="0"/>
+                </a:br>
+                <a:r>
+                  <a:rPr kumimoji="1" lang="ja-JP" altLang="en-US">
+                    <a:solidFill>
+                      <a:schemeClr val="tx1">
+                        <a:lumMod val="50000"/>
+                        <a:lumOff val="50000"/>
+                      </a:schemeClr>
+                    </a:solidFill>
+                  </a:rPr>
+                  <a:t>単位元の存在</a:t>
+                </a:r>
+                <a:endParaRPr kumimoji="1" lang="en-US" altLang="ja-JP" dirty="0">
+                  <a:solidFill>
+                    <a:schemeClr val="tx1">
+                      <a:lumMod val="50000"/>
+                      <a:lumOff val="50000"/>
+                    </a:schemeClr>
+                  </a:solidFill>
+                </a:endParaRPr>
+              </a:p>
+              <a:p>
+                <a:pPr marL="0" indent="0">
+                  <a:buNone/>
+                </a:pPr>
+                <a:r>
+                  <a:rPr lang="ja-JP" altLang="en-US"/>
+                  <a:t>の</a:t>
+                </a:r>
+                <a:r>
+                  <a:rPr lang="en-US" altLang="ja-JP" dirty="0"/>
+                  <a:t>2</a:t>
+                </a:r>
+                <a:r>
+                  <a:rPr lang="ja-JP" altLang="en-US"/>
+                  <a:t>つを満たすとき，写像・を「群</a:t>
+                </a:r>
+                <a:r>
+                  <a:rPr lang="en-US" altLang="ja-JP" dirty="0"/>
+                  <a:t>G</a:t>
+                </a:r>
+                <a:r>
+                  <a:rPr lang="ja-JP" altLang="en-US"/>
+                  <a:t>の</a:t>
+                </a:r>
+                <a:r>
+                  <a:rPr lang="en-US" altLang="ja-JP" dirty="0"/>
+                  <a:t>X</a:t>
+                </a:r>
+                <a:r>
+                  <a:rPr lang="ja-JP" altLang="en-US"/>
+                  <a:t>への作用」という．</a:t>
+                </a:r>
+                <a:endParaRPr kumimoji="1" lang="en-US" altLang="ja-JP" dirty="0"/>
+              </a:p>
+            </p:txBody>
+          </p:sp>
+        </mc:Choice>
+        <mc:Fallback>
+          <p:sp>
+            <p:nvSpPr>
+              <p:cNvPr id="3" name="コンテンツ プレースホルダー 2">
+                <a:extLst>
+                  <a:ext uri="{FF2B5EF4-FFF2-40B4-BE49-F238E27FC236}">
+                    <a16:creationId xmlns:a16="http://schemas.microsoft.com/office/drawing/2014/main" id="{12638679-C706-144C-BEC3-AF506BD633B2}"/>
+                  </a:ext>
+                </a:extLst>
+              </p:cNvPr>
+              <p:cNvSpPr>
+                <a:spLocks noGrp="1" noRot="1" noChangeAspect="1" noMove="1" noResize="1" noEditPoints="1" noAdjustHandles="1" noChangeArrowheads="1" noChangeShapeType="1" noTextEdit="1"/>
+              </p:cNvSpPr>
+              <p:nvPr>
+                <p:ph idx="1"/>
+              </p:nvPr>
+            </p:nvSpPr>
+            <p:spPr>
+              <a:blipFill>
+                <a:blip r:embed="rId3"/>
+                <a:stretch>
+                  <a:fillRect l="-1086" t="-2632"/>
+                </a:stretch>
+              </a:blipFill>
+            </p:spPr>
+            <p:txBody>
+              <a:bodyPr/>
+              <a:lstStyle/>
+              <a:p>
+                <a:r>
+                  <a:rPr lang="ja-JP" altLang="en-US">
+                    <a:noFill/>
+                  </a:rPr>
+                  <a:t> </a:t>
+                </a:r>
+              </a:p>
+            </p:txBody>
+          </p:sp>
+        </mc:Fallback>
+      </mc:AlternateContent>
+    </p:spTree>
+    <p:extLst>
+      <p:ext uri="{BB962C8B-B14F-4D97-AF65-F5344CB8AC3E}">
+        <p14:creationId xmlns:p14="http://schemas.microsoft.com/office/powerpoint/2010/main" val="2445278007"/>
+      </p:ext>
+    </p:extLst>
+  </p:cSld>
+  <p:clrMapOvr>
+    <a:masterClrMapping/>
+  </p:clrMapOvr>
+</p:sld>
+</file>
+
+<file path=ppt/slides/slide18.xml><?xml version="1.0" encoding="utf-8"?>
+<p:sld xmlns:a="http://schemas.openxmlformats.org/drawingml/2006/main" xmlns:r="http://schemas.openxmlformats.org/officeDocument/2006/relationships" xmlns:p="http://schemas.openxmlformats.org/presentationml/2006/main">
+  <p:cSld>
+    <p:spTree>
+      <p:nvGrpSpPr>
+        <p:cNvPr id="1" name=""/>
+        <p:cNvGrpSpPr/>
+        <p:nvPr/>
+      </p:nvGrpSpPr>
+      <p:grpSpPr>
+        <a:xfrm>
+          <a:off x="0" y="0"/>
+          <a:ext cx="0" cy="0"/>
+          <a:chOff x="0" y="0"/>
+          <a:chExt cx="0" cy="0"/>
+        </a:xfrm>
+      </p:grpSpPr>
+      <p:sp>
+        <p:nvSpPr>
+          <p:cNvPr id="2" name="タイトル 1">
+            <a:extLst>
+              <a:ext uri="{FF2B5EF4-FFF2-40B4-BE49-F238E27FC236}">
+                <a16:creationId xmlns:a16="http://schemas.microsoft.com/office/drawing/2014/main" id="{43783EBE-76E9-B446-8FCB-DA302CACD138}"/>
+              </a:ext>
+            </a:extLst>
+          </p:cNvPr>
+          <p:cNvSpPr>
+            <a:spLocks noGrp="1"/>
+          </p:cNvSpPr>
+          <p:nvPr>
+            <p:ph type="title"/>
+          </p:nvPr>
+        </p:nvSpPr>
+        <p:spPr/>
+        <p:txBody>
+          <a:bodyPr/>
+          <a:lstStyle/>
+          <a:p>
+            <a:r>
+              <a:rPr kumimoji="1" lang="ja-JP" altLang="en-US"/>
+              <a:t>群の作用の例</a:t>
+            </a:r>
+          </a:p>
+        </p:txBody>
+      </p:sp>
+      <mc:AlternateContent xmlns:mc="http://schemas.openxmlformats.org/markup-compatibility/2006">
+        <mc:Choice xmlns:a14="http://schemas.microsoft.com/office/drawing/2010/main" Requires="a14">
+          <p:sp>
+            <p:nvSpPr>
+              <p:cNvPr id="3" name="コンテンツ プレースホルダー 2">
+                <a:extLst>
+                  <a:ext uri="{FF2B5EF4-FFF2-40B4-BE49-F238E27FC236}">
+                    <a16:creationId xmlns:a16="http://schemas.microsoft.com/office/drawing/2014/main" id="{6D3C7657-74B5-A549-BC53-0ECF18D2E85B}"/>
+                  </a:ext>
+                </a:extLst>
+              </p:cNvPr>
+              <p:cNvSpPr>
+                <a:spLocks noGrp="1"/>
+              </p:cNvSpPr>
+              <p:nvPr>
+                <p:ph idx="1"/>
+              </p:nvPr>
+            </p:nvSpPr>
+            <p:spPr/>
+            <p:txBody>
+              <a:bodyPr/>
+              <a:lstStyle/>
+              <a:p>
+                <a:pPr marL="0" lvl="0" indent="0">
+                  <a:buNone/>
+                </a:pPr>
+                <a14:m>
+                  <m:oMathPara xmlns:m="http://schemas.openxmlformats.org/officeDocument/2006/math">
+                    <m:oMathParaPr>
+                      <m:jc m:val="left"/>
+                    </m:oMathParaPr>
+                    <m:oMath xmlns:m="http://schemas.openxmlformats.org/officeDocument/2006/math">
+                      <m:r>
+                        <a:rPr lang="en-US" altLang="ja-JP" i="1" smtClean="0">
+                          <a:latin typeface="Cambria Math" panose="02040503050406030204" pitchFamily="18" charset="0"/>
+                        </a:rPr>
+                        <m:t>𝑋</m:t>
+                      </m:r>
+                      <m:r>
+                        <a:rPr lang="en-US" altLang="ja-JP" i="1" smtClean="0">
+                          <a:latin typeface="Cambria Math" panose="02040503050406030204" pitchFamily="18" charset="0"/>
+                        </a:rPr>
+                        <m:t>:</m:t>
+                      </m:r>
+                      <m:sSup>
+                        <m:sSupPr>
+                          <m:ctrlPr>
+                            <a:rPr lang="en-US" altLang="ja-JP" i="1">
+                              <a:latin typeface="Cambria Math" panose="02040503050406030204" pitchFamily="18" charset="0"/>
+                            </a:rPr>
+                          </m:ctrlPr>
+                        </m:sSupPr>
+                        <m:e>
+                          <m:r>
+                            <a:rPr lang="en-US" altLang="ja-JP" i="1">
+                              <a:latin typeface="Cambria Math" panose="02040503050406030204" pitchFamily="18" charset="0"/>
+                              <a:ea typeface="Cambria Math" panose="02040503050406030204" pitchFamily="18" charset="0"/>
+                            </a:rPr>
+                            <m:t>ℂ</m:t>
+                          </m:r>
+                        </m:e>
+                        <m:sup>
+                          <m:r>
+                            <a:rPr lang="en-US" altLang="ja-JP" i="1">
+                              <a:latin typeface="Cambria Math" panose="02040503050406030204" pitchFamily="18" charset="0"/>
+                            </a:rPr>
+                            <m:t>𝑛</m:t>
+                          </m:r>
+                        </m:sup>
+                      </m:sSup>
+                      <m:d>
+                        <m:dPr>
+                          <m:ctrlPr>
+                            <a:rPr lang="en-US" altLang="ja-JP" i="1">
+                              <a:latin typeface="Cambria Math" panose="02040503050406030204" pitchFamily="18" charset="0"/>
+                            </a:rPr>
+                          </m:ctrlPr>
+                        </m:dPr>
+                        <m:e>
+                          <m:r>
+                            <a:rPr lang="en-US" altLang="ja-JP" i="1">
+                              <a:latin typeface="Cambria Math" panose="02040503050406030204" pitchFamily="18" charset="0"/>
+                            </a:rPr>
+                            <m:t>𝑛</m:t>
+                          </m:r>
+                          <m:r>
+                            <a:rPr lang="ja-JP" altLang="en-US" i="1">
+                              <a:latin typeface="Cambria Math" panose="02040503050406030204" pitchFamily="18" charset="0"/>
+                            </a:rPr>
+                            <m:t>次元</m:t>
+                          </m:r>
+                          <m:r>
+                            <a:rPr lang="ja-JP" altLang="en-US" i="1">
+                              <a:latin typeface="Cambria Math" panose="02040503050406030204" pitchFamily="18" charset="0"/>
+                            </a:rPr>
+                            <m:t>複素</m:t>
+                          </m:r>
+                          <m:r>
+                            <a:rPr lang="ja-JP" altLang="en-US" i="1">
+                              <a:latin typeface="Cambria Math" panose="02040503050406030204" pitchFamily="18" charset="0"/>
+                            </a:rPr>
+                            <m:t>ベクトル</m:t>
+                          </m:r>
+                          <m:r>
+                            <a:rPr lang="ja-JP" altLang="en-US" i="1">
+                              <a:latin typeface="Cambria Math" panose="02040503050406030204" pitchFamily="18" charset="0"/>
+                            </a:rPr>
+                            <m:t>空間</m:t>
+                          </m:r>
+                        </m:e>
+                      </m:d>
+                      <m:r>
+                        <a:rPr lang="en-US" altLang="ja-JP" i="1">
+                          <a:latin typeface="Cambria Math" panose="02040503050406030204" pitchFamily="18" charset="0"/>
+                        </a:rPr>
+                        <m:t>, </m:t>
+                      </m:r>
+                      <m:r>
+                        <a:rPr lang="en-US" altLang="ja-JP" i="1">
+                          <a:latin typeface="Cambria Math" panose="02040503050406030204" pitchFamily="18" charset="0"/>
+                          <a:ea typeface="Cambria Math" panose="02040503050406030204" pitchFamily="18" charset="0"/>
+                        </a:rPr>
+                        <m:t>𝜐</m:t>
+                      </m:r>
+                      <m:r>
+                        <a:rPr lang="en-US" altLang="ja-JP" i="1">
+                          <a:latin typeface="Cambria Math" panose="02040503050406030204" pitchFamily="18" charset="0"/>
+                          <a:ea typeface="Cambria Math" panose="02040503050406030204" pitchFamily="18" charset="0"/>
+                        </a:rPr>
+                        <m:t>∈</m:t>
+                      </m:r>
+                      <m:r>
+                        <m:rPr>
+                          <m:sty m:val="p"/>
+                        </m:rPr>
+                        <a:rPr lang="en-US" altLang="ja-JP" i="0">
+                          <a:latin typeface="Cambria Math" panose="02040503050406030204" pitchFamily="18" charset="0"/>
+                          <a:ea typeface="Cambria Math" panose="02040503050406030204" pitchFamily="18" charset="0"/>
+                        </a:rPr>
+                        <m:t>X</m:t>
+                      </m:r>
+                      <m:r>
+                        <a:rPr lang="en-US" altLang="ja-JP" i="1">
+                          <a:latin typeface="Cambria Math" panose="02040503050406030204" pitchFamily="18" charset="0"/>
+                          <a:ea typeface="Cambria Math" panose="02040503050406030204" pitchFamily="18" charset="0"/>
+                        </a:rPr>
+                        <m:t>,</m:t>
+                      </m:r>
+                      <m:r>
+                        <a:rPr lang="en-US" altLang="ja-JP" i="1">
+                          <a:latin typeface="Cambria Math" panose="02040503050406030204" pitchFamily="18" charset="0"/>
+                          <a:ea typeface="Cambria Math" panose="02040503050406030204" pitchFamily="18" charset="0"/>
+                        </a:rPr>
+                        <m:t>𝐴</m:t>
+                      </m:r>
+                      <m:r>
+                        <a:rPr lang="en-US" altLang="ja-JP" i="1">
+                          <a:latin typeface="Cambria Math" panose="02040503050406030204" pitchFamily="18" charset="0"/>
+                          <a:ea typeface="Cambria Math" panose="02040503050406030204" pitchFamily="18" charset="0"/>
+                        </a:rPr>
+                        <m:t>∈</m:t>
+                      </m:r>
+                      <m:r>
+                        <a:rPr lang="en-US" altLang="ja-JP" i="1">
+                          <a:latin typeface="Cambria Math" panose="02040503050406030204" pitchFamily="18" charset="0"/>
+                          <a:ea typeface="Cambria Math" panose="02040503050406030204" pitchFamily="18" charset="0"/>
+                        </a:rPr>
+                        <m:t>𝐺𝐿</m:t>
+                      </m:r>
+                      <m:d>
+                        <m:dPr>
+                          <m:ctrlPr>
+                            <a:rPr lang="en-US" altLang="ja-JP" i="1">
+                              <a:latin typeface="Cambria Math" panose="02040503050406030204" pitchFamily="18" charset="0"/>
+                              <a:ea typeface="Cambria Math" panose="02040503050406030204" pitchFamily="18" charset="0"/>
+                            </a:rPr>
+                          </m:ctrlPr>
+                        </m:dPr>
+                        <m:e>
+                          <m:r>
+                            <a:rPr lang="en-US" altLang="ja-JP" i="1">
+                              <a:latin typeface="Cambria Math" panose="02040503050406030204" pitchFamily="18" charset="0"/>
+                              <a:ea typeface="Cambria Math" panose="02040503050406030204" pitchFamily="18" charset="0"/>
+                            </a:rPr>
+                            <m:t>𝑛</m:t>
+                          </m:r>
+                          <m:r>
+                            <a:rPr lang="en-US" altLang="ja-JP" i="1">
+                              <a:latin typeface="Cambria Math" panose="02040503050406030204" pitchFamily="18" charset="0"/>
+                              <a:ea typeface="Cambria Math" panose="02040503050406030204" pitchFamily="18" charset="0"/>
+                            </a:rPr>
+                            <m:t>;</m:t>
+                          </m:r>
+                          <m:r>
+                            <a:rPr lang="en-US" altLang="ja-JP" i="1">
+                              <a:latin typeface="Cambria Math" panose="02040503050406030204" pitchFamily="18" charset="0"/>
+                              <a:ea typeface="Cambria Math" panose="02040503050406030204" pitchFamily="18" charset="0"/>
+                            </a:rPr>
+                            <m:t>ℂ</m:t>
+                          </m:r>
+                        </m:e>
+                      </m:d>
+                      <m:r>
+                        <a:rPr lang="en-US" altLang="ja-JP">
+                          <a:latin typeface="Cambria Math" panose="02040503050406030204" pitchFamily="18" charset="0"/>
+                          <a:ea typeface="Cambria Math" panose="02040503050406030204" pitchFamily="18" charset="0"/>
+                        </a:rPr>
+                        <m:t>, </m:t>
+                      </m:r>
+                      <m:r>
+                        <m:rPr>
+                          <m:sty m:val="p"/>
+                        </m:rPr>
+                        <a:rPr lang="en-US" altLang="ja-JP">
+                          <a:latin typeface="Cambria Math" panose="02040503050406030204" pitchFamily="18" charset="0"/>
+                          <a:ea typeface="Cambria Math" panose="02040503050406030204" pitchFamily="18" charset="0"/>
+                        </a:rPr>
+                        <m:t>A</m:t>
+                      </m:r>
+                      <m:r>
+                        <a:rPr lang="en-US" altLang="ja-JP" i="1">
+                          <a:latin typeface="Cambria Math" panose="02040503050406030204" pitchFamily="18" charset="0"/>
+                          <a:ea typeface="Cambria Math" panose="02040503050406030204" pitchFamily="18" charset="0"/>
+                        </a:rPr>
+                        <m:t>⋅</m:t>
+                      </m:r>
+                      <m:r>
+                        <a:rPr lang="en-US" altLang="ja-JP" i="1">
+                          <a:latin typeface="Cambria Math" panose="02040503050406030204" pitchFamily="18" charset="0"/>
+                          <a:ea typeface="Cambria Math" panose="02040503050406030204" pitchFamily="18" charset="0"/>
+                        </a:rPr>
+                        <m:t>𝜐</m:t>
+                      </m:r>
+                      <m:r>
+                        <a:rPr lang="en-US" altLang="ja-JP">
+                          <a:latin typeface="Cambria Math" panose="02040503050406030204" pitchFamily="18" charset="0"/>
+                          <a:ea typeface="Cambria Math" panose="02040503050406030204" pitchFamily="18" charset="0"/>
+                        </a:rPr>
+                        <m:t>=</m:t>
+                      </m:r>
+                      <m:r>
+                        <m:rPr>
+                          <m:sty m:val="p"/>
+                        </m:rPr>
+                        <a:rPr lang="en-US" altLang="ja-JP">
+                          <a:latin typeface="Cambria Math" panose="02040503050406030204" pitchFamily="18" charset="0"/>
+                          <a:ea typeface="Cambria Math" panose="02040503050406030204" pitchFamily="18" charset="0"/>
+                        </a:rPr>
+                        <m:t>A</m:t>
+                      </m:r>
+                      <m:r>
+                        <a:rPr lang="en-US" altLang="ja-JP" i="1">
+                          <a:latin typeface="Cambria Math" panose="02040503050406030204" pitchFamily="18" charset="0"/>
+                          <a:ea typeface="Cambria Math" panose="02040503050406030204" pitchFamily="18" charset="0"/>
+                        </a:rPr>
+                        <m:t>𝜐</m:t>
+                      </m:r>
+                    </m:oMath>
+                  </m:oMathPara>
+                </a14:m>
+                <a:endParaRPr lang="en-US" altLang="ja-JP" dirty="0"/>
+              </a:p>
+              <a:p>
+                <a:pPr marL="0" lvl="0" indent="0">
+                  <a:buNone/>
+                </a:pPr>
+                <a:r>
+                  <a:rPr lang="ja-JP" altLang="en-US"/>
+                  <a:t>とした時，写像・を</a:t>
+                </a:r>
+                <a14:m>
+                  <m:oMath xmlns:m="http://schemas.openxmlformats.org/officeDocument/2006/math">
+                    <m:r>
+                      <a:rPr lang="en-US" altLang="ja-JP" b="0" i="0" smtClean="0">
+                        <a:latin typeface="Cambria Math" panose="02040503050406030204" pitchFamily="18" charset="0"/>
+                        <a:ea typeface="Cambria Math" panose="02040503050406030204" pitchFamily="18" charset="0"/>
+                      </a:rPr>
+                      <m:t>(</m:t>
+                    </m:r>
+                    <m:r>
+                      <m:rPr>
+                        <m:sty m:val="p"/>
+                      </m:rPr>
+                      <a:rPr lang="en-US" altLang="ja-JP" b="0" i="0" smtClean="0">
+                        <a:latin typeface="Cambria Math" panose="02040503050406030204" pitchFamily="18" charset="0"/>
+                        <a:ea typeface="Cambria Math" panose="02040503050406030204" pitchFamily="18" charset="0"/>
+                      </a:rPr>
+                      <m:t>GL</m:t>
+                    </m:r>
+                    <m:d>
+                      <m:dPr>
+                        <m:ctrlPr>
+                          <a:rPr lang="en-US" altLang="ja-JP" b="0" i="0" smtClean="0">
+                            <a:latin typeface="Cambria Math" panose="02040503050406030204" pitchFamily="18" charset="0"/>
+                            <a:ea typeface="Cambria Math" panose="02040503050406030204" pitchFamily="18" charset="0"/>
+                          </a:rPr>
+                        </m:ctrlPr>
+                      </m:dPr>
+                      <m:e>
+                        <m:r>
+                          <m:rPr>
+                            <m:sty m:val="p"/>
+                          </m:rPr>
+                          <a:rPr lang="en-US" altLang="ja-JP" b="0" i="0" smtClean="0">
+                            <a:latin typeface="Cambria Math" panose="02040503050406030204" pitchFamily="18" charset="0"/>
+                            <a:ea typeface="Cambria Math" panose="02040503050406030204" pitchFamily="18" charset="0"/>
+                          </a:rPr>
+                          <m:t>n</m:t>
+                        </m:r>
+                        <m:r>
+                          <a:rPr lang="en-US" altLang="ja-JP" b="0" i="0" smtClean="0">
+                            <a:latin typeface="Cambria Math" panose="02040503050406030204" pitchFamily="18" charset="0"/>
+                            <a:ea typeface="Cambria Math" panose="02040503050406030204" pitchFamily="18" charset="0"/>
+                          </a:rPr>
+                          <m:t>;</m:t>
+                        </m:r>
+                        <m:r>
+                          <a:rPr lang="en-US" altLang="ja-JP" i="1">
+                            <a:latin typeface="Cambria Math" panose="02040503050406030204" pitchFamily="18" charset="0"/>
+                            <a:ea typeface="Cambria Math" panose="02040503050406030204" pitchFamily="18" charset="0"/>
+                          </a:rPr>
+                          <m:t>ℂ</m:t>
+                        </m:r>
+                      </m:e>
+                    </m:d>
+                    <m:r>
+                      <a:rPr lang="en-US" altLang="ja-JP" b="0" i="0" smtClean="0">
+                        <a:latin typeface="Cambria Math" panose="02040503050406030204" pitchFamily="18" charset="0"/>
+                        <a:ea typeface="Cambria Math" panose="02040503050406030204" pitchFamily="18" charset="0"/>
+                      </a:rPr>
+                      <m:t>, </m:t>
+                    </m:r>
+                    <m:r>
+                      <a:rPr lang="en-US" altLang="ja-JP" b="0" i="1" smtClean="0">
+                        <a:latin typeface="Cambria Math" panose="02040503050406030204" pitchFamily="18" charset="0"/>
+                        <a:ea typeface="Cambria Math" panose="02040503050406030204" pitchFamily="18" charset="0"/>
+                      </a:rPr>
+                      <m:t>∙</m:t>
+                    </m:r>
+                    <m:r>
+                      <a:rPr lang="en-US" altLang="ja-JP" b="0" i="0" smtClean="0">
+                        <a:latin typeface="Cambria Math" panose="02040503050406030204" pitchFamily="18" charset="0"/>
+                        <a:ea typeface="Cambria Math" panose="02040503050406030204" pitchFamily="18" charset="0"/>
+                      </a:rPr>
+                      <m:t>)</m:t>
+                    </m:r>
+                  </m:oMath>
+                </a14:m>
+                <a:r>
+                  <a:rPr lang="ja-JP" altLang="en-US"/>
+                  <a:t>の</a:t>
+                </a:r>
+                <a14:m>
+                  <m:oMath xmlns:m="http://schemas.openxmlformats.org/officeDocument/2006/math">
+                    <m:r>
+                      <m:rPr>
+                        <m:sty m:val="p"/>
+                      </m:rPr>
+                      <a:rPr lang="en-US" altLang="ja-JP" b="0" i="0" smtClean="0">
+                        <a:latin typeface="Cambria Math" panose="02040503050406030204" pitchFamily="18" charset="0"/>
+                      </a:rPr>
+                      <m:t>X</m:t>
+                    </m:r>
+                  </m:oMath>
+                </a14:m>
+                <a:r>
+                  <a:rPr lang="ja-JP" altLang="en-US"/>
+                  <a:t>への作用と定義できる．</a:t>
+                </a:r>
+                <a:endParaRPr lang="en-US" altLang="ja-JP" dirty="0"/>
+              </a:p>
+              <a:p>
+                <a:pPr marL="0" lvl="0" indent="0">
+                  <a:buNone/>
+                </a:pPr>
+                <a:endParaRPr lang="en-US" altLang="ja-JP" dirty="0"/>
+              </a:p>
+              <a:p>
+                <a:pPr marL="0" lvl="0" indent="0">
+                  <a:buNone/>
+                </a:pPr>
+                <a:r>
+                  <a:rPr lang="en-US" altLang="ja-JP" dirty="0"/>
+                  <a:t>【</a:t>
+                </a:r>
+                <a:r>
+                  <a:rPr lang="ja-JP" altLang="en-US"/>
+                  <a:t>群の作用であることを確認する</a:t>
+                </a:r>
+                <a:r>
+                  <a:rPr lang="en-US" altLang="ja-JP" dirty="0"/>
+                  <a:t>】</a:t>
+                </a:r>
+              </a:p>
+              <a:p>
+                <a:pPr lvl="0" indent="-457200">
+                  <a:buAutoNum type="arabicPeriod"/>
+                </a:pPr>
+                <a14:m>
+                  <m:oMath xmlns:m="http://schemas.openxmlformats.org/officeDocument/2006/math">
+                    <m:r>
+                      <m:rPr>
+                        <m:sty m:val="p"/>
+                      </m:rPr>
+                      <a:rPr lang="en-US" altLang="ja-JP" i="0">
+                        <a:latin typeface="Cambria Math" panose="02040503050406030204" pitchFamily="18" charset="0"/>
+                      </a:rPr>
+                      <m:t>A</m:t>
+                    </m:r>
+                    <m:r>
+                      <a:rPr lang="en-US" altLang="ja-JP" i="0">
+                        <a:latin typeface="Cambria Math" panose="02040503050406030204" pitchFamily="18" charset="0"/>
+                        <a:ea typeface="Cambria Math" panose="02040503050406030204" pitchFamily="18" charset="0"/>
+                      </a:rPr>
+                      <m:t>⋅</m:t>
+                    </m:r>
+                    <m:d>
+                      <m:dPr>
+                        <m:ctrlPr>
+                          <a:rPr lang="en-US" altLang="ja-JP">
+                            <a:latin typeface="Cambria Math" panose="02040503050406030204" pitchFamily="18" charset="0"/>
+                          </a:rPr>
+                        </m:ctrlPr>
+                      </m:dPr>
+                      <m:e>
+                        <m:r>
+                          <m:rPr>
+                            <m:sty m:val="p"/>
+                          </m:rPr>
+                          <a:rPr lang="en-US" altLang="ja-JP" i="0">
+                            <a:latin typeface="Cambria Math" panose="02040503050406030204" pitchFamily="18" charset="0"/>
+                          </a:rPr>
+                          <m:t>B</m:t>
+                        </m:r>
+                        <m:r>
+                          <a:rPr lang="en-US" altLang="ja-JP" i="0">
+                            <a:latin typeface="Cambria Math" panose="02040503050406030204" pitchFamily="18" charset="0"/>
+                            <a:ea typeface="Cambria Math" panose="02040503050406030204" pitchFamily="18" charset="0"/>
+                          </a:rPr>
+                          <m:t>⋅</m:t>
+                        </m:r>
+                        <m:r>
+                          <m:rPr>
+                            <m:sty m:val="p"/>
+                          </m:rPr>
+                          <a:rPr lang="en-US" altLang="ja-JP" i="0">
+                            <a:latin typeface="Cambria Math" panose="02040503050406030204" pitchFamily="18" charset="0"/>
+                            <a:ea typeface="Cambria Math" panose="02040503050406030204" pitchFamily="18" charset="0"/>
+                          </a:rPr>
+                          <m:t>υ</m:t>
+                        </m:r>
+                      </m:e>
+                    </m:d>
+                    <m:r>
+                      <a:rPr lang="en-US" altLang="ja-JP" i="0">
+                        <a:latin typeface="Cambria Math" panose="02040503050406030204" pitchFamily="18" charset="0"/>
+                      </a:rPr>
+                      <m:t>=</m:t>
+                    </m:r>
+                    <m:r>
+                      <m:rPr>
+                        <m:sty m:val="p"/>
+                      </m:rPr>
+                      <a:rPr lang="en-US" altLang="ja-JP" i="0">
+                        <a:latin typeface="Cambria Math" panose="02040503050406030204" pitchFamily="18" charset="0"/>
+                      </a:rPr>
+                      <m:t>A</m:t>
+                    </m:r>
+                    <m:d>
+                      <m:dPr>
+                        <m:ctrlPr>
+                          <a:rPr lang="en-US" altLang="ja-JP">
+                            <a:latin typeface="Cambria Math" panose="02040503050406030204" pitchFamily="18" charset="0"/>
+                          </a:rPr>
+                        </m:ctrlPr>
+                      </m:dPr>
+                      <m:e>
+                        <m:r>
+                          <m:rPr>
+                            <m:sty m:val="p"/>
+                          </m:rPr>
+                          <a:rPr lang="en-US" altLang="ja-JP" i="0">
+                            <a:latin typeface="Cambria Math" panose="02040503050406030204" pitchFamily="18" charset="0"/>
+                          </a:rPr>
+                          <m:t>B</m:t>
+                        </m:r>
+                        <m:r>
+                          <m:rPr>
+                            <m:sty m:val="p"/>
+                          </m:rPr>
+                          <a:rPr lang="en-US" altLang="ja-JP" i="0">
+                            <a:latin typeface="Cambria Math" panose="02040503050406030204" pitchFamily="18" charset="0"/>
+                            <a:ea typeface="Cambria Math" panose="02040503050406030204" pitchFamily="18" charset="0"/>
+                          </a:rPr>
+                          <m:t>υ</m:t>
+                        </m:r>
+                      </m:e>
+                    </m:d>
+                    <m:r>
+                      <a:rPr lang="en-US" altLang="ja-JP" i="0">
+                        <a:latin typeface="Cambria Math" panose="02040503050406030204" pitchFamily="18" charset="0"/>
+                        <a:ea typeface="Cambria Math" panose="02040503050406030204" pitchFamily="18" charset="0"/>
+                      </a:rPr>
+                      <m:t>=</m:t>
+                    </m:r>
+                    <m:d>
+                      <m:dPr>
+                        <m:ctrlPr>
+                          <a:rPr lang="en-US" altLang="ja-JP">
+                            <a:latin typeface="Cambria Math" panose="02040503050406030204" pitchFamily="18" charset="0"/>
+                            <a:ea typeface="Cambria Math" panose="02040503050406030204" pitchFamily="18" charset="0"/>
+                          </a:rPr>
+                        </m:ctrlPr>
+                      </m:dPr>
+                      <m:e>
+                        <m:r>
+                          <m:rPr>
+                            <m:sty m:val="p"/>
+                          </m:rPr>
+                          <a:rPr lang="en-US" altLang="ja-JP" i="0">
+                            <a:latin typeface="Cambria Math" panose="02040503050406030204" pitchFamily="18" charset="0"/>
+                            <a:ea typeface="Cambria Math" panose="02040503050406030204" pitchFamily="18" charset="0"/>
+                          </a:rPr>
+                          <m:t>AB</m:t>
+                        </m:r>
+                      </m:e>
+                    </m:d>
+                    <m:r>
+                      <m:rPr>
+                        <m:sty m:val="p"/>
+                      </m:rPr>
+                      <a:rPr lang="en-US" altLang="ja-JP" i="0">
+                        <a:latin typeface="Cambria Math" panose="02040503050406030204" pitchFamily="18" charset="0"/>
+                        <a:ea typeface="Cambria Math" panose="02040503050406030204" pitchFamily="18" charset="0"/>
+                      </a:rPr>
+                      <m:t>υ</m:t>
+                    </m:r>
+                    <m:r>
+                      <a:rPr lang="en-US" altLang="ja-JP" i="0">
+                        <a:latin typeface="Cambria Math" panose="02040503050406030204" pitchFamily="18" charset="0"/>
+                        <a:ea typeface="Cambria Math" panose="02040503050406030204" pitchFamily="18" charset="0"/>
+                      </a:rPr>
+                      <m:t>=</m:t>
+                    </m:r>
+                    <m:d>
+                      <m:dPr>
+                        <m:ctrlPr>
+                          <a:rPr lang="en-US" altLang="ja-JP" i="0">
+                            <a:latin typeface="Cambria Math" panose="02040503050406030204" pitchFamily="18" charset="0"/>
+                            <a:ea typeface="Cambria Math" panose="02040503050406030204" pitchFamily="18" charset="0"/>
+                          </a:rPr>
+                        </m:ctrlPr>
+                      </m:dPr>
+                      <m:e>
+                        <m:r>
+                          <m:rPr>
+                            <m:sty m:val="p"/>
+                          </m:rPr>
+                          <a:rPr lang="en-US" altLang="ja-JP" i="0">
+                            <a:latin typeface="Cambria Math" panose="02040503050406030204" pitchFamily="18" charset="0"/>
+                            <a:ea typeface="Cambria Math" panose="02040503050406030204" pitchFamily="18" charset="0"/>
+                          </a:rPr>
+                          <m:t>AB</m:t>
+                        </m:r>
+                      </m:e>
+                    </m:d>
+                    <m:r>
+                      <a:rPr lang="en-US" altLang="ja-JP" i="0">
+                        <a:latin typeface="Cambria Math" panose="02040503050406030204" pitchFamily="18" charset="0"/>
+                        <a:ea typeface="Cambria Math" panose="02040503050406030204" pitchFamily="18" charset="0"/>
+                      </a:rPr>
+                      <m:t>⋅</m:t>
+                    </m:r>
+                    <m:r>
+                      <m:rPr>
+                        <m:sty m:val="p"/>
+                      </m:rPr>
+                      <a:rPr lang="en-US" altLang="ja-JP" i="0">
+                        <a:latin typeface="Cambria Math" panose="02040503050406030204" pitchFamily="18" charset="0"/>
+                        <a:ea typeface="Cambria Math" panose="02040503050406030204" pitchFamily="18" charset="0"/>
+                      </a:rPr>
+                      <m:t>υ</m:t>
+                    </m:r>
+                  </m:oMath>
+                </a14:m>
+                <a:br>
+                  <a:rPr lang="en-US" altLang="ja-JP" dirty="0"/>
+                </a:br>
+                <a:r>
+                  <a:rPr lang="en-US" altLang="ja-JP" dirty="0">
+                    <a:solidFill>
+                      <a:schemeClr val="tx1">
+                        <a:lumMod val="50000"/>
+                        <a:lumOff val="50000"/>
+                      </a:schemeClr>
+                    </a:solidFill>
+                  </a:rPr>
+                  <a:t>	</a:t>
+                </a:r>
+                <a:r>
+                  <a:rPr lang="ja-JP" altLang="en-US">
+                    <a:solidFill>
+                      <a:schemeClr val="tx1">
+                        <a:lumMod val="50000"/>
+                        <a:lumOff val="50000"/>
+                      </a:schemeClr>
+                    </a:solidFill>
+                  </a:rPr>
+                  <a:t>行列の結合則から</a:t>
+                </a:r>
+                <a:endParaRPr lang="en-US" altLang="ja-JP" dirty="0">
+                  <a:solidFill>
+                    <a:schemeClr val="tx1">
+                      <a:lumMod val="50000"/>
+                      <a:lumOff val="50000"/>
+                    </a:schemeClr>
+                  </a:solidFill>
+                </a:endParaRPr>
+              </a:p>
+              <a:p>
+                <a:pPr lvl="0" indent="-457200">
+                  <a:buAutoNum type="arabicPeriod"/>
+                </a:pPr>
+                <a:r>
+                  <a:rPr lang="ja-JP" altLang="en-US"/>
+                  <a:t>単位元を単位行列とすれば明らか</a:t>
+                </a:r>
+                <a:endParaRPr lang="en-US" altLang="ja-JP" dirty="0"/>
+              </a:p>
+              <a:p>
+                <a:endParaRPr kumimoji="1" lang="ja-JP" altLang="en-US"/>
+              </a:p>
+            </p:txBody>
+          </p:sp>
+        </mc:Choice>
+        <mc:Fallback>
+          <p:sp>
+            <p:nvSpPr>
+              <p:cNvPr id="3" name="コンテンツ プレースホルダー 2">
+                <a:extLst>
+                  <a:ext uri="{FF2B5EF4-FFF2-40B4-BE49-F238E27FC236}">
+                    <a16:creationId xmlns:a16="http://schemas.microsoft.com/office/drawing/2014/main" id="{6D3C7657-74B5-A549-BC53-0ECF18D2E85B}"/>
+                  </a:ext>
+                </a:extLst>
+              </p:cNvPr>
+              <p:cNvSpPr>
+                <a:spLocks noGrp="1" noRot="1" noChangeAspect="1" noMove="1" noResize="1" noEditPoints="1" noAdjustHandles="1" noChangeArrowheads="1" noChangeShapeType="1" noTextEdit="1"/>
+              </p:cNvSpPr>
+              <p:nvPr>
+                <p:ph idx="1"/>
+              </p:nvPr>
+            </p:nvSpPr>
+            <p:spPr>
+              <a:blipFill>
+                <a:blip r:embed="rId2"/>
+                <a:stretch>
+                  <a:fillRect l="-1206" t="-1170"/>
+                </a:stretch>
+              </a:blipFill>
+            </p:spPr>
+            <p:txBody>
+              <a:bodyPr/>
+              <a:lstStyle/>
+              <a:p>
+                <a:r>
+                  <a:rPr lang="ja-JP" altLang="en-US">
+                    <a:noFill/>
+                  </a:rPr>
+                  <a:t> </a:t>
+                </a:r>
+              </a:p>
+            </p:txBody>
+          </p:sp>
+        </mc:Fallback>
+      </mc:AlternateContent>
+    </p:spTree>
+    <p:extLst>
+      <p:ext uri="{BB962C8B-B14F-4D97-AF65-F5344CB8AC3E}">
+        <p14:creationId xmlns:p14="http://schemas.microsoft.com/office/powerpoint/2010/main" val="4191570318"/>
+      </p:ext>
+    </p:extLst>
+  </p:cSld>
+  <p:clrMapOvr>
+    <a:masterClrMapping/>
+  </p:clrMapOvr>
+</p:sld>
+</file>
+
+<file path=ppt/slides/slide19.xml><?xml version="1.0" encoding="utf-8"?>
+<p:sld xmlns:a="http://schemas.openxmlformats.org/drawingml/2006/main" xmlns:r="http://schemas.openxmlformats.org/officeDocument/2006/relationships" xmlns:p="http://schemas.openxmlformats.org/presentationml/2006/main">
+  <p:cSld>
+    <p:spTree>
+      <p:nvGrpSpPr>
+        <p:cNvPr id="1" name="Shape 399"/>
+        <p:cNvGrpSpPr/>
+        <p:nvPr/>
+      </p:nvGrpSpPr>
+      <p:grpSpPr>
+        <a:xfrm>
+          <a:off x="0" y="0"/>
+          <a:ext cx="0" cy="0"/>
+          <a:chOff x="0" y="0"/>
+          <a:chExt cx="0" cy="0"/>
+        </a:xfrm>
+      </p:grpSpPr>
+      <mc:AlternateContent xmlns:mc="http://schemas.openxmlformats.org/markup-compatibility/2006">
+        <mc:Choice xmlns:a14="http://schemas.microsoft.com/office/drawing/2010/main" Requires="a14">
+          <p:sp>
+            <p:nvSpPr>
+              <p:cNvPr id="400" name="Google Shape;400;p70"/>
+              <p:cNvSpPr txBox="1">
+                <a:spLocks noGrp="1"/>
+              </p:cNvSpPr>
+              <p:nvPr>
+                <p:ph type="body" idx="1"/>
+              </p:nvPr>
+            </p:nvSpPr>
+            <p:spPr>
+              <a:xfrm>
+                <a:off x="838200" y="1363891"/>
+                <a:ext cx="10515600" cy="5117931"/>
+              </a:xfrm>
+              <a:prstGeom prst="rect">
+                <a:avLst/>
+              </a:prstGeom>
+            </p:spPr>
+            <p:txBody>
+              <a:bodyPr spcFirstLastPara="1" vert="horz" wrap="square" lIns="91433" tIns="45700" rIns="91433" bIns="45700" rtlCol="0" anchor="t" anchorCtr="0">
+                <a:noAutofit/>
+              </a:bodyPr>
+              <a:lstStyle/>
+              <a:p>
+                <a:pPr marL="0" indent="0">
+                  <a:spcBef>
+                    <a:spcPts val="1067"/>
+                  </a:spcBef>
+                  <a:buNone/>
+                </a:pPr>
+                <a:r>
+                  <a:rPr lang="fr-CA" altLang="ja" dirty="0"/>
+                  <a:t>A,B:2</a:t>
+                </a:r>
+                <a:r>
+                  <a:rPr lang="ja-JP" altLang="en-US" dirty="0"/>
+                  <a:t>次直交行列，</a:t>
+                </a:r>
+                <a:r>
+                  <a:rPr lang="fr-CA" altLang="ja" dirty="0"/>
+                  <a:t>v,w</a:t>
+                </a:r>
+                <a:r>
+                  <a:rPr lang="fr-CA" altLang="ja" dirty="0">
+                    <a:highlight>
+                      <a:srgbClr val="FFFFFF"/>
+                    </a:highlight>
+                  </a:rPr>
+                  <a:t>∈R^2</a:t>
+                </a:r>
+                <a:endParaRPr lang="fr-CA" dirty="0">
+                  <a:highlight>
+                    <a:srgbClr val="FFFFFF"/>
+                  </a:highlight>
+                </a:endParaRPr>
+              </a:p>
+              <a:p>
+                <a:pPr marL="0" indent="0">
+                  <a:spcBef>
+                    <a:spcPts val="1067"/>
+                  </a:spcBef>
+                  <a:buNone/>
+                </a:pPr>
+                <a:endParaRPr lang="fr-CA" dirty="0">
+                  <a:highlight>
+                    <a:srgbClr val="FFFFFF"/>
+                  </a:highlight>
+                </a:endParaRPr>
+              </a:p>
+              <a:p>
+                <a:pPr marL="0" indent="0">
+                  <a:spcBef>
+                    <a:spcPts val="1067"/>
+                  </a:spcBef>
+                  <a:buNone/>
+                </a:pPr>
+                <a:r>
+                  <a:rPr lang="fr-CA" altLang="ja" dirty="0">
+                    <a:highlight>
+                      <a:srgbClr val="FFFFFF"/>
+                    </a:highlight>
+                  </a:rPr>
+                  <a:t>(A,v)</a:t>
+                </a:r>
+                <a:r>
+                  <a:rPr lang="ja" altLang="fr-CA" dirty="0">
+                    <a:highlight>
+                      <a:srgbClr val="FFFFFF"/>
+                    </a:highlight>
+                  </a:rPr>
+                  <a:t>・</a:t>
+                </a:r>
+                <a:r>
+                  <a:rPr lang="fr-CA" altLang="ja" dirty="0">
+                    <a:highlight>
+                      <a:srgbClr val="FFFFFF"/>
+                    </a:highlight>
+                  </a:rPr>
+                  <a:t>(B,w)=(AB,Av+w)</a:t>
+                </a:r>
+                <a:endParaRPr lang="fr-CA" dirty="0">
+                  <a:highlight>
+                    <a:srgbClr val="FFFFFF"/>
+                  </a:highlight>
+                </a:endParaRPr>
+              </a:p>
+              <a:p>
+                <a:pPr marL="0" indent="0">
+                  <a:spcBef>
+                    <a:spcPts val="1067"/>
+                  </a:spcBef>
+                  <a:buNone/>
+                </a:pPr>
+                <a:r>
+                  <a:rPr lang="ja-JP" altLang="en-US" dirty="0">
+                    <a:highlight>
+                      <a:srgbClr val="FFFFFF"/>
+                    </a:highlight>
+                  </a:rPr>
+                  <a:t>を２次元ユークリッド合同変換群</a:t>
+                </a:r>
+                <a:r>
+                  <a:rPr lang="en-US" altLang="ja-JP" dirty="0">
+                    <a:highlight>
+                      <a:srgbClr val="FFFFFF"/>
+                    </a:highlight>
+                  </a:rPr>
+                  <a:t>(</a:t>
+                </a:r>
+                <a:r>
+                  <a:rPr lang="fr-CA" altLang="ja" dirty="0">
+                    <a:highlight>
+                      <a:srgbClr val="FFFFFF"/>
+                    </a:highlight>
+                  </a:rPr>
+                  <a:t>E(2),</a:t>
+                </a:r>
+                <a:r>
+                  <a:rPr lang="ja" altLang="fr-CA" dirty="0">
+                    <a:highlight>
+                      <a:srgbClr val="FFFFFF"/>
+                    </a:highlight>
+                  </a:rPr>
+                  <a:t>・</a:t>
+                </a:r>
+                <a:r>
+                  <a:rPr lang="fr-CA" altLang="ja" dirty="0">
+                    <a:highlight>
+                      <a:srgbClr val="FFFFFF"/>
+                    </a:highlight>
+                  </a:rPr>
+                  <a:t>)</a:t>
+                </a:r>
+                <a:r>
+                  <a:rPr lang="ja-JP" altLang="en-US" dirty="0">
+                    <a:highlight>
+                      <a:srgbClr val="FFFFFF"/>
+                    </a:highlight>
+                  </a:rPr>
+                  <a:t>という</a:t>
+                </a:r>
+              </a:p>
+              <a:p>
+                <a:pPr marL="0" indent="0">
+                  <a:spcBef>
+                    <a:spcPts val="1067"/>
+                  </a:spcBef>
+                  <a:buNone/>
+                </a:pPr>
+                <a:endParaRPr lang="ja-JP" altLang="en-US" dirty="0">
+                  <a:highlight>
+                    <a:srgbClr val="FFFFFF"/>
+                  </a:highlight>
+                </a:endParaRPr>
+              </a:p>
+              <a:p>
+                <a:pPr marL="0" indent="0">
+                  <a:spcBef>
+                    <a:spcPts val="1067"/>
+                  </a:spcBef>
+                  <a:buNone/>
+                </a:pPr>
+                <a:r>
+                  <a:rPr lang="ja-JP" altLang="en-US" dirty="0">
+                    <a:highlight>
+                      <a:srgbClr val="FFFFFF"/>
+                    </a:highlight>
+                  </a:rPr>
+                  <a:t>これが群であるには</a:t>
+                </a:r>
+              </a:p>
+              <a:p>
+                <a:pPr marL="609585" indent="-423323">
+                  <a:spcBef>
+                    <a:spcPts val="1067"/>
+                  </a:spcBef>
+                  <a:buSzPts val="1400"/>
+                  <a:buChar char="-"/>
+                </a:pPr>
+                <a:r>
+                  <a:rPr lang="fr-CA" altLang="ja" dirty="0">
+                    <a:highlight>
+                      <a:srgbClr val="FFFFFF"/>
+                    </a:highlight>
+                  </a:rPr>
+                  <a:t>A,B,C(:</a:t>
+                </a:r>
+                <a:r>
+                  <a:rPr lang="ja-JP" altLang="en-US" dirty="0">
+                    <a:highlight>
+                      <a:srgbClr val="FFFFFF"/>
+                    </a:highlight>
+                  </a:rPr>
+                  <a:t>直交行列</a:t>
+                </a:r>
+                <a:r>
+                  <a:rPr lang="en-US" altLang="ja-JP" dirty="0">
+                    <a:highlight>
+                      <a:srgbClr val="FFFFFF"/>
+                    </a:highlight>
+                  </a:rPr>
+                  <a:t>)</a:t>
+                </a:r>
+                <a:r>
+                  <a:rPr lang="ja-JP" altLang="en-US" dirty="0">
+                    <a:highlight>
+                      <a:srgbClr val="FFFFFF"/>
+                    </a:highlight>
+                  </a:rPr>
+                  <a:t>と</a:t>
+                </a:r>
+                <a:r>
+                  <a:rPr lang="fr-CA" altLang="ja" dirty="0">
+                    <a:highlight>
+                      <a:srgbClr val="FFFFFF"/>
+                    </a:highlight>
+                  </a:rPr>
+                  <a:t>u,v,w∈R^2</a:t>
+                </a:r>
+                <a:r>
+                  <a:rPr lang="ja-JP" altLang="en-US" dirty="0">
+                    <a:highlight>
+                      <a:srgbClr val="FFFFFF"/>
+                    </a:highlight>
+                  </a:rPr>
+                  <a:t>を用いて結合則が成立する</a:t>
+                </a:r>
+              </a:p>
+              <a:p>
+                <a:pPr marL="609585" indent="-423323">
+                  <a:spcBef>
+                    <a:spcPts val="0"/>
+                  </a:spcBef>
+                  <a:buSzPts val="1400"/>
+                  <a:buChar char="-"/>
+                </a:pPr>
+                <a:r>
+                  <a:rPr lang="ja-JP" altLang="en-US" dirty="0">
+                    <a:highlight>
+                      <a:srgbClr val="FFFFFF"/>
+                    </a:highlight>
+                  </a:rPr>
+                  <a:t>単位元が</a:t>
+                </a:r>
+                <a:r>
+                  <a:rPr lang="en-US" altLang="ja-JP" dirty="0">
+                    <a:highlight>
+                      <a:srgbClr val="FFFFFF"/>
+                    </a:highlight>
+                  </a:rPr>
+                  <a:t>(</a:t>
+                </a:r>
+                <a:r>
+                  <a:rPr lang="fr-CA" altLang="ja" dirty="0">
+                    <a:highlight>
+                      <a:srgbClr val="FFFFFF"/>
+                    </a:highlight>
+                  </a:rPr>
+                  <a:t>I,0)</a:t>
+                </a:r>
+                <a:r>
+                  <a:rPr lang="ja-JP" altLang="en-US" dirty="0">
+                    <a:highlight>
+                      <a:srgbClr val="FFFFFF"/>
+                    </a:highlight>
+                  </a:rPr>
+                  <a:t>である</a:t>
+                </a:r>
+              </a:p>
+              <a:p>
+                <a:pPr marL="609585" indent="-423323">
+                  <a:spcBef>
+                    <a:spcPts val="0"/>
+                  </a:spcBef>
+                  <a:buSzPts val="1400"/>
+                  <a:buChar char="-"/>
+                </a:pPr>
+                <a:r>
+                  <a:rPr lang="ja-JP" altLang="en-US" dirty="0">
+                    <a:highlight>
+                      <a:srgbClr val="FFFFFF"/>
+                    </a:highlight>
+                  </a:rPr>
+                  <a:t>逆元が</a:t>
+                </a:r>
+                <a14:m>
+                  <m:oMath xmlns:m="http://schemas.openxmlformats.org/officeDocument/2006/math">
+                    <m:sSup>
+                      <m:sSupPr>
+                        <m:ctrlPr>
+                          <a:rPr lang="ar-AE" altLang="ja" i="1" smtClean="0">
+                            <a:highlight>
+                              <a:srgbClr val="FFFFFF"/>
+                            </a:highlight>
+                            <a:latin typeface="Cambria Math" panose="02040503050406030204" pitchFamily="18" charset="0"/>
+                          </a:rPr>
+                        </m:ctrlPr>
+                      </m:sSupPr>
+                      <m:e>
+                        <m:r>
+                          <a:rPr lang="en-US" altLang="ja" b="0" i="1" smtClean="0">
+                            <a:highlight>
+                              <a:srgbClr val="FFFFFF"/>
+                            </a:highlight>
+                            <a:latin typeface="Cambria Math" panose="02040503050406030204" pitchFamily="18" charset="0"/>
+                          </a:rPr>
+                          <m:t>(</m:t>
+                        </m:r>
+                        <m:r>
+                          <a:rPr lang="ar-AE" altLang="ja" b="0" i="1" smtClean="0">
+                            <a:highlight>
+                              <a:srgbClr val="FFFFFF"/>
+                            </a:highlight>
+                            <a:latin typeface="Cambria Math" panose="02040503050406030204" pitchFamily="18" charset="0"/>
+                          </a:rPr>
+                          <m:t>𝐴</m:t>
+                        </m:r>
+                      </m:e>
+                      <m:sup>
+                        <m:r>
+                          <a:rPr lang="en-US" altLang="ja" b="0" i="1" smtClean="0">
+                            <a:highlight>
+                              <a:srgbClr val="FFFFFF"/>
+                            </a:highlight>
+                            <a:latin typeface="Cambria Math" panose="02040503050406030204" pitchFamily="18" charset="0"/>
+                          </a:rPr>
+                          <m:t>−1</m:t>
+                        </m:r>
+                      </m:sup>
+                    </m:sSup>
+                    <m:r>
+                      <a:rPr lang="en-US" altLang="ja" b="0" i="1" smtClean="0">
+                        <a:highlight>
+                          <a:srgbClr val="FFFFFF"/>
+                        </a:highlight>
+                        <a:latin typeface="Cambria Math" panose="02040503050406030204" pitchFamily="18" charset="0"/>
+                      </a:rPr>
+                      <m:t>,−</m:t>
+                    </m:r>
+                    <m:sSup>
+                      <m:sSupPr>
+                        <m:ctrlPr>
+                          <a:rPr lang="en-US" altLang="ja" b="0" i="1" smtClean="0">
+                            <a:highlight>
+                              <a:srgbClr val="FFFFFF"/>
+                            </a:highlight>
+                            <a:latin typeface="Cambria Math" panose="02040503050406030204" pitchFamily="18" charset="0"/>
+                          </a:rPr>
+                        </m:ctrlPr>
+                      </m:sSupPr>
+                      <m:e>
+                        <m:r>
+                          <a:rPr lang="en-US" altLang="ja" b="0" i="1" smtClean="0">
+                            <a:highlight>
+                              <a:srgbClr val="FFFFFF"/>
+                            </a:highlight>
+                            <a:latin typeface="Cambria Math" panose="02040503050406030204" pitchFamily="18" charset="0"/>
+                          </a:rPr>
+                          <m:t>𝐴</m:t>
+                        </m:r>
+                      </m:e>
+                      <m:sup>
+                        <m:r>
+                          <a:rPr lang="en-US" altLang="ja" b="0" i="1" smtClean="0">
+                            <a:highlight>
+                              <a:srgbClr val="FFFFFF"/>
+                            </a:highlight>
+                            <a:latin typeface="Cambria Math" panose="02040503050406030204" pitchFamily="18" charset="0"/>
+                          </a:rPr>
+                          <m:t>−1</m:t>
+                        </m:r>
+                      </m:sup>
+                    </m:sSup>
+                    <m:r>
+                      <a:rPr lang="en-US" altLang="ja" b="0" i="1" smtClean="0">
+                        <a:highlight>
+                          <a:srgbClr val="FFFFFF"/>
+                        </a:highlight>
+                        <a:latin typeface="Cambria Math" panose="02040503050406030204" pitchFamily="18" charset="0"/>
+                      </a:rPr>
+                      <m:t>𝑣</m:t>
+                    </m:r>
+                    <m:r>
+                      <a:rPr lang="en-US" altLang="ja" b="0" i="0" smtClean="0">
+                        <a:highlight>
+                          <a:srgbClr val="FFFFFF"/>
+                        </a:highlight>
+                        <a:latin typeface="Cambria Math" panose="02040503050406030204" pitchFamily="18" charset="0"/>
+                      </a:rPr>
+                      <m:t>)</m:t>
+                    </m:r>
+                  </m:oMath>
+                </a14:m>
+                <a:r>
+                  <a:rPr lang="ja-JP" altLang="en-US" dirty="0">
+                    <a:highlight>
+                      <a:srgbClr val="FFFFFF"/>
+                    </a:highlight>
+                  </a:rPr>
+                  <a:t>である</a:t>
+                </a:r>
+              </a:p>
+              <a:p>
+                <a:pPr marL="0" indent="0">
+                  <a:spcBef>
+                    <a:spcPts val="1067"/>
+                  </a:spcBef>
+                  <a:buNone/>
+                </a:pPr>
+                <a:r>
+                  <a:rPr lang="ja-JP" altLang="en-US" dirty="0">
+                    <a:highlight>
+                      <a:srgbClr val="FFFFFF"/>
+                    </a:highlight>
+                  </a:rPr>
+                  <a:t>の３つを満たしていることを確認すればよい</a:t>
+                </a:r>
+                <a:endParaRPr dirty="0">
+                  <a:highlight>
+                    <a:srgbClr val="FFFFFF"/>
+                  </a:highlight>
+                </a:endParaRPr>
+              </a:p>
+            </p:txBody>
+          </p:sp>
+        </mc:Choice>
+        <mc:Fallback>
+          <p:sp>
+            <p:nvSpPr>
+              <p:cNvPr id="400" name="Google Shape;400;p70"/>
+              <p:cNvSpPr txBox="1">
+                <a:spLocks noGrp="1" noRot="1" noChangeAspect="1" noMove="1" noResize="1" noEditPoints="1" noAdjustHandles="1" noChangeArrowheads="1" noChangeShapeType="1" noTextEdit="1"/>
+              </p:cNvSpPr>
+              <p:nvPr>
+                <p:ph type="body" idx="1"/>
+              </p:nvPr>
+            </p:nvSpPr>
+            <p:spPr>
+              <a:xfrm>
+                <a:off x="838200" y="1363891"/>
+                <a:ext cx="10515600" cy="5117931"/>
+              </a:xfrm>
+              <a:prstGeom prst="rect">
+                <a:avLst/>
+              </a:prstGeom>
+              <a:blipFill>
+                <a:blip r:embed="rId3"/>
+                <a:stretch>
+                  <a:fillRect l="-1086" b="-2228"/>
+                </a:stretch>
+              </a:blipFill>
+            </p:spPr>
+            <p:txBody>
+              <a:bodyPr/>
+              <a:lstStyle/>
+              <a:p>
+                <a:r>
+                  <a:rPr lang="ja-JP" altLang="en-US">
+                    <a:noFill/>
+                  </a:rPr>
+                  <a:t> </a:t>
+                </a:r>
+              </a:p>
+            </p:txBody>
+          </p:sp>
+        </mc:Fallback>
+      </mc:AlternateContent>
+      <p:sp>
+        <p:nvSpPr>
+          <p:cNvPr id="401" name="Google Shape;401;p70"/>
+          <p:cNvSpPr txBox="1">
+            <a:spLocks noGrp="1"/>
+          </p:cNvSpPr>
+          <p:nvPr>
+            <p:ph type="title"/>
+          </p:nvPr>
+        </p:nvSpPr>
+        <p:spPr>
+          <a:xfrm>
+            <a:off x="838200" y="38292"/>
+            <a:ext cx="10515600" cy="1325600"/>
+          </a:xfrm>
+          <a:prstGeom prst="rect">
+            <a:avLst/>
+          </a:prstGeom>
+        </p:spPr>
+        <p:txBody>
+          <a:bodyPr spcFirstLastPara="1" vert="horz" wrap="square" lIns="91433" tIns="45700" rIns="91433" bIns="45700" rtlCol="0" anchor="ctr" anchorCtr="0">
+            <a:noAutofit/>
+          </a:bodyPr>
+          <a:lstStyle/>
+          <a:p>
+            <a:pPr>
+              <a:spcBef>
+                <a:spcPts val="0"/>
+              </a:spcBef>
+            </a:pPr>
+            <a:r>
+              <a:rPr lang="ja" dirty="0"/>
+              <a:t>２次元ユークリッド合同変換群</a:t>
+            </a:r>
+            <a:r>
+              <a:rPr lang="en-US" altLang="ja" sz="2400" i="1" dirty="0">
+                <a:solidFill>
+                  <a:schemeClr val="tx1">
+                    <a:lumMod val="65000"/>
+                    <a:lumOff val="35000"/>
+                  </a:schemeClr>
+                </a:solidFill>
+                <a:latin typeface="Times New Roman" panose="02020603050405020304" pitchFamily="18" charset="0"/>
+                <a:cs typeface="Times New Roman" panose="02020603050405020304" pitchFamily="18" charset="0"/>
+              </a:rPr>
+              <a:t>Euclidean group</a:t>
+            </a:r>
+            <a:endParaRPr i="1" dirty="0">
+              <a:solidFill>
+                <a:schemeClr val="tx1">
+                  <a:lumMod val="65000"/>
+                  <a:lumOff val="35000"/>
+                </a:schemeClr>
+              </a:solidFill>
+              <a:latin typeface="Times New Roman" panose="02020603050405020304" pitchFamily="18" charset="0"/>
+              <a:cs typeface="Times New Roman" panose="02020603050405020304" pitchFamily="18" charset="0"/>
+            </a:endParaRPr>
+          </a:p>
+        </p:txBody>
+      </p:sp>
+    </p:spTree>
+    <p:extLst>
+      <p:ext uri="{BB962C8B-B14F-4D97-AF65-F5344CB8AC3E}">
+        <p14:creationId xmlns:p14="http://schemas.microsoft.com/office/powerpoint/2010/main" val="2429960"/>
       </p:ext>
     </p:extLst>
   </p:cSld>

</xml_diff>

<commit_message>
chore(群の気持ち) update what's group?
</commit_message>
<xml_diff>
--- a/群の気持ち.pptx
+++ b/群の気持ち.pptx
@@ -5,28 +5,29 @@
     <p:sldMasterId id="2147483648" r:id="rId1"/>
   </p:sldMasterIdLst>
   <p:notesMasterIdLst>
-    <p:notesMasterId r:id="rId21"/>
+    <p:notesMasterId r:id="rId22"/>
   </p:notesMasterIdLst>
   <p:sldIdLst>
     <p:sldId id="256" r:id="rId2"/>
     <p:sldId id="257" r:id="rId3"/>
     <p:sldId id="267" r:id="rId4"/>
-    <p:sldId id="269" r:id="rId5"/>
+    <p:sldId id="306" r:id="rId5"/>
     <p:sldId id="268" r:id="rId6"/>
     <p:sldId id="261" r:id="rId7"/>
     <p:sldId id="260" r:id="rId8"/>
-    <p:sldId id="298" r:id="rId9"/>
-    <p:sldId id="266" r:id="rId10"/>
-    <p:sldId id="299" r:id="rId11"/>
-    <p:sldId id="262" r:id="rId12"/>
-    <p:sldId id="263" r:id="rId13"/>
-    <p:sldId id="293" r:id="rId14"/>
-    <p:sldId id="300" r:id="rId15"/>
-    <p:sldId id="301" r:id="rId16"/>
-    <p:sldId id="297" r:id="rId17"/>
+    <p:sldId id="299" r:id="rId9"/>
+    <p:sldId id="262" r:id="rId10"/>
+    <p:sldId id="263" r:id="rId11"/>
+    <p:sldId id="293" r:id="rId12"/>
+    <p:sldId id="300" r:id="rId13"/>
+    <p:sldId id="301" r:id="rId14"/>
+    <p:sldId id="297" r:id="rId15"/>
+    <p:sldId id="305" r:id="rId16"/>
+    <p:sldId id="266" r:id="rId17"/>
     <p:sldId id="302" r:id="rId18"/>
     <p:sldId id="303" r:id="rId19"/>
     <p:sldId id="304" r:id="rId20"/>
+    <p:sldId id="298" r:id="rId21"/>
   </p:sldIdLst>
   <p:sldSz cx="12192000" cy="6858000"/>
   <p:notesSz cx="6858000" cy="9144000"/>
@@ -733,6 +734,115 @@
 </file>
 
 <file path=ppt/notesSlides/notesSlide3.xml><?xml version="1.0" encoding="utf-8"?>
+<p:notes xmlns:a="http://schemas.openxmlformats.org/drawingml/2006/main" xmlns:r="http://schemas.openxmlformats.org/officeDocument/2006/relationships" xmlns:p="http://schemas.openxmlformats.org/presentationml/2006/main" showMasterSp="0" showMasterPhAnim="0">
+  <p:cSld>
+    <p:spTree>
+      <p:nvGrpSpPr>
+        <p:cNvPr id="1" name="Shape 378"/>
+        <p:cNvGrpSpPr/>
+        <p:nvPr/>
+      </p:nvGrpSpPr>
+      <p:grpSpPr>
+        <a:xfrm>
+          <a:off x="0" y="0"/>
+          <a:ext cx="0" cy="0"/>
+          <a:chOff x="0" y="0"/>
+          <a:chExt cx="0" cy="0"/>
+        </a:xfrm>
+      </p:grpSpPr>
+      <p:sp>
+        <p:nvSpPr>
+          <p:cNvPr id="379" name="Google Shape;379;g5f765d7e0f_0_106:notes"/>
+          <p:cNvSpPr>
+            <a:spLocks noGrp="1" noRot="1" noChangeAspect="1"/>
+          </p:cNvSpPr>
+          <p:nvPr>
+            <p:ph type="sldImg" idx="2"/>
+          </p:nvPr>
+        </p:nvSpPr>
+        <p:spPr>
+          <a:xfrm>
+            <a:off x="381000" y="685800"/>
+            <a:ext cx="6096000" cy="3429000"/>
+          </a:xfrm>
+          <a:custGeom>
+            <a:avLst/>
+            <a:gdLst/>
+            <a:ahLst/>
+            <a:cxnLst/>
+            <a:rect l="l" t="t" r="r" b="b"/>
+            <a:pathLst>
+              <a:path w="120000" h="120000" extrusionOk="0">
+                <a:moveTo>
+                  <a:pt x="0" y="0"/>
+                </a:moveTo>
+                <a:lnTo>
+                  <a:pt x="120000" y="0"/>
+                </a:lnTo>
+                <a:lnTo>
+                  <a:pt x="120000" y="120000"/>
+                </a:lnTo>
+                <a:lnTo>
+                  <a:pt x="0" y="120000"/>
+                </a:lnTo>
+                <a:close/>
+              </a:path>
+            </a:pathLst>
+          </a:custGeom>
+        </p:spPr>
+      </p:sp>
+      <p:sp>
+        <p:nvSpPr>
+          <p:cNvPr id="380" name="Google Shape;380;g5f765d7e0f_0_106:notes"/>
+          <p:cNvSpPr txBox="1">
+            <a:spLocks noGrp="1"/>
+          </p:cNvSpPr>
+          <p:nvPr>
+            <p:ph type="body" idx="1"/>
+          </p:nvPr>
+        </p:nvSpPr>
+        <p:spPr>
+          <a:xfrm>
+            <a:off x="685800" y="4343400"/>
+            <a:ext cx="5486400" cy="4114800"/>
+          </a:xfrm>
+          <a:prstGeom prst="rect">
+            <a:avLst/>
+          </a:prstGeom>
+        </p:spPr>
+        <p:txBody>
+          <a:bodyPr spcFirstLastPara="1" wrap="square" lIns="91425" tIns="91425" rIns="91425" bIns="91425" anchor="t" anchorCtr="0">
+            <a:noAutofit/>
+          </a:bodyPr>
+          <a:lstStyle/>
+          <a:p>
+            <a:pPr marL="0" lvl="0" indent="0" algn="l" rtl="0">
+              <a:spcBef>
+                <a:spcPts val="0"/>
+              </a:spcBef>
+              <a:spcAft>
+                <a:spcPts val="0"/>
+              </a:spcAft>
+              <a:buNone/>
+            </a:pPr>
+            <a:endParaRPr/>
+          </a:p>
+        </p:txBody>
+      </p:sp>
+    </p:spTree>
+    <p:extLst>
+      <p:ext uri="{BB962C8B-B14F-4D97-AF65-F5344CB8AC3E}">
+        <p14:creationId xmlns:p14="http://schemas.microsoft.com/office/powerpoint/2010/main" val="439678527"/>
+      </p:ext>
+    </p:extLst>
+  </p:cSld>
+  <p:clrMapOvr>
+    <a:masterClrMapping/>
+  </p:clrMapOvr>
+</p:notes>
+</file>
+
+<file path=ppt/notesSlides/notesSlide4.xml><?xml version="1.0" encoding="utf-8"?>
 <p:notes xmlns:a="http://schemas.openxmlformats.org/drawingml/2006/main" xmlns:r="http://schemas.openxmlformats.org/officeDocument/2006/relationships" xmlns:p="http://schemas.openxmlformats.org/presentationml/2006/main">
   <p:cSld>
     <p:spTree>
@@ -816,7 +926,7 @@
 </p:notes>
 </file>
 
-<file path=ppt/notesSlides/notesSlide4.xml><?xml version="1.0" encoding="utf-8"?>
+<file path=ppt/notesSlides/notesSlide5.xml><?xml version="1.0" encoding="utf-8"?>
 <p:notes xmlns:a="http://schemas.openxmlformats.org/drawingml/2006/main" xmlns:r="http://schemas.openxmlformats.org/officeDocument/2006/relationships" xmlns:p="http://schemas.openxmlformats.org/presentationml/2006/main" showMasterSp="0" showMasterPhAnim="0">
   <p:cSld>
     <p:spTree>
@@ -4524,1176 +4634,6 @@
           <p:cNvPr id="2" name="タイトル 1">
             <a:extLst>
               <a:ext uri="{FF2B5EF4-FFF2-40B4-BE49-F238E27FC236}">
-                <a16:creationId xmlns:a16="http://schemas.microsoft.com/office/drawing/2014/main" id="{F74B3020-F4CD-5E4A-A772-CCD193FF28DB}"/>
-              </a:ext>
-            </a:extLst>
-          </p:cNvPr>
-          <p:cNvSpPr>
-            <a:spLocks noGrp="1"/>
-          </p:cNvSpPr>
-          <p:nvPr>
-            <p:ph type="title"/>
-          </p:nvPr>
-        </p:nvSpPr>
-        <p:spPr/>
-        <p:txBody>
-          <a:bodyPr/>
-          <a:lstStyle/>
-          <a:p>
-            <a:r>
-              <a:rPr kumimoji="1" lang="ja-JP" altLang="en-US"/>
-              <a:t>群の定義を見ていく</a:t>
-            </a:r>
-          </a:p>
-        </p:txBody>
-      </p:sp>
-      <mc:AlternateContent xmlns:mc="http://schemas.openxmlformats.org/markup-compatibility/2006">
-        <mc:Choice xmlns:a14="http://schemas.microsoft.com/office/drawing/2010/main" Requires="a14">
-          <p:sp>
-            <p:nvSpPr>
-              <p:cNvPr id="3" name="コンテンツ プレースホルダー 2">
-                <a:extLst>
-                  <a:ext uri="{FF2B5EF4-FFF2-40B4-BE49-F238E27FC236}">
-                    <a16:creationId xmlns:a16="http://schemas.microsoft.com/office/drawing/2014/main" id="{9409C43E-6ED9-F742-9D17-57ABED493EBF}"/>
-                  </a:ext>
-                </a:extLst>
-              </p:cNvPr>
-              <p:cNvSpPr>
-                <a:spLocks noGrp="1"/>
-              </p:cNvSpPr>
-              <p:nvPr>
-                <p:ph idx="1"/>
-              </p:nvPr>
-            </p:nvSpPr>
-            <p:spPr/>
-            <p:txBody>
-              <a:bodyPr/>
-              <a:lstStyle/>
-              <a:p>
-                <a:r>
-                  <a:rPr kumimoji="1" lang="ja-JP" altLang="en-US"/>
-                  <a:t>群の定義</a:t>
-                </a:r>
-                <a:endParaRPr kumimoji="1" lang="en-US" altLang="ja-JP" dirty="0"/>
-              </a:p>
-              <a:p>
-                <a:r>
-                  <a:rPr lang="ja-JP" altLang="en-US"/>
-                  <a:t>群の派生</a:t>
-                </a:r>
-                <a:endParaRPr lang="en-US" altLang="ja-JP" dirty="0"/>
-              </a:p>
-              <a:p>
-                <a:r>
-                  <a:rPr kumimoji="1" lang="ja-JP" altLang="en-US"/>
-                  <a:t>群の例：</a:t>
-                </a:r>
-                <a:r>
-                  <a:rPr lang="fr-CA" altLang="ja" dirty="0"/>
-                  <a:t> </a:t>
-                </a:r>
-                <a14:m>
-                  <m:oMath xmlns:m="http://schemas.openxmlformats.org/officeDocument/2006/math">
-                    <m:r>
-                      <m:rPr>
-                        <m:sty m:val="p"/>
-                      </m:rPr>
-                      <a:rPr lang="fr-CA" altLang="ja">
-                        <a:latin typeface="Cambria Math" panose="02040503050406030204" pitchFamily="18" charset="0"/>
-                      </a:rPr>
-                      <m:t>G</m:t>
-                    </m:r>
-                    <m:r>
-                      <m:rPr>
-                        <m:sty m:val="p"/>
-                      </m:rPr>
-                      <a:rPr lang="en-US" altLang="ja">
-                        <a:latin typeface="Cambria Math" panose="02040503050406030204" pitchFamily="18" charset="0"/>
-                      </a:rPr>
-                      <m:t>L</m:t>
-                    </m:r>
-                    <m:d>
-                      <m:dPr>
-                        <m:ctrlPr>
-                          <a:rPr lang="en-US" altLang="ja" i="1">
-                            <a:latin typeface="Cambria Math" panose="02040503050406030204" pitchFamily="18" charset="0"/>
-                          </a:rPr>
-                        </m:ctrlPr>
-                      </m:dPr>
-                      <m:e>
-                        <m:r>
-                          <m:rPr>
-                            <m:sty m:val="p"/>
-                          </m:rPr>
-                          <a:rPr lang="en-US" altLang="ja">
-                            <a:latin typeface="Cambria Math" panose="02040503050406030204" pitchFamily="18" charset="0"/>
-                          </a:rPr>
-                          <m:t>n</m:t>
-                        </m:r>
-                        <m:r>
-                          <a:rPr lang="en-US" altLang="ja">
-                            <a:latin typeface="Cambria Math" panose="02040503050406030204" pitchFamily="18" charset="0"/>
-                          </a:rPr>
-                          <m:t>;</m:t>
-                        </m:r>
-                        <m:r>
-                          <a:rPr lang="en-US" altLang="ja">
-                            <a:latin typeface="Cambria Math" panose="02040503050406030204" pitchFamily="18" charset="0"/>
-                            <a:ea typeface="Cambria Math" panose="02040503050406030204" pitchFamily="18" charset="0"/>
-                          </a:rPr>
-                          <m:t>ℂ</m:t>
-                        </m:r>
-                      </m:e>
-                    </m:d>
-                  </m:oMath>
-                </a14:m>
-                <a:endParaRPr kumimoji="1" lang="en-US" altLang="ja-JP" dirty="0"/>
-              </a:p>
-              <a:p>
-                <a:r>
-                  <a:rPr lang="ja-JP" altLang="en-US"/>
-                  <a:t>部分群</a:t>
-                </a:r>
-                <a:endParaRPr lang="en-US" altLang="ja-JP" dirty="0"/>
-              </a:p>
-              <a:p>
-                <a:pPr lvl="1"/>
-                <a:r>
-                  <a:rPr kumimoji="1" lang="ja-JP" altLang="en-US"/>
-                  <a:t>定義</a:t>
-                </a:r>
-                <a:r>
-                  <a:rPr lang="ja-JP" altLang="en-US"/>
-                  <a:t>・性質</a:t>
-                </a:r>
-                <a:endParaRPr lang="en-US" altLang="ja-JP" dirty="0"/>
-              </a:p>
-              <a:p>
-                <a:pPr lvl="1"/>
-                <a:r>
-                  <a:rPr kumimoji="1" lang="ja-JP" altLang="en-US"/>
-                  <a:t>例：</a:t>
-                </a:r>
-                <a:r>
-                  <a:rPr lang="en-US" altLang="ja-JP" dirty="0"/>
-                  <a:t> </a:t>
-                </a:r>
-                <a14:m>
-                  <m:oMath xmlns:m="http://schemas.openxmlformats.org/officeDocument/2006/math">
-                    <m:r>
-                      <m:rPr>
-                        <m:sty m:val="p"/>
-                      </m:rPr>
-                      <a:rPr lang="en-US" altLang="ja-JP">
-                        <a:latin typeface="Cambria Math" panose="02040503050406030204" pitchFamily="18" charset="0"/>
-                      </a:rPr>
-                      <m:t>O</m:t>
-                    </m:r>
-                    <m:d>
-                      <m:dPr>
-                        <m:ctrlPr>
-                          <a:rPr lang="en-US" altLang="ja" i="1">
-                            <a:latin typeface="Cambria Math" panose="02040503050406030204" pitchFamily="18" charset="0"/>
-                          </a:rPr>
-                        </m:ctrlPr>
-                      </m:dPr>
-                      <m:e>
-                        <m:r>
-                          <m:rPr>
-                            <m:sty m:val="p"/>
-                          </m:rPr>
-                          <a:rPr lang="en-US" altLang="ja">
-                            <a:latin typeface="Cambria Math" panose="02040503050406030204" pitchFamily="18" charset="0"/>
-                          </a:rPr>
-                          <m:t>n</m:t>
-                        </m:r>
-                      </m:e>
-                    </m:d>
-                    <m:r>
-                      <a:rPr lang="en-US" altLang="ja" i="1">
-                        <a:latin typeface="Cambria Math" panose="02040503050406030204" pitchFamily="18" charset="0"/>
-                        <a:ea typeface="Cambria Math" panose="02040503050406030204" pitchFamily="18" charset="0"/>
-                      </a:rPr>
-                      <m:t> </m:t>
-                    </m:r>
-                  </m:oMath>
-                </a14:m>
-                <a:endParaRPr kumimoji="1" lang="en-US" altLang="ja-JP" dirty="0"/>
-              </a:p>
-              <a:p>
-                <a:r>
-                  <a:rPr lang="ja-JP" altLang="en-US"/>
-                  <a:t>群の作用</a:t>
-                </a:r>
-                <a:endParaRPr lang="en-US" altLang="ja-JP" dirty="0"/>
-              </a:p>
-              <a:p>
-                <a:pPr lvl="1"/>
-                <a:r>
-                  <a:rPr lang="ja-JP" altLang="en-US"/>
-                  <a:t>定義</a:t>
-                </a:r>
-                <a:endParaRPr lang="en-US" altLang="ja-JP" dirty="0"/>
-              </a:p>
-              <a:p>
-                <a:pPr lvl="1"/>
-                <a:r>
-                  <a:rPr lang="ja-JP" altLang="en-US"/>
-                  <a:t>例：</a:t>
-                </a:r>
-                <a:endParaRPr lang="en-US" altLang="ja-JP" dirty="0"/>
-              </a:p>
-            </p:txBody>
-          </p:sp>
-        </mc:Choice>
-        <mc:Fallback>
-          <p:sp>
-            <p:nvSpPr>
-              <p:cNvPr id="3" name="コンテンツ プレースホルダー 2">
-                <a:extLst>
-                  <a:ext uri="{FF2B5EF4-FFF2-40B4-BE49-F238E27FC236}">
-                    <a16:creationId xmlns:a16="http://schemas.microsoft.com/office/drawing/2014/main" id="{9409C43E-6ED9-F742-9D17-57ABED493EBF}"/>
-                  </a:ext>
-                </a:extLst>
-              </p:cNvPr>
-              <p:cNvSpPr>
-                <a:spLocks noGrp="1" noRot="1" noChangeAspect="1" noMove="1" noResize="1" noEditPoints="1" noAdjustHandles="1" noChangeArrowheads="1" noChangeShapeType="1" noTextEdit="1"/>
-              </p:cNvSpPr>
-              <p:nvPr>
-                <p:ph idx="1"/>
-              </p:nvPr>
-            </p:nvSpPr>
-            <p:spPr>
-              <a:blipFill>
-                <a:blip r:embed="rId2"/>
-                <a:stretch>
-                  <a:fillRect l="-965" t="-2632"/>
-                </a:stretch>
-              </a:blipFill>
-            </p:spPr>
-            <p:txBody>
-              <a:bodyPr/>
-              <a:lstStyle/>
-              <a:p>
-                <a:r>
-                  <a:rPr lang="ja-JP" altLang="en-US">
-                    <a:noFill/>
-                  </a:rPr>
-                  <a:t> </a:t>
-                </a:r>
-              </a:p>
-            </p:txBody>
-          </p:sp>
-        </mc:Fallback>
-      </mc:AlternateContent>
-    </p:spTree>
-    <p:extLst>
-      <p:ext uri="{BB962C8B-B14F-4D97-AF65-F5344CB8AC3E}">
-        <p14:creationId xmlns:p14="http://schemas.microsoft.com/office/powerpoint/2010/main" val="898711353"/>
-      </p:ext>
-    </p:extLst>
-  </p:cSld>
-  <p:clrMapOvr>
-    <a:masterClrMapping/>
-  </p:clrMapOvr>
-</p:sld>
-</file>
-
-<file path=ppt/slides/slide11.xml><?xml version="1.0" encoding="utf-8"?>
-<p:sld xmlns:a="http://schemas.openxmlformats.org/drawingml/2006/main" xmlns:r="http://schemas.openxmlformats.org/officeDocument/2006/relationships" xmlns:p="http://schemas.openxmlformats.org/presentationml/2006/main">
-  <p:cSld>
-    <p:spTree>
-      <p:nvGrpSpPr>
-        <p:cNvPr id="1" name=""/>
-        <p:cNvGrpSpPr/>
-        <p:nvPr/>
-      </p:nvGrpSpPr>
-      <p:grpSpPr>
-        <a:xfrm>
-          <a:off x="0" y="0"/>
-          <a:ext cx="0" cy="0"/>
-          <a:chOff x="0" y="0"/>
-          <a:chExt cx="0" cy="0"/>
-        </a:xfrm>
-      </p:grpSpPr>
-      <p:sp>
-        <p:nvSpPr>
-          <p:cNvPr id="2" name="タイトル 1">
-            <a:extLst>
-              <a:ext uri="{FF2B5EF4-FFF2-40B4-BE49-F238E27FC236}">
-                <a16:creationId xmlns:a16="http://schemas.microsoft.com/office/drawing/2014/main" id="{0AA80DD3-7B55-5E4C-BC50-93BA664AAE9D}"/>
-              </a:ext>
-            </a:extLst>
-          </p:cNvPr>
-          <p:cNvSpPr>
-            <a:spLocks noGrp="1"/>
-          </p:cNvSpPr>
-          <p:nvPr>
-            <p:ph type="title"/>
-          </p:nvPr>
-        </p:nvSpPr>
-        <p:spPr/>
-        <p:txBody>
-          <a:bodyPr/>
-          <a:lstStyle/>
-          <a:p>
-            <a:r>
-              <a:rPr kumimoji="1" lang="ja-JP" altLang="en-US"/>
-              <a:t>群の定義</a:t>
-            </a:r>
-          </a:p>
-        </p:txBody>
-      </p:sp>
-      <mc:AlternateContent xmlns:mc="http://schemas.openxmlformats.org/markup-compatibility/2006">
-        <mc:Choice xmlns:a14="http://schemas.microsoft.com/office/drawing/2010/main" Requires="a14">
-          <p:sp>
-            <p:nvSpPr>
-              <p:cNvPr id="3" name="コンテンツ プレースホルダー 2">
-                <a:extLst>
-                  <a:ext uri="{FF2B5EF4-FFF2-40B4-BE49-F238E27FC236}">
-                    <a16:creationId xmlns:a16="http://schemas.microsoft.com/office/drawing/2014/main" id="{3DC394E8-B340-1042-958B-08B9A42809D5}"/>
-                  </a:ext>
-                </a:extLst>
-              </p:cNvPr>
-              <p:cNvSpPr>
-                <a:spLocks noGrp="1"/>
-              </p:cNvSpPr>
-              <p:nvPr>
-                <p:ph idx="1"/>
-              </p:nvPr>
-            </p:nvSpPr>
-            <p:spPr>
-              <a:xfrm>
-                <a:off x="838200" y="1342663"/>
-                <a:ext cx="10515600" cy="5031069"/>
-              </a:xfrm>
-            </p:spPr>
-            <p:txBody>
-              <a:bodyPr>
-                <a:normAutofit/>
-              </a:bodyPr>
-              <a:lstStyle/>
-              <a:p>
-                <a:pPr lvl="0">
-                  <a:buAutoNum type="arabicPeriod"/>
-                </a:pPr>
-                <a:r>
-                  <a:rPr lang="ja-JP" altLang="en-US"/>
-                  <a:t>閉包</a:t>
-                </a:r>
-                <a:r>
-                  <a:rPr lang="en-US" altLang="ja-JP" dirty="0"/>
-                  <a:t> </a:t>
-                </a:r>
-                <a:r>
-                  <a:rPr lang="en-US" altLang="ja-JP" sz="2000" i="1" dirty="0">
-                    <a:solidFill>
-                      <a:schemeClr val="tx1">
-                        <a:lumMod val="50000"/>
-                        <a:lumOff val="50000"/>
-                      </a:schemeClr>
-                    </a:solidFill>
-                    <a:latin typeface="Times New Roman" panose="02020603050405020304" pitchFamily="18" charset="0"/>
-                    <a:cs typeface="Times New Roman" panose="02020603050405020304" pitchFamily="18" charset="0"/>
-                  </a:rPr>
-                  <a:t>closure</a:t>
-                </a:r>
-                <a:br>
-                  <a:rPr lang="ja-JP" altLang="en-US"/>
-                </a:br>
-                <a:r>
-                  <a:rPr lang="ja-JP" altLang="en-US"/>
-                  <a:t>　</a:t>
-                </a:r>
-                <a14:m>
-                  <m:oMath xmlns:m="http://schemas.openxmlformats.org/officeDocument/2006/math">
-                    <m:r>
-                      <a:rPr lang="ja-JP" altLang="en-US" i="1">
-                        <a:latin typeface="Cambria Math" panose="02040503050406030204" pitchFamily="18" charset="0"/>
-                      </a:rPr>
-                      <m:t>∀</m:t>
-                    </m:r>
-                    <m:r>
-                      <a:rPr lang="en-US" altLang="ja-JP" i="1">
-                        <a:latin typeface="Cambria Math" panose="02040503050406030204" pitchFamily="18" charset="0"/>
-                      </a:rPr>
-                      <m:t>𝑎</m:t>
-                    </m:r>
-                    <m:r>
-                      <a:rPr lang="en-US" altLang="ja-JP" i="1">
-                        <a:latin typeface="Cambria Math" panose="02040503050406030204" pitchFamily="18" charset="0"/>
-                      </a:rPr>
-                      <m:t>,</m:t>
-                    </m:r>
-                    <m:r>
-                      <a:rPr lang="en-US" altLang="ja-JP" i="1">
-                        <a:latin typeface="Cambria Math" panose="02040503050406030204" pitchFamily="18" charset="0"/>
-                      </a:rPr>
-                      <m:t>𝑏</m:t>
-                    </m:r>
-                    <m:r>
-                      <a:rPr lang="en-US" altLang="ja-JP" i="1">
-                        <a:latin typeface="Cambria Math" panose="02040503050406030204" pitchFamily="18" charset="0"/>
-                        <a:ea typeface="Cambria Math" panose="02040503050406030204" pitchFamily="18" charset="0"/>
-                      </a:rPr>
-                      <m:t>∈</m:t>
-                    </m:r>
-                    <m:r>
-                      <a:rPr lang="en-US" altLang="ja-JP" i="1">
-                        <a:latin typeface="Cambria Math" panose="02040503050406030204" pitchFamily="18" charset="0"/>
-                        <a:ea typeface="Cambria Math" panose="02040503050406030204" pitchFamily="18" charset="0"/>
-                      </a:rPr>
-                      <m:t>𝐺</m:t>
-                    </m:r>
-                    <m:r>
-                      <a:rPr lang="en-US" altLang="ja-JP" i="1">
-                        <a:latin typeface="Cambria Math" panose="02040503050406030204" pitchFamily="18" charset="0"/>
-                        <a:ea typeface="Cambria Math" panose="02040503050406030204" pitchFamily="18" charset="0"/>
-                      </a:rPr>
-                      <m:t>, </m:t>
-                    </m:r>
-                    <m:r>
-                      <a:rPr lang="en-US" altLang="ja-JP" i="1">
-                        <a:latin typeface="Cambria Math" panose="02040503050406030204" pitchFamily="18" charset="0"/>
-                        <a:ea typeface="Cambria Math" panose="02040503050406030204" pitchFamily="18" charset="0"/>
-                      </a:rPr>
-                      <m:t>𝑎𝑏</m:t>
-                    </m:r>
-                    <m:r>
-                      <a:rPr lang="en-US" altLang="ja-JP" i="1">
-                        <a:latin typeface="Cambria Math" panose="02040503050406030204" pitchFamily="18" charset="0"/>
-                        <a:ea typeface="Cambria Math" panose="02040503050406030204" pitchFamily="18" charset="0"/>
-                      </a:rPr>
-                      <m:t>∈</m:t>
-                    </m:r>
-                    <m:r>
-                      <a:rPr lang="en-US" altLang="ja-JP" i="1">
-                        <a:latin typeface="Cambria Math" panose="02040503050406030204" pitchFamily="18" charset="0"/>
-                        <a:ea typeface="Cambria Math" panose="02040503050406030204" pitchFamily="18" charset="0"/>
-                      </a:rPr>
-                      <m:t>𝐺</m:t>
-                    </m:r>
-                  </m:oMath>
-                </a14:m>
-                <a:br>
-                  <a:rPr lang="en-US" altLang="ja-JP" dirty="0"/>
-                </a:br>
-                <a:endParaRPr lang="ja-JP" altLang="en-US" dirty="0"/>
-              </a:p>
-              <a:p>
-                <a:pPr>
-                  <a:buFont typeface="Arial"/>
-                  <a:buAutoNum type="arabicPeriod"/>
-                </a:pPr>
-                <a:r>
-                  <a:rPr lang="ja-JP" altLang="en-US"/>
-                  <a:t>結合法則</a:t>
-                </a:r>
-                <a:r>
-                  <a:rPr lang="en-US" altLang="ja-JP" dirty="0"/>
-                  <a:t> </a:t>
-                </a:r>
-                <a:r>
-                  <a:rPr lang="en-US" altLang="ja-JP" sz="2000" i="1" dirty="0">
-                    <a:solidFill>
-                      <a:schemeClr val="tx1">
-                        <a:lumMod val="50000"/>
-                        <a:lumOff val="50000"/>
-                      </a:schemeClr>
-                    </a:solidFill>
-                    <a:latin typeface="Times New Roman" panose="02020603050405020304" pitchFamily="18" charset="0"/>
-                    <a:cs typeface="Times New Roman" panose="02020603050405020304" pitchFamily="18" charset="0"/>
-                  </a:rPr>
-                  <a:t>associativity</a:t>
-                </a:r>
-                <a:br>
-                  <a:rPr lang="ja-JP" altLang="en-US" dirty="0"/>
-                </a:br>
-                <a:r>
-                  <a:rPr lang="ja-JP" altLang="en-US" dirty="0"/>
-                  <a:t>　</a:t>
-                </a:r>
-                <a14:m>
-                  <m:oMath xmlns:m="http://schemas.openxmlformats.org/officeDocument/2006/math">
-                    <m:r>
-                      <a:rPr lang="ja-JP" altLang="en-US" i="1">
-                        <a:latin typeface="Cambria Math" panose="02040503050406030204" pitchFamily="18" charset="0"/>
-                      </a:rPr>
-                      <m:t>∀</m:t>
-                    </m:r>
-                    <m:r>
-                      <a:rPr lang="en-US" altLang="ja-JP" i="1">
-                        <a:latin typeface="Cambria Math" panose="02040503050406030204" pitchFamily="18" charset="0"/>
-                      </a:rPr>
-                      <m:t>𝑎</m:t>
-                    </m:r>
-                    <m:r>
-                      <a:rPr lang="en-US" altLang="ja-JP" i="1">
-                        <a:latin typeface="Cambria Math" panose="02040503050406030204" pitchFamily="18" charset="0"/>
-                      </a:rPr>
-                      <m:t>,</m:t>
-                    </m:r>
-                    <m:r>
-                      <a:rPr lang="ja-JP" altLang="en-US" i="1">
-                        <a:latin typeface="Cambria Math" panose="02040503050406030204" pitchFamily="18" charset="0"/>
-                      </a:rPr>
-                      <m:t>∀</m:t>
-                    </m:r>
-                    <m:r>
-                      <a:rPr lang="en-US" altLang="ja-JP" i="1">
-                        <a:latin typeface="Cambria Math" panose="02040503050406030204" pitchFamily="18" charset="0"/>
-                      </a:rPr>
-                      <m:t>𝑏</m:t>
-                    </m:r>
-                    <m:r>
-                      <a:rPr lang="en-US" altLang="ja-JP" i="1">
-                        <a:latin typeface="Cambria Math" panose="02040503050406030204" pitchFamily="18" charset="0"/>
-                      </a:rPr>
-                      <m:t>,</m:t>
-                    </m:r>
-                    <m:r>
-                      <a:rPr lang="ja-JP" altLang="en-US" i="1">
-                        <a:latin typeface="Cambria Math" panose="02040503050406030204" pitchFamily="18" charset="0"/>
-                      </a:rPr>
-                      <m:t>∀</m:t>
-                    </m:r>
-                    <m:r>
-                      <a:rPr lang="en-US" altLang="ja-JP" i="1">
-                        <a:latin typeface="Cambria Math" panose="02040503050406030204" pitchFamily="18" charset="0"/>
-                      </a:rPr>
-                      <m:t>𝑐</m:t>
-                    </m:r>
-                    <m:r>
-                      <a:rPr lang="en-US" altLang="ja-JP" i="1">
-                        <a:latin typeface="Cambria Math" panose="02040503050406030204" pitchFamily="18" charset="0"/>
-                        <a:ea typeface="Cambria Math" panose="02040503050406030204" pitchFamily="18" charset="0"/>
-                      </a:rPr>
-                      <m:t>∈</m:t>
-                    </m:r>
-                    <m:r>
-                      <a:rPr lang="en-US" altLang="ja-JP" i="1">
-                        <a:latin typeface="Cambria Math" panose="02040503050406030204" pitchFamily="18" charset="0"/>
-                        <a:ea typeface="Cambria Math" panose="02040503050406030204" pitchFamily="18" charset="0"/>
-                      </a:rPr>
-                      <m:t>𝐺</m:t>
-                    </m:r>
-                    <m:r>
-                      <a:rPr lang="en-US" altLang="ja-JP" i="1">
-                        <a:latin typeface="Cambria Math" panose="02040503050406030204" pitchFamily="18" charset="0"/>
-                        <a:ea typeface="Cambria Math" panose="02040503050406030204" pitchFamily="18" charset="0"/>
-                      </a:rPr>
-                      <m:t>, </m:t>
-                    </m:r>
-                    <m:r>
-                      <a:rPr lang="en-US" altLang="ja-JP" i="1">
-                        <a:latin typeface="Cambria Math" panose="02040503050406030204" pitchFamily="18" charset="0"/>
-                        <a:ea typeface="Cambria Math" panose="02040503050406030204" pitchFamily="18" charset="0"/>
-                      </a:rPr>
-                      <m:t>𝑎</m:t>
-                    </m:r>
-                    <m:r>
-                      <a:rPr lang="en-US" altLang="ja-JP" i="1">
-                        <a:latin typeface="Cambria Math" panose="02040503050406030204" pitchFamily="18" charset="0"/>
-                        <a:ea typeface="Cambria Math" panose="02040503050406030204" pitchFamily="18" charset="0"/>
-                      </a:rPr>
-                      <m:t>∙</m:t>
-                    </m:r>
-                    <m:d>
-                      <m:dPr>
-                        <m:ctrlPr>
-                          <a:rPr lang="en-US" altLang="ja-JP" i="1">
-                            <a:latin typeface="Cambria Math" panose="02040503050406030204" pitchFamily="18" charset="0"/>
-                            <a:ea typeface="Cambria Math" panose="02040503050406030204" pitchFamily="18" charset="0"/>
-                          </a:rPr>
-                        </m:ctrlPr>
-                      </m:dPr>
-                      <m:e>
-                        <m:r>
-                          <a:rPr lang="en-US" altLang="ja-JP" i="1">
-                            <a:latin typeface="Cambria Math" panose="02040503050406030204" pitchFamily="18" charset="0"/>
-                            <a:ea typeface="Cambria Math" panose="02040503050406030204" pitchFamily="18" charset="0"/>
-                          </a:rPr>
-                          <m:t>𝑏</m:t>
-                        </m:r>
-                        <m:r>
-                          <a:rPr lang="en-US" altLang="ja-JP" i="1">
-                            <a:latin typeface="Cambria Math" panose="02040503050406030204" pitchFamily="18" charset="0"/>
-                            <a:ea typeface="Cambria Math" panose="02040503050406030204" pitchFamily="18" charset="0"/>
-                          </a:rPr>
-                          <m:t>∙</m:t>
-                        </m:r>
-                        <m:r>
-                          <a:rPr lang="en-US" altLang="ja-JP" i="1">
-                            <a:latin typeface="Cambria Math" panose="02040503050406030204" pitchFamily="18" charset="0"/>
-                            <a:ea typeface="Cambria Math" panose="02040503050406030204" pitchFamily="18" charset="0"/>
-                          </a:rPr>
-                          <m:t>𝑐</m:t>
-                        </m:r>
-                      </m:e>
-                    </m:d>
-                    <m:r>
-                      <a:rPr lang="en-US" altLang="ja-JP" i="1">
-                        <a:latin typeface="Cambria Math" panose="02040503050406030204" pitchFamily="18" charset="0"/>
-                        <a:ea typeface="Cambria Math" panose="02040503050406030204" pitchFamily="18" charset="0"/>
-                      </a:rPr>
-                      <m:t>=</m:t>
-                    </m:r>
-                    <m:d>
-                      <m:dPr>
-                        <m:ctrlPr>
-                          <a:rPr lang="en-US" altLang="ja-JP" i="1">
-                            <a:latin typeface="Cambria Math" panose="02040503050406030204" pitchFamily="18" charset="0"/>
-                            <a:ea typeface="Cambria Math" panose="02040503050406030204" pitchFamily="18" charset="0"/>
-                          </a:rPr>
-                        </m:ctrlPr>
-                      </m:dPr>
-                      <m:e>
-                        <m:r>
-                          <a:rPr lang="en-US" altLang="ja-JP" i="1">
-                            <a:latin typeface="Cambria Math" panose="02040503050406030204" pitchFamily="18" charset="0"/>
-                            <a:ea typeface="Cambria Math" panose="02040503050406030204" pitchFamily="18" charset="0"/>
-                          </a:rPr>
-                          <m:t>𝑎</m:t>
-                        </m:r>
-                        <m:r>
-                          <a:rPr lang="en-US" altLang="ja-JP" i="1">
-                            <a:latin typeface="Cambria Math" panose="02040503050406030204" pitchFamily="18" charset="0"/>
-                            <a:ea typeface="Cambria Math" panose="02040503050406030204" pitchFamily="18" charset="0"/>
-                          </a:rPr>
-                          <m:t>∙</m:t>
-                        </m:r>
-                        <m:r>
-                          <a:rPr lang="en-US" altLang="ja-JP" i="1">
-                            <a:latin typeface="Cambria Math" panose="02040503050406030204" pitchFamily="18" charset="0"/>
-                            <a:ea typeface="Cambria Math" panose="02040503050406030204" pitchFamily="18" charset="0"/>
-                          </a:rPr>
-                          <m:t>𝑏</m:t>
-                        </m:r>
-                      </m:e>
-                    </m:d>
-                    <m:r>
-                      <a:rPr lang="en-US" altLang="ja-JP" i="1">
-                        <a:latin typeface="Cambria Math" panose="02040503050406030204" pitchFamily="18" charset="0"/>
-                        <a:ea typeface="Cambria Math" panose="02040503050406030204" pitchFamily="18" charset="0"/>
-                      </a:rPr>
-                      <m:t>∙</m:t>
-                    </m:r>
-                    <m:r>
-                      <a:rPr lang="en-US" altLang="ja-JP" i="1">
-                        <a:latin typeface="Cambria Math" panose="02040503050406030204" pitchFamily="18" charset="0"/>
-                        <a:ea typeface="Cambria Math" panose="02040503050406030204" pitchFamily="18" charset="0"/>
-                      </a:rPr>
-                      <m:t>𝑐</m:t>
-                    </m:r>
-                  </m:oMath>
-                </a14:m>
-                <a:br>
-                  <a:rPr lang="en-US" altLang="ja-JP" dirty="0">
-                    <a:ea typeface="Cambria Math" panose="02040503050406030204" pitchFamily="18" charset="0"/>
-                  </a:rPr>
-                </a:br>
-                <a:endParaRPr lang="en-US" altLang="ja-JP" dirty="0">
-                  <a:ea typeface="Cambria Math" panose="02040503050406030204" pitchFamily="18" charset="0"/>
-                </a:endParaRPr>
-              </a:p>
-              <a:p>
-                <a:pPr>
-                  <a:buFont typeface="Arial"/>
-                  <a:buAutoNum type="arabicPeriod"/>
-                </a:pPr>
-                <a:r>
-                  <a:rPr lang="ja-JP" altLang="en-US" dirty="0"/>
-                  <a:t>単位元</a:t>
-                </a:r>
-                <a:r>
-                  <a:rPr lang="ja-JP" altLang="en-US"/>
-                  <a:t>の存在</a:t>
-                </a:r>
-                <a:r>
-                  <a:rPr lang="en-US" altLang="ja-JP" dirty="0"/>
-                  <a:t> </a:t>
-                </a:r>
-                <a:r>
-                  <a:rPr lang="en-US" altLang="ja-JP" sz="2000" i="1" dirty="0">
-                    <a:solidFill>
-                      <a:schemeClr val="tx1">
-                        <a:lumMod val="50000"/>
-                        <a:lumOff val="50000"/>
-                      </a:schemeClr>
-                    </a:solidFill>
-                    <a:latin typeface="Times New Roman" panose="02020603050405020304" pitchFamily="18" charset="0"/>
-                    <a:cs typeface="Times New Roman" panose="02020603050405020304" pitchFamily="18" charset="0"/>
-                  </a:rPr>
-                  <a:t>identity element</a:t>
-                </a:r>
-                <a:br>
-                  <a:rPr lang="en-US" altLang="ja-JP" dirty="0"/>
-                </a:br>
-                <a:r>
-                  <a:rPr lang="ja-JP" altLang="en-US" dirty="0"/>
-                  <a:t>　</a:t>
-                </a:r>
-                <a14:m>
-                  <m:oMath xmlns:m="http://schemas.openxmlformats.org/officeDocument/2006/math">
-                    <m:r>
-                      <a:rPr lang="en-US" altLang="ja-JP" i="1">
-                        <a:latin typeface="Cambria Math" panose="02040503050406030204" pitchFamily="18" charset="0"/>
-                        <a:ea typeface="Cambria Math" panose="02040503050406030204" pitchFamily="18" charset="0"/>
-                      </a:rPr>
-                      <m:t>∃</m:t>
-                    </m:r>
-                    <m:r>
-                      <a:rPr lang="en-US" altLang="ja-JP" i="1">
-                        <a:latin typeface="Cambria Math" panose="02040503050406030204" pitchFamily="18" charset="0"/>
-                        <a:ea typeface="Cambria Math" panose="02040503050406030204" pitchFamily="18" charset="0"/>
-                      </a:rPr>
-                      <m:t>𝑒</m:t>
-                    </m:r>
-                    <m:r>
-                      <a:rPr lang="en-US" altLang="ja-JP" i="1">
-                        <a:latin typeface="Cambria Math" panose="02040503050406030204" pitchFamily="18" charset="0"/>
-                        <a:ea typeface="Cambria Math" panose="02040503050406030204" pitchFamily="18" charset="0"/>
-                      </a:rPr>
-                      <m:t>∈</m:t>
-                    </m:r>
-                    <m:r>
-                      <a:rPr lang="en-US" altLang="ja-JP" i="1">
-                        <a:latin typeface="Cambria Math" panose="02040503050406030204" pitchFamily="18" charset="0"/>
-                        <a:ea typeface="Cambria Math" panose="02040503050406030204" pitchFamily="18" charset="0"/>
-                      </a:rPr>
-                      <m:t>𝐺</m:t>
-                    </m:r>
-                    <m:r>
-                      <a:rPr lang="en-US" altLang="ja-JP" i="1">
-                        <a:latin typeface="Cambria Math" panose="02040503050406030204" pitchFamily="18" charset="0"/>
-                        <a:ea typeface="Cambria Math" panose="02040503050406030204" pitchFamily="18" charset="0"/>
-                      </a:rPr>
-                      <m:t>, </m:t>
-                    </m:r>
-                    <m:r>
-                      <a:rPr lang="ja-JP" altLang="en-US" i="1">
-                        <a:latin typeface="Cambria Math" panose="02040503050406030204" pitchFamily="18" charset="0"/>
-                      </a:rPr>
-                      <m:t>∀</m:t>
-                    </m:r>
-                    <m:r>
-                      <a:rPr lang="en-US" altLang="ja-JP" i="1">
-                        <a:latin typeface="Cambria Math" panose="02040503050406030204" pitchFamily="18" charset="0"/>
-                        <a:ea typeface="Cambria Math" panose="02040503050406030204" pitchFamily="18" charset="0"/>
-                      </a:rPr>
-                      <m:t>𝑎</m:t>
-                    </m:r>
-                    <m:r>
-                      <a:rPr lang="en-US" altLang="ja-JP" i="1">
-                        <a:latin typeface="Cambria Math" panose="02040503050406030204" pitchFamily="18" charset="0"/>
-                        <a:ea typeface="Cambria Math" panose="02040503050406030204" pitchFamily="18" charset="0"/>
-                      </a:rPr>
-                      <m:t>∈</m:t>
-                    </m:r>
-                    <m:r>
-                      <a:rPr lang="en-US" altLang="ja-JP" i="1">
-                        <a:latin typeface="Cambria Math" panose="02040503050406030204" pitchFamily="18" charset="0"/>
-                        <a:ea typeface="Cambria Math" panose="02040503050406030204" pitchFamily="18" charset="0"/>
-                      </a:rPr>
-                      <m:t>𝐺</m:t>
-                    </m:r>
-                    <m:r>
-                      <a:rPr lang="en-US" altLang="ja-JP" i="1">
-                        <a:latin typeface="Cambria Math" panose="02040503050406030204" pitchFamily="18" charset="0"/>
-                        <a:ea typeface="Cambria Math" panose="02040503050406030204" pitchFamily="18" charset="0"/>
-                      </a:rPr>
-                      <m:t>, </m:t>
-                    </m:r>
-                    <m:r>
-                      <a:rPr lang="en-US" altLang="ja-JP" i="1">
-                        <a:latin typeface="Cambria Math" panose="02040503050406030204" pitchFamily="18" charset="0"/>
-                        <a:ea typeface="Cambria Math" panose="02040503050406030204" pitchFamily="18" charset="0"/>
-                      </a:rPr>
-                      <m:t>𝑎</m:t>
-                    </m:r>
-                    <m:r>
-                      <a:rPr lang="en-US" altLang="ja-JP" i="1">
-                        <a:latin typeface="Cambria Math" panose="02040503050406030204" pitchFamily="18" charset="0"/>
-                        <a:ea typeface="Cambria Math" panose="02040503050406030204" pitchFamily="18" charset="0"/>
-                      </a:rPr>
-                      <m:t>∙</m:t>
-                    </m:r>
-                    <m:r>
-                      <a:rPr lang="en-US" altLang="ja-JP" i="1">
-                        <a:latin typeface="Cambria Math" panose="02040503050406030204" pitchFamily="18" charset="0"/>
-                        <a:ea typeface="Cambria Math" panose="02040503050406030204" pitchFamily="18" charset="0"/>
-                      </a:rPr>
-                      <m:t>𝑒</m:t>
-                    </m:r>
-                    <m:r>
-                      <a:rPr lang="en-US" altLang="ja-JP" i="1">
-                        <a:latin typeface="Cambria Math" panose="02040503050406030204" pitchFamily="18" charset="0"/>
-                        <a:ea typeface="Cambria Math" panose="02040503050406030204" pitchFamily="18" charset="0"/>
-                      </a:rPr>
-                      <m:t>=</m:t>
-                    </m:r>
-                    <m:r>
-                      <a:rPr lang="en-US" altLang="ja-JP" i="1">
-                        <a:latin typeface="Cambria Math" panose="02040503050406030204" pitchFamily="18" charset="0"/>
-                        <a:ea typeface="Cambria Math" panose="02040503050406030204" pitchFamily="18" charset="0"/>
-                      </a:rPr>
-                      <m:t>𝑒</m:t>
-                    </m:r>
-                    <m:r>
-                      <a:rPr lang="en-US" altLang="ja-JP" i="1">
-                        <a:latin typeface="Cambria Math" panose="02040503050406030204" pitchFamily="18" charset="0"/>
-                        <a:ea typeface="Cambria Math" panose="02040503050406030204" pitchFamily="18" charset="0"/>
-                      </a:rPr>
-                      <m:t>∙</m:t>
-                    </m:r>
-                    <m:r>
-                      <a:rPr lang="en-US" altLang="ja-JP" i="1">
-                        <a:latin typeface="Cambria Math" panose="02040503050406030204" pitchFamily="18" charset="0"/>
-                        <a:ea typeface="Cambria Math" panose="02040503050406030204" pitchFamily="18" charset="0"/>
-                      </a:rPr>
-                      <m:t>𝑎</m:t>
-                    </m:r>
-                    <m:r>
-                      <a:rPr lang="en-US" altLang="ja-JP" i="1">
-                        <a:latin typeface="Cambria Math" panose="02040503050406030204" pitchFamily="18" charset="0"/>
-                        <a:ea typeface="Cambria Math" panose="02040503050406030204" pitchFamily="18" charset="0"/>
-                      </a:rPr>
-                      <m:t>=</m:t>
-                    </m:r>
-                    <m:r>
-                      <a:rPr lang="en-US" altLang="ja-JP" i="1">
-                        <a:latin typeface="Cambria Math" panose="02040503050406030204" pitchFamily="18" charset="0"/>
-                        <a:ea typeface="Cambria Math" panose="02040503050406030204" pitchFamily="18" charset="0"/>
-                      </a:rPr>
-                      <m:t>𝑎</m:t>
-                    </m:r>
-                  </m:oMath>
-                </a14:m>
-                <a:br>
-                  <a:rPr lang="ja-JP" altLang="en-US"/>
-                </a:br>
-                <a:endParaRPr lang="fr-CA" altLang="ja-JP" dirty="0"/>
-              </a:p>
-              <a:p>
-                <a:pPr>
-                  <a:spcBef>
-                    <a:spcPts val="0"/>
-                  </a:spcBef>
-                  <a:buFont typeface="Arial"/>
-                  <a:buAutoNum type="arabicPeriod"/>
-                </a:pPr>
-                <a:r>
-                  <a:rPr lang="ja-JP" altLang="en-US" dirty="0"/>
-                  <a:t>逆元</a:t>
-                </a:r>
-                <a:r>
-                  <a:rPr lang="ja-JP" altLang="en-US"/>
-                  <a:t>の存在</a:t>
-                </a:r>
-                <a:r>
-                  <a:rPr lang="en-US" altLang="ja-JP" dirty="0"/>
-                  <a:t> </a:t>
-                </a:r>
-                <a:r>
-                  <a:rPr lang="en-US" altLang="ja-JP" sz="2000" i="1" dirty="0">
-                    <a:solidFill>
-                      <a:schemeClr val="tx1">
-                        <a:lumMod val="50000"/>
-                        <a:lumOff val="50000"/>
-                      </a:schemeClr>
-                    </a:solidFill>
-                    <a:latin typeface="Times New Roman" panose="02020603050405020304" pitchFamily="18" charset="0"/>
-                    <a:cs typeface="Times New Roman" panose="02020603050405020304" pitchFamily="18" charset="0"/>
-                  </a:rPr>
-                  <a:t>inverse element</a:t>
-                </a:r>
-                <a:br>
-                  <a:rPr lang="en-US" altLang="ja-JP" dirty="0"/>
-                </a:br>
-                <a:r>
-                  <a:rPr lang="ja-JP" altLang="en-US" dirty="0"/>
-                  <a:t>　</a:t>
-                </a:r>
-                <a14:m>
-                  <m:oMath xmlns:m="http://schemas.openxmlformats.org/officeDocument/2006/math">
-                    <m:r>
-                      <a:rPr lang="ja-JP" altLang="en-US" i="1">
-                        <a:latin typeface="Cambria Math" panose="02040503050406030204" pitchFamily="18" charset="0"/>
-                      </a:rPr>
-                      <m:t>∀</m:t>
-                    </m:r>
-                    <m:r>
-                      <a:rPr lang="en-US" altLang="ja-JP" i="1">
-                        <a:latin typeface="Cambria Math" panose="02040503050406030204" pitchFamily="18" charset="0"/>
-                      </a:rPr>
-                      <m:t>𝑎</m:t>
-                    </m:r>
-                    <m:r>
-                      <a:rPr lang="en-US" altLang="ja-JP" i="1">
-                        <a:latin typeface="Cambria Math" panose="02040503050406030204" pitchFamily="18" charset="0"/>
-                        <a:ea typeface="Cambria Math" panose="02040503050406030204" pitchFamily="18" charset="0"/>
-                      </a:rPr>
-                      <m:t>∈</m:t>
-                    </m:r>
-                    <m:r>
-                      <a:rPr lang="en-US" altLang="ja-JP" i="1">
-                        <a:latin typeface="Cambria Math" panose="02040503050406030204" pitchFamily="18" charset="0"/>
-                        <a:ea typeface="Cambria Math" panose="02040503050406030204" pitchFamily="18" charset="0"/>
-                      </a:rPr>
-                      <m:t>𝐺</m:t>
-                    </m:r>
-                    <m:r>
-                      <a:rPr lang="en-US" altLang="ja-JP" i="1">
-                        <a:latin typeface="Cambria Math" panose="02040503050406030204" pitchFamily="18" charset="0"/>
-                        <a:ea typeface="Cambria Math" panose="02040503050406030204" pitchFamily="18" charset="0"/>
-                      </a:rPr>
-                      <m:t>,∃</m:t>
-                    </m:r>
-                    <m:sSup>
-                      <m:sSupPr>
-                        <m:ctrlPr>
-                          <a:rPr lang="en-US" altLang="ja-JP" i="1">
-                            <a:latin typeface="Cambria Math" panose="02040503050406030204" pitchFamily="18" charset="0"/>
-                            <a:ea typeface="Cambria Math" panose="02040503050406030204" pitchFamily="18" charset="0"/>
-                          </a:rPr>
-                        </m:ctrlPr>
-                      </m:sSupPr>
-                      <m:e>
-                        <m:r>
-                          <a:rPr lang="en-US" altLang="ja-JP" i="1">
-                            <a:latin typeface="Cambria Math" panose="02040503050406030204" pitchFamily="18" charset="0"/>
-                            <a:ea typeface="Cambria Math" panose="02040503050406030204" pitchFamily="18" charset="0"/>
-                          </a:rPr>
-                          <m:t>𝑎</m:t>
-                        </m:r>
-                      </m:e>
-                      <m:sup>
-                        <m:r>
-                          <a:rPr lang="en-US" altLang="ja-JP" i="1">
-                            <a:latin typeface="Cambria Math" panose="02040503050406030204" pitchFamily="18" charset="0"/>
-                            <a:ea typeface="Cambria Math" panose="02040503050406030204" pitchFamily="18" charset="0"/>
-                          </a:rPr>
-                          <m:t>−1</m:t>
-                        </m:r>
-                      </m:sup>
-                    </m:sSup>
-                    <m:r>
-                      <a:rPr lang="en-US" altLang="ja-JP" i="1">
-                        <a:latin typeface="Cambria Math" panose="02040503050406030204" pitchFamily="18" charset="0"/>
-                        <a:ea typeface="Cambria Math" panose="02040503050406030204" pitchFamily="18" charset="0"/>
-                      </a:rPr>
-                      <m:t>∈</m:t>
-                    </m:r>
-                    <m:r>
-                      <a:rPr lang="en-US" altLang="ja-JP" i="1">
-                        <a:latin typeface="Cambria Math" panose="02040503050406030204" pitchFamily="18" charset="0"/>
-                        <a:ea typeface="Cambria Math" panose="02040503050406030204" pitchFamily="18" charset="0"/>
-                      </a:rPr>
-                      <m:t>𝐺</m:t>
-                    </m:r>
-                    <m:r>
-                      <a:rPr lang="en-US" altLang="ja-JP" i="1">
-                        <a:latin typeface="Cambria Math" panose="02040503050406030204" pitchFamily="18" charset="0"/>
-                        <a:ea typeface="Cambria Math" panose="02040503050406030204" pitchFamily="18" charset="0"/>
-                      </a:rPr>
-                      <m:t>,</m:t>
-                    </m:r>
-                    <m:r>
-                      <a:rPr lang="en-US" altLang="ja-JP" i="1">
-                        <a:latin typeface="Cambria Math" panose="02040503050406030204" pitchFamily="18" charset="0"/>
-                        <a:ea typeface="Cambria Math" panose="02040503050406030204" pitchFamily="18" charset="0"/>
-                      </a:rPr>
-                      <m:t>𝑎</m:t>
-                    </m:r>
-                    <m:r>
-                      <a:rPr lang="en-US" altLang="ja-JP" i="1">
-                        <a:latin typeface="Cambria Math" panose="02040503050406030204" pitchFamily="18" charset="0"/>
-                        <a:ea typeface="Cambria Math" panose="02040503050406030204" pitchFamily="18" charset="0"/>
-                      </a:rPr>
-                      <m:t>∙</m:t>
-                    </m:r>
-                    <m:sSup>
-                      <m:sSupPr>
-                        <m:ctrlPr>
-                          <a:rPr lang="en-US" altLang="ja-JP" i="1">
-                            <a:latin typeface="Cambria Math" panose="02040503050406030204" pitchFamily="18" charset="0"/>
-                            <a:ea typeface="Cambria Math" panose="02040503050406030204" pitchFamily="18" charset="0"/>
-                          </a:rPr>
-                        </m:ctrlPr>
-                      </m:sSupPr>
-                      <m:e>
-                        <m:r>
-                          <a:rPr lang="en-US" altLang="ja-JP" i="1">
-                            <a:latin typeface="Cambria Math" panose="02040503050406030204" pitchFamily="18" charset="0"/>
-                            <a:ea typeface="Cambria Math" panose="02040503050406030204" pitchFamily="18" charset="0"/>
-                          </a:rPr>
-                          <m:t>𝑎</m:t>
-                        </m:r>
-                      </m:e>
-                      <m:sup>
-                        <m:r>
-                          <a:rPr lang="en-US" altLang="ja-JP" i="1">
-                            <a:latin typeface="Cambria Math" panose="02040503050406030204" pitchFamily="18" charset="0"/>
-                            <a:ea typeface="Cambria Math" panose="02040503050406030204" pitchFamily="18" charset="0"/>
-                          </a:rPr>
-                          <m:t>−1</m:t>
-                        </m:r>
-                      </m:sup>
-                    </m:sSup>
-                    <m:r>
-                      <a:rPr lang="en-US" altLang="ja-JP" i="1">
-                        <a:latin typeface="Cambria Math" panose="02040503050406030204" pitchFamily="18" charset="0"/>
-                        <a:ea typeface="Cambria Math" panose="02040503050406030204" pitchFamily="18" charset="0"/>
-                      </a:rPr>
-                      <m:t>=</m:t>
-                    </m:r>
-                    <m:sSup>
-                      <m:sSupPr>
-                        <m:ctrlPr>
-                          <a:rPr lang="en-US" altLang="ja-JP" i="1">
-                            <a:latin typeface="Cambria Math" panose="02040503050406030204" pitchFamily="18" charset="0"/>
-                            <a:ea typeface="Cambria Math" panose="02040503050406030204" pitchFamily="18" charset="0"/>
-                          </a:rPr>
-                        </m:ctrlPr>
-                      </m:sSupPr>
-                      <m:e>
-                        <m:r>
-                          <a:rPr lang="en-US" altLang="ja-JP" i="1">
-                            <a:latin typeface="Cambria Math" panose="02040503050406030204" pitchFamily="18" charset="0"/>
-                            <a:ea typeface="Cambria Math" panose="02040503050406030204" pitchFamily="18" charset="0"/>
-                          </a:rPr>
-                          <m:t>𝑎</m:t>
-                        </m:r>
-                      </m:e>
-                      <m:sup>
-                        <m:r>
-                          <a:rPr lang="en-US" altLang="ja-JP" i="1">
-                            <a:latin typeface="Cambria Math" panose="02040503050406030204" pitchFamily="18" charset="0"/>
-                            <a:ea typeface="Cambria Math" panose="02040503050406030204" pitchFamily="18" charset="0"/>
-                          </a:rPr>
-                          <m:t>−1</m:t>
-                        </m:r>
-                      </m:sup>
-                    </m:sSup>
-                    <m:r>
-                      <a:rPr lang="en-US" altLang="ja-JP" i="1">
-                        <a:latin typeface="Cambria Math" panose="02040503050406030204" pitchFamily="18" charset="0"/>
-                        <a:ea typeface="Cambria Math" panose="02040503050406030204" pitchFamily="18" charset="0"/>
-                      </a:rPr>
-                      <m:t>∙</m:t>
-                    </m:r>
-                    <m:r>
-                      <a:rPr lang="en-US" altLang="ja-JP" i="1">
-                        <a:latin typeface="Cambria Math" panose="02040503050406030204" pitchFamily="18" charset="0"/>
-                        <a:ea typeface="Cambria Math" panose="02040503050406030204" pitchFamily="18" charset="0"/>
-                      </a:rPr>
-                      <m:t>𝑎</m:t>
-                    </m:r>
-                    <m:r>
-                      <a:rPr lang="en-US" altLang="ja-JP" i="1">
-                        <a:latin typeface="Cambria Math" panose="02040503050406030204" pitchFamily="18" charset="0"/>
-                        <a:ea typeface="Cambria Math" panose="02040503050406030204" pitchFamily="18" charset="0"/>
-                      </a:rPr>
-                      <m:t>=</m:t>
-                    </m:r>
-                    <m:r>
-                      <a:rPr lang="en-US" altLang="ja-JP" i="1">
-                        <a:latin typeface="Cambria Math" panose="02040503050406030204" pitchFamily="18" charset="0"/>
-                        <a:ea typeface="Cambria Math" panose="02040503050406030204" pitchFamily="18" charset="0"/>
-                      </a:rPr>
-                      <m:t>𝑒</m:t>
-                    </m:r>
-                  </m:oMath>
-                </a14:m>
-                <a:br>
-                  <a:rPr lang="en-US" altLang="ja-JP" dirty="0">
-                    <a:ea typeface="Cambria Math" panose="02040503050406030204" pitchFamily="18" charset="0"/>
-                  </a:rPr>
-                </a:br>
-                <a:endParaRPr lang="ja-JP" altLang="en-US"/>
-              </a:p>
-            </p:txBody>
-          </p:sp>
-        </mc:Choice>
-        <mc:Fallback>
-          <p:sp>
-            <p:nvSpPr>
-              <p:cNvPr id="3" name="コンテンツ プレースホルダー 2">
-                <a:extLst>
-                  <a:ext uri="{FF2B5EF4-FFF2-40B4-BE49-F238E27FC236}">
-                    <a16:creationId xmlns:a16="http://schemas.microsoft.com/office/drawing/2014/main" id="{3DC394E8-B340-1042-958B-08B9A42809D5}"/>
-                  </a:ext>
-                </a:extLst>
-              </p:cNvPr>
-              <p:cNvSpPr>
-                <a:spLocks noGrp="1" noRot="1" noChangeAspect="1" noMove="1" noResize="1" noEditPoints="1" noAdjustHandles="1" noChangeArrowheads="1" noChangeShapeType="1" noTextEdit="1"/>
-              </p:cNvSpPr>
-              <p:nvPr>
-                <p:ph idx="1"/>
-              </p:nvPr>
-            </p:nvSpPr>
-            <p:spPr>
-              <a:xfrm>
-                <a:off x="838200" y="1342663"/>
-                <a:ext cx="10515600" cy="5031069"/>
-              </a:xfrm>
-              <a:blipFill>
-                <a:blip r:embed="rId2"/>
-                <a:stretch>
-                  <a:fillRect l="-1206" t="-2519"/>
-                </a:stretch>
-              </a:blipFill>
-            </p:spPr>
-            <p:txBody>
-              <a:bodyPr/>
-              <a:lstStyle/>
-              <a:p>
-                <a:r>
-                  <a:rPr lang="ja-JP" altLang="en-US">
-                    <a:noFill/>
-                  </a:rPr>
-                  <a:t> </a:t>
-                </a:r>
-              </a:p>
-            </p:txBody>
-          </p:sp>
-        </mc:Fallback>
-      </mc:AlternateContent>
-    </p:spTree>
-    <p:extLst>
-      <p:ext uri="{BB962C8B-B14F-4D97-AF65-F5344CB8AC3E}">
-        <p14:creationId xmlns:p14="http://schemas.microsoft.com/office/powerpoint/2010/main" val="358005465"/>
-      </p:ext>
-    </p:extLst>
-  </p:cSld>
-  <p:clrMapOvr>
-    <a:masterClrMapping/>
-  </p:clrMapOvr>
-</p:sld>
-</file>
-
-<file path=ppt/slides/slide12.xml><?xml version="1.0" encoding="utf-8"?>
-<p:sld xmlns:a="http://schemas.openxmlformats.org/drawingml/2006/main" xmlns:r="http://schemas.openxmlformats.org/officeDocument/2006/relationships" xmlns:p="http://schemas.openxmlformats.org/presentationml/2006/main">
-  <p:cSld>
-    <p:spTree>
-      <p:nvGrpSpPr>
-        <p:cNvPr id="1" name=""/>
-        <p:cNvGrpSpPr/>
-        <p:nvPr/>
-      </p:nvGrpSpPr>
-      <p:grpSpPr>
-        <a:xfrm>
-          <a:off x="0" y="0"/>
-          <a:ext cx="0" cy="0"/>
-          <a:chOff x="0" y="0"/>
-          <a:chExt cx="0" cy="0"/>
-        </a:xfrm>
-      </p:grpSpPr>
-      <p:sp>
-        <p:nvSpPr>
-          <p:cNvPr id="2" name="タイトル 1">
-            <a:extLst>
-              <a:ext uri="{FF2B5EF4-FFF2-40B4-BE49-F238E27FC236}">
                 <a16:creationId xmlns:a16="http://schemas.microsoft.com/office/drawing/2014/main" id="{6DBA5FD9-9B4F-4D47-9C0F-FF8B36B50FF8}"/>
               </a:ext>
             </a:extLst>
@@ -5784,7 +4724,7 @@
 </p:sld>
 </file>
 
-<file path=ppt/slides/slide13.xml><?xml version="1.0" encoding="utf-8"?>
+<file path=ppt/slides/slide11.xml><?xml version="1.0" encoding="utf-8"?>
 <p:sld xmlns:a="http://schemas.openxmlformats.org/drawingml/2006/main" xmlns:r="http://schemas.openxmlformats.org/officeDocument/2006/relationships" xmlns:p="http://schemas.openxmlformats.org/presentationml/2006/main">
   <p:cSld>
     <p:spTree>
@@ -6500,7 +5440,7 @@
 </p:sld>
 </file>
 
-<file path=ppt/slides/slide14.xml><?xml version="1.0" encoding="utf-8"?>
+<file path=ppt/slides/slide12.xml><?xml version="1.0" encoding="utf-8"?>
 <p:sld xmlns:a="http://schemas.openxmlformats.org/drawingml/2006/main" xmlns:r="http://schemas.openxmlformats.org/officeDocument/2006/relationships" xmlns:p="http://schemas.openxmlformats.org/presentationml/2006/main">
   <p:cSld>
     <p:spTree>
@@ -7109,7 +6049,7 @@
 </p:sld>
 </file>
 
-<file path=ppt/slides/slide15.xml><?xml version="1.0" encoding="utf-8"?>
+<file path=ppt/slides/slide13.xml><?xml version="1.0" encoding="utf-8"?>
 <p:sld xmlns:a="http://schemas.openxmlformats.org/drawingml/2006/main" xmlns:r="http://schemas.openxmlformats.org/officeDocument/2006/relationships" xmlns:p="http://schemas.openxmlformats.org/presentationml/2006/main">
   <p:cSld>
     <p:spTree>
@@ -7823,7 +6763,7 @@
 </p:sld>
 </file>
 
-<file path=ppt/slides/slide16.xml><?xml version="1.0" encoding="utf-8"?>
+<file path=ppt/slides/slide14.xml><?xml version="1.0" encoding="utf-8"?>
 <p:sld xmlns:a="http://schemas.openxmlformats.org/drawingml/2006/main" xmlns:r="http://schemas.openxmlformats.org/officeDocument/2006/relationships" xmlns:p="http://schemas.openxmlformats.org/presentationml/2006/main">
   <p:cSld>
     <p:spTree>
@@ -7874,7 +6814,7 @@
                 </a:pPr>
                 <a:r>
                   <a:rPr lang="ja-JP" altLang="en-US"/>
-                  <a:t>群の例</a:t>
+                  <a:t>部分群の例</a:t>
                 </a:r>
                 <a:r>
                   <a:rPr lang="en-US" altLang="ja-JP" sz="2800" dirty="0"/>
@@ -8638,6 +7578,842 @@
     <p:extLst>
       <p:ext uri="{BB962C8B-B14F-4D97-AF65-F5344CB8AC3E}">
         <p14:creationId xmlns:p14="http://schemas.microsoft.com/office/powerpoint/2010/main" val="1085884508"/>
+      </p:ext>
+    </p:extLst>
+  </p:cSld>
+  <p:clrMapOvr>
+    <a:masterClrMapping/>
+  </p:clrMapOvr>
+</p:sld>
+</file>
+
+<file path=ppt/slides/slide15.xml><?xml version="1.0" encoding="utf-8"?>
+<p:sld xmlns:a="http://schemas.openxmlformats.org/drawingml/2006/main" xmlns:r="http://schemas.openxmlformats.org/officeDocument/2006/relationships" xmlns:p="http://schemas.openxmlformats.org/presentationml/2006/main">
+  <p:cSld>
+    <p:spTree>
+      <p:nvGrpSpPr>
+        <p:cNvPr id="1" name="Shape 381"/>
+        <p:cNvGrpSpPr/>
+        <p:nvPr/>
+      </p:nvGrpSpPr>
+      <p:grpSpPr>
+        <a:xfrm>
+          <a:off x="0" y="0"/>
+          <a:ext cx="0" cy="0"/>
+          <a:chOff x="0" y="0"/>
+          <a:chExt cx="0" cy="0"/>
+        </a:xfrm>
+      </p:grpSpPr>
+      <mc:AlternateContent xmlns:mc="http://schemas.openxmlformats.org/markup-compatibility/2006">
+        <mc:Choice xmlns:a14="http://schemas.microsoft.com/office/drawing/2010/main" Requires="a14">
+          <p:sp>
+            <p:nvSpPr>
+              <p:cNvPr id="382" name="Google Shape;382;p67"/>
+              <p:cNvSpPr txBox="1">
+                <a:spLocks noGrp="1"/>
+              </p:cNvSpPr>
+              <p:nvPr>
+                <p:ph type="title"/>
+              </p:nvPr>
+            </p:nvSpPr>
+            <p:spPr>
+              <a:xfrm>
+                <a:off x="838200" y="365125"/>
+                <a:ext cx="10515600" cy="1325600"/>
+              </a:xfrm>
+              <a:prstGeom prst="rect">
+                <a:avLst/>
+              </a:prstGeom>
+            </p:spPr>
+            <p:txBody>
+              <a:bodyPr spcFirstLastPara="1" vert="horz" wrap="square" lIns="91433" tIns="45700" rIns="91433" bIns="45700" rtlCol="0" anchor="ctr" anchorCtr="0">
+                <a:noAutofit/>
+              </a:bodyPr>
+              <a:lstStyle/>
+              <a:p>
+                <a:pPr>
+                  <a:spcBef>
+                    <a:spcPts val="0"/>
+                  </a:spcBef>
+                </a:pPr>
+                <a:r>
+                  <a:rPr lang="ja" dirty="0"/>
+                  <a:t>特殊線型群</a:t>
+                </a:r>
+                <a:r>
+                  <a:rPr lang="en-US" altLang="ja" sz="2800" dirty="0"/>
+                  <a:t>~ </a:t>
+                </a:r>
+                <a14:m>
+                  <m:oMath xmlns:m="http://schemas.openxmlformats.org/officeDocument/2006/math">
+                    <m:r>
+                      <m:rPr>
+                        <m:sty m:val="p"/>
+                      </m:rPr>
+                      <a:rPr lang="en-US" altLang="ja" sz="2800" b="0" i="0" smtClean="0">
+                        <a:latin typeface="Cambria Math" panose="02040503050406030204" pitchFamily="18" charset="0"/>
+                      </a:rPr>
+                      <m:t>SL</m:t>
+                    </m:r>
+                    <m:d>
+                      <m:dPr>
+                        <m:ctrlPr>
+                          <a:rPr lang="en-US" altLang="ja" sz="2800" i="1">
+                            <a:latin typeface="Cambria Math" panose="02040503050406030204" pitchFamily="18" charset="0"/>
+                          </a:rPr>
+                        </m:ctrlPr>
+                      </m:dPr>
+                      <m:e>
+                        <m:r>
+                          <m:rPr>
+                            <m:sty m:val="p"/>
+                          </m:rPr>
+                          <a:rPr lang="en-US" altLang="ja" sz="2800">
+                            <a:latin typeface="Cambria Math" panose="02040503050406030204" pitchFamily="18" charset="0"/>
+                          </a:rPr>
+                          <m:t>n</m:t>
+                        </m:r>
+                        <m:r>
+                          <a:rPr lang="en-US" altLang="ja" sz="2800" b="0" i="0" smtClean="0">
+                            <a:latin typeface="Cambria Math" panose="02040503050406030204" pitchFamily="18" charset="0"/>
+                          </a:rPr>
+                          <m:t>;</m:t>
+                        </m:r>
+                        <m:r>
+                          <a:rPr lang="en-US" altLang="ja" sz="2800" b="0" i="1" smtClean="0">
+                            <a:latin typeface="Cambria Math" panose="02040503050406030204" pitchFamily="18" charset="0"/>
+                            <a:ea typeface="Cambria Math" panose="02040503050406030204" pitchFamily="18" charset="0"/>
+                          </a:rPr>
+                          <m:t>ℂ</m:t>
+                        </m:r>
+                      </m:e>
+                    </m:d>
+                    <m:r>
+                      <a:rPr lang="en-US" altLang="ja" sz="2800" i="1">
+                        <a:latin typeface="Cambria Math" panose="02040503050406030204" pitchFamily="18" charset="0"/>
+                      </a:rPr>
+                      <m:t> </m:t>
+                    </m:r>
+                  </m:oMath>
+                </a14:m>
+                <a:r>
+                  <a:rPr lang="en-US" altLang="ja" sz="2800" dirty="0"/>
+                  <a:t>~</a:t>
+                </a:r>
+                <a:r>
+                  <a:rPr lang="en-US" altLang="ja" sz="2400" i="1" dirty="0">
+                    <a:solidFill>
+                      <a:schemeClr val="tx1">
+                        <a:lumMod val="50000"/>
+                        <a:lumOff val="50000"/>
+                      </a:schemeClr>
+                    </a:solidFill>
+                    <a:latin typeface="Times New Roman" panose="02020603050405020304" pitchFamily="18" charset="0"/>
+                    <a:cs typeface="Times New Roman" panose="02020603050405020304" pitchFamily="18" charset="0"/>
+                  </a:rPr>
+                  <a:t>special linear group</a:t>
+                </a:r>
+                <a:endParaRPr i="1" dirty="0">
+                  <a:solidFill>
+                    <a:schemeClr val="tx1">
+                      <a:lumMod val="50000"/>
+                      <a:lumOff val="50000"/>
+                    </a:schemeClr>
+                  </a:solidFill>
+                  <a:latin typeface="Times New Roman" panose="02020603050405020304" pitchFamily="18" charset="0"/>
+                  <a:cs typeface="Times New Roman" panose="02020603050405020304" pitchFamily="18" charset="0"/>
+                </a:endParaRPr>
+              </a:p>
+            </p:txBody>
+          </p:sp>
+        </mc:Choice>
+        <mc:Fallback>
+          <p:sp>
+            <p:nvSpPr>
+              <p:cNvPr id="382" name="Google Shape;382;p67"/>
+              <p:cNvSpPr txBox="1">
+                <a:spLocks noGrp="1" noRot="1" noChangeAspect="1" noMove="1" noResize="1" noEditPoints="1" noAdjustHandles="1" noChangeArrowheads="1" noChangeShapeType="1" noTextEdit="1"/>
+              </p:cNvSpPr>
+              <p:nvPr>
+                <p:ph type="title"/>
+              </p:nvPr>
+            </p:nvSpPr>
+            <p:spPr>
+              <a:xfrm>
+                <a:off x="838200" y="365125"/>
+                <a:ext cx="10515600" cy="1325600"/>
+              </a:xfrm>
+              <a:prstGeom prst="rect">
+                <a:avLst/>
+              </a:prstGeom>
+              <a:blipFill>
+                <a:blip r:embed="rId3"/>
+                <a:stretch>
+                  <a:fillRect l="-2292"/>
+                </a:stretch>
+              </a:blipFill>
+            </p:spPr>
+            <p:txBody>
+              <a:bodyPr/>
+              <a:lstStyle/>
+              <a:p>
+                <a:r>
+                  <a:rPr lang="ja-JP" altLang="en-US">
+                    <a:noFill/>
+                  </a:rPr>
+                  <a:t> </a:t>
+                </a:r>
+              </a:p>
+            </p:txBody>
+          </p:sp>
+        </mc:Fallback>
+      </mc:AlternateContent>
+      <mc:AlternateContent xmlns:mc="http://schemas.openxmlformats.org/markup-compatibility/2006">
+        <mc:Choice xmlns:a14="http://schemas.microsoft.com/office/drawing/2010/main" Requires="a14">
+          <p:sp>
+            <p:nvSpPr>
+              <p:cNvPr id="383" name="Google Shape;383;p67"/>
+              <p:cNvSpPr txBox="1">
+                <a:spLocks noGrp="1"/>
+              </p:cNvSpPr>
+              <p:nvPr>
+                <p:ph type="body" idx="1"/>
+              </p:nvPr>
+            </p:nvSpPr>
+            <p:spPr>
+              <a:xfrm>
+                <a:off x="838200" y="1825625"/>
+                <a:ext cx="10515600" cy="4351200"/>
+              </a:xfrm>
+              <a:prstGeom prst="rect">
+                <a:avLst/>
+              </a:prstGeom>
+            </p:spPr>
+            <p:txBody>
+              <a:bodyPr spcFirstLastPara="1" vert="horz" wrap="square" lIns="91433" tIns="45700" rIns="91433" bIns="45700" rtlCol="0" anchor="t" anchorCtr="0">
+                <a:noAutofit/>
+              </a:bodyPr>
+              <a:lstStyle/>
+              <a:p>
+                <a:pPr marL="0" indent="0">
+                  <a:spcBef>
+                    <a:spcPts val="1067"/>
+                  </a:spcBef>
+                  <a:buNone/>
+                </a:pPr>
+                <a14:m>
+                  <m:oMath xmlns:m="http://schemas.openxmlformats.org/officeDocument/2006/math">
+                    <m:r>
+                      <m:rPr>
+                        <m:sty m:val="p"/>
+                      </m:rPr>
+                      <a:rPr lang="en-US" altLang="ja" smtClean="0">
+                        <a:latin typeface="Cambria Math" panose="02040503050406030204" pitchFamily="18" charset="0"/>
+                      </a:rPr>
+                      <m:t>SL</m:t>
+                    </m:r>
+                    <m:d>
+                      <m:dPr>
+                        <m:ctrlPr>
+                          <a:rPr lang="ar-AE" altLang="ja" i="1">
+                            <a:latin typeface="Cambria Math" panose="02040503050406030204" pitchFamily="18" charset="0"/>
+                          </a:rPr>
+                        </m:ctrlPr>
+                      </m:dPr>
+                      <m:e>
+                        <m:r>
+                          <m:rPr>
+                            <m:sty m:val="p"/>
+                          </m:rPr>
+                          <a:rPr lang="en-US" altLang="ja">
+                            <a:latin typeface="Cambria Math" panose="02040503050406030204" pitchFamily="18" charset="0"/>
+                          </a:rPr>
+                          <m:t>n</m:t>
+                        </m:r>
+                        <m:r>
+                          <a:rPr lang="en-US" altLang="ja">
+                            <a:latin typeface="Cambria Math" panose="02040503050406030204" pitchFamily="18" charset="0"/>
+                          </a:rPr>
+                          <m:t>;</m:t>
+                        </m:r>
+                        <m:r>
+                          <a:rPr lang="en-US" altLang="ja" i="1">
+                            <a:latin typeface="Cambria Math" panose="02040503050406030204" pitchFamily="18" charset="0"/>
+                            <a:ea typeface="Cambria Math" panose="02040503050406030204" pitchFamily="18" charset="0"/>
+                          </a:rPr>
+                          <m:t>ℂ</m:t>
+                        </m:r>
+                      </m:e>
+                    </m:d>
+                  </m:oMath>
+                </a14:m>
+                <a:r>
+                  <a:rPr lang="ja" altLang="ar-AE" dirty="0"/>
+                  <a:t>：</a:t>
+                </a:r>
+                <a:r>
+                  <a:rPr lang="ja-JP" altLang="en-US" dirty="0"/>
+                  <a:t>行列式が１の複素平方行列全体</a:t>
+                </a:r>
+              </a:p>
+              <a:p>
+                <a:pPr marL="0" indent="0">
+                  <a:spcBef>
+                    <a:spcPts val="1067"/>
+                  </a:spcBef>
+                  <a:buNone/>
+                </a:pPr>
+                <a:r>
+                  <a:rPr lang="en-US" altLang="ja" i="1" dirty="0">
+                    <a:solidFill>
+                      <a:schemeClr val="tx1">
+                        <a:lumMod val="50000"/>
+                        <a:lumOff val="50000"/>
+                      </a:schemeClr>
+                    </a:solidFill>
+                    <a:latin typeface="Times New Roman" panose="02020603050405020304" pitchFamily="18" charset="0"/>
+                    <a:cs typeface="Times New Roman" panose="02020603050405020304" pitchFamily="18" charset="0"/>
+                  </a:rPr>
+                  <a:t>def</a:t>
+                </a:r>
+                <a:r>
+                  <a:rPr lang="en-US" altLang="ja" dirty="0"/>
+                  <a:t> </a:t>
+                </a:r>
+              </a:p>
+              <a:p>
+                <a:pPr marL="0" indent="0">
+                  <a:spcBef>
+                    <a:spcPts val="1067"/>
+                  </a:spcBef>
+                  <a:buNone/>
+                </a:pPr>
+                <a:r>
+                  <a:rPr lang="en-US" altLang="ja" dirty="0"/>
+                  <a:t> </a:t>
+                </a:r>
+                <a14:m>
+                  <m:oMath xmlns:m="http://schemas.openxmlformats.org/officeDocument/2006/math">
+                    <m:r>
+                      <a:rPr lang="en-US" altLang="ja" i="1">
+                        <a:latin typeface="Cambria Math" panose="02040503050406030204" pitchFamily="18" charset="0"/>
+                      </a:rPr>
+                      <m:t>∀</m:t>
+                    </m:r>
+                    <m:r>
+                      <m:rPr>
+                        <m:sty m:val="p"/>
+                      </m:rPr>
+                      <a:rPr lang="en-US" altLang="ja">
+                        <a:latin typeface="Cambria Math" panose="02040503050406030204" pitchFamily="18" charset="0"/>
+                      </a:rPr>
+                      <m:t>A</m:t>
+                    </m:r>
+                    <m:r>
+                      <a:rPr lang="en-US" altLang="ja">
+                        <a:latin typeface="Cambria Math" panose="02040503050406030204" pitchFamily="18" charset="0"/>
+                      </a:rPr>
+                      <m:t>,</m:t>
+                    </m:r>
+                    <m:r>
+                      <m:rPr>
+                        <m:sty m:val="p"/>
+                      </m:rPr>
+                      <a:rPr lang="en-US" altLang="ja">
+                        <a:latin typeface="Cambria Math" panose="02040503050406030204" pitchFamily="18" charset="0"/>
+                      </a:rPr>
+                      <m:t>B</m:t>
+                    </m:r>
+                    <m:r>
+                      <a:rPr lang="en-US" altLang="ja" i="1">
+                        <a:latin typeface="Cambria Math" panose="02040503050406030204" pitchFamily="18" charset="0"/>
+                        <a:ea typeface="Cambria Math" panose="02040503050406030204" pitchFamily="18" charset="0"/>
+                      </a:rPr>
+                      <m:t>∈</m:t>
+                    </m:r>
+                    <m:r>
+                      <m:rPr>
+                        <m:sty m:val="p"/>
+                      </m:rPr>
+                      <a:rPr lang="en-US" altLang="ja" b="0" i="0" smtClean="0">
+                        <a:latin typeface="Cambria Math" panose="02040503050406030204" pitchFamily="18" charset="0"/>
+                        <a:ea typeface="Cambria Math" panose="02040503050406030204" pitchFamily="18" charset="0"/>
+                      </a:rPr>
+                      <m:t>S</m:t>
+                    </m:r>
+                    <m:r>
+                      <m:rPr>
+                        <m:sty m:val="p"/>
+                      </m:rPr>
+                      <a:rPr lang="en-US" altLang="ja">
+                        <a:latin typeface="Cambria Math" panose="02040503050406030204" pitchFamily="18" charset="0"/>
+                      </a:rPr>
+                      <m:t>L</m:t>
+                    </m:r>
+                    <m:d>
+                      <m:dPr>
+                        <m:ctrlPr>
+                          <a:rPr lang="ar-AE" altLang="ja" i="1">
+                            <a:latin typeface="Cambria Math" panose="02040503050406030204" pitchFamily="18" charset="0"/>
+                          </a:rPr>
+                        </m:ctrlPr>
+                      </m:dPr>
+                      <m:e>
+                        <m:r>
+                          <m:rPr>
+                            <m:sty m:val="p"/>
+                          </m:rPr>
+                          <a:rPr lang="en-US" altLang="ja">
+                            <a:latin typeface="Cambria Math" panose="02040503050406030204" pitchFamily="18" charset="0"/>
+                          </a:rPr>
+                          <m:t>n</m:t>
+                        </m:r>
+                        <m:r>
+                          <a:rPr lang="en-US" altLang="ja">
+                            <a:latin typeface="Cambria Math" panose="02040503050406030204" pitchFamily="18" charset="0"/>
+                          </a:rPr>
+                          <m:t>;</m:t>
+                        </m:r>
+                        <m:r>
+                          <a:rPr lang="en-US" altLang="ja">
+                            <a:latin typeface="Cambria Math" panose="02040503050406030204" pitchFamily="18" charset="0"/>
+                            <a:ea typeface="Cambria Math" panose="02040503050406030204" pitchFamily="18" charset="0"/>
+                          </a:rPr>
+                          <m:t>ℂ</m:t>
+                        </m:r>
+                      </m:e>
+                    </m:d>
+                    <m:r>
+                      <a:rPr lang="ar-AE" altLang="ja" i="1">
+                        <a:latin typeface="Cambria Math" panose="02040503050406030204" pitchFamily="18" charset="0"/>
+                      </a:rPr>
+                      <m:t>, </m:t>
+                    </m:r>
+                    <m:r>
+                      <m:rPr>
+                        <m:sty m:val="p"/>
+                      </m:rPr>
+                      <a:rPr lang="en-US" altLang="ja">
+                        <a:latin typeface="Cambria Math" panose="02040503050406030204" pitchFamily="18" charset="0"/>
+                      </a:rPr>
+                      <m:t>A</m:t>
+                    </m:r>
+                    <m:r>
+                      <a:rPr lang="en-US" altLang="ja">
+                        <a:latin typeface="Cambria Math" panose="02040503050406030204" pitchFamily="18" charset="0"/>
+                        <a:ea typeface="Cambria Math" panose="02040503050406030204" pitchFamily="18" charset="0"/>
+                      </a:rPr>
+                      <m:t>∙</m:t>
+                    </m:r>
+                    <m:r>
+                      <m:rPr>
+                        <m:sty m:val="p"/>
+                      </m:rPr>
+                      <a:rPr lang="en-US" altLang="ja">
+                        <a:latin typeface="Cambria Math" panose="02040503050406030204" pitchFamily="18" charset="0"/>
+                      </a:rPr>
+                      <m:t>B</m:t>
+                    </m:r>
+                  </m:oMath>
+                </a14:m>
+                <a:r>
+                  <a:rPr lang="ja-JP" altLang="en-US"/>
+                  <a:t>．この時，組</a:t>
+                </a:r>
+                <a14:m>
+                  <m:oMath xmlns:m="http://schemas.openxmlformats.org/officeDocument/2006/math">
+                    <m:r>
+                      <a:rPr lang="en-US" altLang="ja-JP">
+                        <a:latin typeface="Cambria Math" panose="02040503050406030204" pitchFamily="18" charset="0"/>
+                      </a:rPr>
+                      <m:t>(</m:t>
+                    </m:r>
+                    <m:r>
+                      <m:rPr>
+                        <m:sty m:val="p"/>
+                      </m:rPr>
+                      <a:rPr lang="en-US" altLang="ja-JP" b="0" i="0" smtClean="0">
+                        <a:latin typeface="Cambria Math" panose="02040503050406030204" pitchFamily="18" charset="0"/>
+                      </a:rPr>
+                      <m:t>S</m:t>
+                    </m:r>
+                    <m:r>
+                      <m:rPr>
+                        <m:sty m:val="p"/>
+                      </m:rPr>
+                      <a:rPr lang="en-US" altLang="ja">
+                        <a:latin typeface="Cambria Math" panose="02040503050406030204" pitchFamily="18" charset="0"/>
+                      </a:rPr>
+                      <m:t>L</m:t>
+                    </m:r>
+                    <m:d>
+                      <m:dPr>
+                        <m:ctrlPr>
+                          <a:rPr lang="ar-AE" altLang="ja" i="1">
+                            <a:latin typeface="Cambria Math" panose="02040503050406030204" pitchFamily="18" charset="0"/>
+                          </a:rPr>
+                        </m:ctrlPr>
+                      </m:dPr>
+                      <m:e>
+                        <m:r>
+                          <m:rPr>
+                            <m:sty m:val="p"/>
+                          </m:rPr>
+                          <a:rPr lang="en-US" altLang="ja">
+                            <a:latin typeface="Cambria Math" panose="02040503050406030204" pitchFamily="18" charset="0"/>
+                          </a:rPr>
+                          <m:t>n</m:t>
+                        </m:r>
+                        <m:r>
+                          <a:rPr lang="en-US" altLang="ja">
+                            <a:latin typeface="Cambria Math" panose="02040503050406030204" pitchFamily="18" charset="0"/>
+                          </a:rPr>
+                          <m:t>;</m:t>
+                        </m:r>
+                        <m:r>
+                          <a:rPr lang="en-US" altLang="ja">
+                            <a:latin typeface="Cambria Math" panose="02040503050406030204" pitchFamily="18" charset="0"/>
+                            <a:ea typeface="Cambria Math" panose="02040503050406030204" pitchFamily="18" charset="0"/>
+                          </a:rPr>
+                          <m:t>ℂ</m:t>
+                        </m:r>
+                      </m:e>
+                    </m:d>
+                    <m:r>
+                      <a:rPr lang="ar-AE" altLang="ja" i="1">
+                        <a:latin typeface="Cambria Math" panose="02040503050406030204" pitchFamily="18" charset="0"/>
+                        <a:ea typeface="Cambria Math" panose="02040503050406030204" pitchFamily="18" charset="0"/>
+                      </a:rPr>
+                      <m:t>,  ∙  )</m:t>
+                    </m:r>
+                  </m:oMath>
+                </a14:m>
+                <a:r>
+                  <a:rPr lang="ja-JP" altLang="en-US" dirty="0"/>
+                  <a:t>は</a:t>
+                </a:r>
+                <a:r>
+                  <a:rPr lang="ja-JP" altLang="en-US"/>
+                  <a:t>群をなす．</a:t>
+                </a:r>
+                <a:endParaRPr lang="ja-JP" altLang="en-US" dirty="0">
+                  <a:ea typeface="MS PGothic" panose="020B0600070205080204" pitchFamily="34" charset="-128"/>
+                </a:endParaRPr>
+              </a:p>
+              <a:p>
+                <a:pPr marL="0" indent="0">
+                  <a:spcBef>
+                    <a:spcPts val="1067"/>
+                  </a:spcBef>
+                  <a:buNone/>
+                </a:pPr>
+                <a:endParaRPr lang="ja-JP" altLang="en-US" dirty="0"/>
+              </a:p>
+              <a:p>
+                <a:pPr marL="0" indent="0">
+                  <a:spcBef>
+                    <a:spcPts val="1067"/>
+                  </a:spcBef>
+                  <a:buNone/>
+                </a:pPr>
+                <a:r>
+                  <a:rPr lang="ja-JP" altLang="en-US" dirty="0"/>
+                  <a:t>これが群であるためには</a:t>
+                </a:r>
+              </a:p>
+              <a:p>
+                <a:pPr marL="609585" indent="-423323">
+                  <a:spcBef>
+                    <a:spcPts val="1067"/>
+                  </a:spcBef>
+                  <a:buSzPts val="1400"/>
+                  <a:buChar char="-"/>
+                </a:pPr>
+                <a:r>
+                  <a:rPr lang="ja-JP" altLang="en-US" dirty="0"/>
+                  <a:t>特殊線型群の２つの行列の積の行列式も１（</a:t>
+                </a:r>
+                <a:r>
+                  <a:rPr lang="en-US" altLang="ja-JP" dirty="0"/>
+                  <a:t>1*1=1</a:t>
+                </a:r>
+                <a:r>
+                  <a:rPr lang="ja-JP" altLang="en-US" dirty="0"/>
+                  <a:t>）</a:t>
+                </a:r>
+              </a:p>
+              <a:p>
+                <a:pPr marL="609585" indent="-423323">
+                  <a:spcBef>
+                    <a:spcPts val="0"/>
+                  </a:spcBef>
+                  <a:buSzPts val="1400"/>
+                  <a:buChar char="-"/>
+                </a:pPr>
+                <a:r>
+                  <a:rPr lang="ja-JP" altLang="en-US" dirty="0"/>
+                  <a:t>単位行列は特殊線型群の元である．（</a:t>
+                </a:r>
+                <a:r>
+                  <a:rPr lang="en-US" altLang="ja" dirty="0"/>
+                  <a:t>det I = 1</a:t>
+                </a:r>
+                <a:r>
+                  <a:rPr lang="ja" altLang="en-US" dirty="0"/>
+                  <a:t>）</a:t>
+                </a:r>
+                <a:endParaRPr lang="en-US" dirty="0"/>
+              </a:p>
+              <a:p>
+                <a:pPr marL="609585" indent="-423323">
+                  <a:spcBef>
+                    <a:spcPts val="0"/>
+                  </a:spcBef>
+                  <a:buSzPts val="1400"/>
+                  <a:buChar char="-"/>
+                </a:pPr>
+                <a:r>
+                  <a:rPr lang="ja-JP" altLang="en-US" dirty="0"/>
+                  <a:t>特殊線型群の行列の逆行列の行列式も１</a:t>
+                </a:r>
+              </a:p>
+              <a:p>
+                <a:pPr marL="0" indent="0">
+                  <a:spcBef>
+                    <a:spcPts val="1067"/>
+                  </a:spcBef>
+                  <a:buNone/>
+                </a:pPr>
+                <a:r>
+                  <a:rPr lang="ja-JP" altLang="en-US" dirty="0"/>
+                  <a:t>を満たす必要がある</a:t>
+                </a:r>
+                <a:endParaRPr dirty="0"/>
+              </a:p>
+            </p:txBody>
+          </p:sp>
+        </mc:Choice>
+        <mc:Fallback>
+          <p:sp>
+            <p:nvSpPr>
+              <p:cNvPr id="383" name="Google Shape;383;p67"/>
+              <p:cNvSpPr txBox="1">
+                <a:spLocks noGrp="1" noRot="1" noChangeAspect="1" noMove="1" noResize="1" noEditPoints="1" noAdjustHandles="1" noChangeArrowheads="1" noChangeShapeType="1" noTextEdit="1"/>
+              </p:cNvSpPr>
+              <p:nvPr>
+                <p:ph type="body" idx="1"/>
+              </p:nvPr>
+            </p:nvSpPr>
+            <p:spPr>
+              <a:xfrm>
+                <a:off x="838200" y="1825625"/>
+                <a:ext cx="10515600" cy="4351200"/>
+              </a:xfrm>
+              <a:prstGeom prst="rect">
+                <a:avLst/>
+              </a:prstGeom>
+              <a:blipFill>
+                <a:blip r:embed="rId4"/>
+                <a:stretch>
+                  <a:fillRect l="-1086" b="-8187"/>
+                </a:stretch>
+              </a:blipFill>
+            </p:spPr>
+            <p:txBody>
+              <a:bodyPr/>
+              <a:lstStyle/>
+              <a:p>
+                <a:r>
+                  <a:rPr lang="ja-JP" altLang="en-US">
+                    <a:noFill/>
+                  </a:rPr>
+                  <a:t> </a:t>
+                </a:r>
+              </a:p>
+            </p:txBody>
+          </p:sp>
+        </mc:Fallback>
+      </mc:AlternateContent>
+    </p:spTree>
+    <p:extLst>
+      <p:ext uri="{BB962C8B-B14F-4D97-AF65-F5344CB8AC3E}">
+        <p14:creationId xmlns:p14="http://schemas.microsoft.com/office/powerpoint/2010/main" val="3738407797"/>
+      </p:ext>
+    </p:extLst>
+  </p:cSld>
+  <p:clrMapOvr>
+    <a:masterClrMapping/>
+  </p:clrMapOvr>
+</p:sld>
+</file>
+
+<file path=ppt/slides/slide16.xml><?xml version="1.0" encoding="utf-8"?>
+<p:sld xmlns:a="http://schemas.openxmlformats.org/drawingml/2006/main" xmlns:r="http://schemas.openxmlformats.org/officeDocument/2006/relationships" xmlns:p="http://schemas.openxmlformats.org/presentationml/2006/main">
+  <p:cSld>
+    <p:spTree>
+      <p:nvGrpSpPr>
+        <p:cNvPr id="1" name=""/>
+        <p:cNvGrpSpPr/>
+        <p:nvPr/>
+      </p:nvGrpSpPr>
+      <p:grpSpPr>
+        <a:xfrm>
+          <a:off x="0" y="0"/>
+          <a:ext cx="0" cy="0"/>
+          <a:chOff x="0" y="0"/>
+          <a:chExt cx="0" cy="0"/>
+        </a:xfrm>
+      </p:grpSpPr>
+      <p:sp>
+        <p:nvSpPr>
+          <p:cNvPr id="2" name="タイトル 1">
+            <a:extLst>
+              <a:ext uri="{FF2B5EF4-FFF2-40B4-BE49-F238E27FC236}">
+                <a16:creationId xmlns:a16="http://schemas.microsoft.com/office/drawing/2014/main" id="{3FADE1B3-2A00-6944-8C45-6FCF6E2330EC}"/>
+              </a:ext>
+            </a:extLst>
+          </p:cNvPr>
+          <p:cNvSpPr>
+            <a:spLocks noGrp="1"/>
+          </p:cNvSpPr>
+          <p:nvPr>
+            <p:ph type="title"/>
+          </p:nvPr>
+        </p:nvSpPr>
+        <p:spPr/>
+        <p:txBody>
+          <a:bodyPr/>
+          <a:lstStyle/>
+          <a:p>
+            <a:r>
+              <a:rPr kumimoji="1" lang="ja-JP" altLang="en-US"/>
+              <a:t>群の作用</a:t>
+            </a:r>
+          </a:p>
+        </p:txBody>
+      </p:sp>
+      <p:sp>
+        <p:nvSpPr>
+          <p:cNvPr id="3" name="コンテンツ プレースホルダー 2">
+            <a:extLst>
+              <a:ext uri="{FF2B5EF4-FFF2-40B4-BE49-F238E27FC236}">
+                <a16:creationId xmlns:a16="http://schemas.microsoft.com/office/drawing/2014/main" id="{E071A807-CA15-154A-B850-00A7C062A62E}"/>
+              </a:ext>
+            </a:extLst>
+          </p:cNvPr>
+          <p:cNvSpPr>
+            <a:spLocks noGrp="1"/>
+          </p:cNvSpPr>
+          <p:nvPr>
+            <p:ph idx="1"/>
+          </p:nvPr>
+        </p:nvSpPr>
+        <p:spPr/>
+        <p:txBody>
+          <a:bodyPr>
+            <a:normAutofit/>
+          </a:bodyPr>
+          <a:lstStyle/>
+          <a:p>
+            <a:r>
+              <a:rPr kumimoji="1" lang="ja-JP" altLang="en-US"/>
+              <a:t>群</a:t>
+            </a:r>
+            <a:r>
+              <a:rPr kumimoji="1" lang="en-US" altLang="ja-JP" dirty="0"/>
+              <a:t>G</a:t>
+            </a:r>
+            <a:r>
+              <a:rPr kumimoji="1" lang="ja-JP" altLang="en-US"/>
+              <a:t>の元が集合</a:t>
+            </a:r>
+            <a:r>
+              <a:rPr kumimoji="1" lang="en-US" altLang="ja-JP" dirty="0"/>
+              <a:t>A</a:t>
+            </a:r>
+            <a:r>
+              <a:rPr kumimoji="1" lang="ja-JP" altLang="en-US"/>
+              <a:t>から集合</a:t>
+            </a:r>
+            <a:r>
+              <a:rPr kumimoji="1" lang="en-US" altLang="ja-JP" dirty="0"/>
+              <a:t>A</a:t>
+            </a:r>
+            <a:r>
+              <a:rPr lang="ja-JP" altLang="en-US"/>
+              <a:t>へと</a:t>
+            </a:r>
+            <a:r>
+              <a:rPr kumimoji="1" lang="ja-JP" altLang="en-US"/>
+              <a:t>写す写像となる時</a:t>
+            </a:r>
+            <a:br>
+              <a:rPr kumimoji="1" lang="en-US" altLang="ja-JP" dirty="0"/>
+            </a:br>
+            <a:r>
+              <a:rPr kumimoji="1" lang="ja-JP" altLang="en-US"/>
+              <a:t>「群</a:t>
+            </a:r>
+            <a:r>
+              <a:rPr kumimoji="1" lang="en-US" altLang="ja-JP" dirty="0"/>
+              <a:t>G</a:t>
+            </a:r>
+            <a:r>
+              <a:rPr kumimoji="1" lang="ja-JP" altLang="en-US"/>
+              <a:t>の集合</a:t>
+            </a:r>
+            <a:r>
+              <a:rPr kumimoji="1" lang="en-US" altLang="ja-JP" dirty="0"/>
+              <a:t>A</a:t>
+            </a:r>
+            <a:r>
+              <a:rPr kumimoji="1" lang="ja-JP" altLang="en-US"/>
+              <a:t>への作用」という．</a:t>
+            </a:r>
+            <a:br>
+              <a:rPr kumimoji="1" lang="en-US" altLang="ja-JP" dirty="0"/>
+            </a:br>
+            <a:endParaRPr kumimoji="1" lang="en-US" altLang="ja-JP" dirty="0"/>
+          </a:p>
+          <a:p>
+            <a:r>
+              <a:rPr lang="ja-JP" altLang="en-US"/>
+              <a:t>集合に対して群の性質を適用させている</a:t>
+            </a:r>
+            <a:endParaRPr lang="en-US" altLang="ja-JP" dirty="0"/>
+          </a:p>
+          <a:p>
+            <a:endParaRPr lang="en-US" altLang="ja-JP" dirty="0"/>
+          </a:p>
+          <a:p>
+            <a:r>
+              <a:rPr lang="ja-JP" altLang="en-US"/>
+              <a:t>（例）ユークリッド合同変換群</a:t>
+            </a:r>
+            <a:endParaRPr lang="en-US" altLang="ja-JP" dirty="0"/>
+          </a:p>
+          <a:p>
+            <a:pPr lvl="1"/>
+            <a:r>
+              <a:rPr lang="ja-JP" altLang="en-US"/>
+              <a:t>ユークリッド合同変換群の，二次元ユークリッド平面上のすべての点の集合への作用</a:t>
+            </a:r>
+            <a:endParaRPr lang="en-US" altLang="ja-JP" dirty="0"/>
+          </a:p>
+          <a:p>
+            <a:pPr lvl="1"/>
+            <a:r>
+              <a:rPr lang="ja-JP" altLang="en-US"/>
+              <a:t>正方形は回転（や拡大，回転，反転）しても正方形</a:t>
+            </a:r>
+            <a:endParaRPr lang="en-US" altLang="ja-JP" dirty="0"/>
+          </a:p>
+        </p:txBody>
+      </p:sp>
+    </p:spTree>
+    <p:extLst>
+      <p:ext uri="{BB962C8B-B14F-4D97-AF65-F5344CB8AC3E}">
+        <p14:creationId xmlns:p14="http://schemas.microsoft.com/office/powerpoint/2010/main" val="1124779067"/>
       </p:ext>
     </p:extLst>
   </p:cSld>
@@ -10276,22 +10052,6 @@
                 </a:endParaRPr>
               </a:p>
               <a:p>
-                <a:pPr marL="0" indent="0">
-                  <a:spcBef>
-                    <a:spcPts val="1067"/>
-                  </a:spcBef>
-                  <a:buNone/>
-                </a:pPr>
-                <a:r>
-                  <a:rPr lang="ja-JP" altLang="en-US" dirty="0">
-                    <a:highlight>
-                      <a:srgbClr val="FFFFFF"/>
-                    </a:highlight>
-                  </a:rPr>
-                  <a:t>これが群であるには</a:t>
-                </a:r>
-              </a:p>
-              <a:p>
                 <a:pPr marL="609585" indent="-423323">
                   <a:spcBef>
                     <a:spcPts val="1067"/>
@@ -10529,14 +10289,6 @@
                   </a:spcBef>
                   <a:buNone/>
                 </a:pPr>
-                <a:r>
-                  <a:rPr lang="ja-JP" altLang="en-US" dirty="0">
-                    <a:highlight>
-                      <a:srgbClr val="FFFFFF"/>
-                    </a:highlight>
-                  </a:rPr>
-                  <a:t>の３つを満たしていることを確認すればよい</a:t>
-                </a:r>
                 <a:endParaRPr dirty="0">
                   <a:highlight>
                     <a:srgbClr val="FFFFFF"/>
@@ -10568,7 +10320,7 @@
               <a:blipFill>
                 <a:blip r:embed="rId3"/>
                 <a:stretch>
-                  <a:fillRect l="-1086" b="-2228"/>
+                  <a:fillRect l="-1086"/>
                 </a:stretch>
               </a:blipFill>
             </p:spPr>
@@ -10771,6 +10523,360 @@
 </p:sld>
 </file>
 
+<file path=ppt/slides/slide20.xml><?xml version="1.0" encoding="utf-8"?>
+<p:sld xmlns:a="http://schemas.openxmlformats.org/drawingml/2006/main" xmlns:r="http://schemas.openxmlformats.org/officeDocument/2006/relationships" xmlns:p="http://schemas.openxmlformats.org/presentationml/2006/main">
+  <p:cSld>
+    <p:spTree>
+      <p:nvGrpSpPr>
+        <p:cNvPr id="1" name=""/>
+        <p:cNvGrpSpPr/>
+        <p:nvPr/>
+      </p:nvGrpSpPr>
+      <p:grpSpPr>
+        <a:xfrm>
+          <a:off x="0" y="0"/>
+          <a:ext cx="0" cy="0"/>
+          <a:chOff x="0" y="0"/>
+          <a:chExt cx="0" cy="0"/>
+        </a:xfrm>
+      </p:grpSpPr>
+      <p:sp>
+        <p:nvSpPr>
+          <p:cNvPr id="2" name="タイトル 1">
+            <a:extLst>
+              <a:ext uri="{FF2B5EF4-FFF2-40B4-BE49-F238E27FC236}">
+                <a16:creationId xmlns:a16="http://schemas.microsoft.com/office/drawing/2014/main" id="{9DA69A30-AF95-324B-A5E3-8B825D4CC415}"/>
+              </a:ext>
+            </a:extLst>
+          </p:cNvPr>
+          <p:cNvSpPr>
+            <a:spLocks noGrp="1"/>
+          </p:cNvSpPr>
+          <p:nvPr>
+            <p:ph type="title"/>
+          </p:nvPr>
+        </p:nvSpPr>
+        <p:spPr/>
+        <p:txBody>
+          <a:bodyPr/>
+          <a:lstStyle/>
+          <a:p>
+            <a:r>
+              <a:rPr kumimoji="1" lang="ja-JP" altLang="en-US"/>
+              <a:t>群の種類（クラス）</a:t>
+            </a:r>
+          </a:p>
+        </p:txBody>
+      </p:sp>
+      <p:sp>
+        <p:nvSpPr>
+          <p:cNvPr id="3" name="コンテンツ プレースホルダー 2">
+            <a:extLst>
+              <a:ext uri="{FF2B5EF4-FFF2-40B4-BE49-F238E27FC236}">
+                <a16:creationId xmlns:a16="http://schemas.microsoft.com/office/drawing/2014/main" id="{D8F413E1-9001-8A49-A818-51A435D1379A}"/>
+              </a:ext>
+            </a:extLst>
+          </p:cNvPr>
+          <p:cNvSpPr>
+            <a:spLocks noGrp="1"/>
+          </p:cNvSpPr>
+          <p:nvPr>
+            <p:ph idx="1"/>
+          </p:nvPr>
+        </p:nvSpPr>
+        <p:spPr>
+          <a:xfrm>
+            <a:off x="838200" y="1354238"/>
+            <a:ext cx="10515600" cy="4822725"/>
+          </a:xfrm>
+        </p:spPr>
+        <p:txBody>
+          <a:bodyPr>
+            <a:normAutofit/>
+          </a:bodyPr>
+          <a:lstStyle/>
+          <a:p>
+            <a:pPr marL="0" indent="0">
+              <a:buNone/>
+            </a:pPr>
+            <a:r>
+              <a:rPr kumimoji="1" lang="ja-JP" altLang="en-US"/>
+              <a:t>構造で分けた際に群の元（＝写像）の性質で分けることができる</a:t>
+            </a:r>
+            <a:endParaRPr kumimoji="1" lang="en-US" altLang="ja-JP" dirty="0"/>
+          </a:p>
+          <a:p>
+            <a:pPr marL="0" indent="0">
+              <a:buNone/>
+            </a:pPr>
+            <a:endParaRPr lang="en-US" altLang="ja-JP" dirty="0"/>
+          </a:p>
+          <a:p>
+            <a:r>
+              <a:rPr kumimoji="1" lang="ja-JP" altLang="en-US"/>
+              <a:t>置換群：</a:t>
+            </a:r>
+            <a:r>
+              <a:rPr lang="ja-JP" altLang="en-US">
+                <a:solidFill>
+                  <a:schemeClr val="tx1">
+                    <a:lumMod val="50000"/>
+                    <a:lumOff val="50000"/>
+                  </a:schemeClr>
+                </a:solidFill>
+              </a:rPr>
+              <a:t>任意の集合</a:t>
+            </a:r>
+            <a:r>
+              <a:rPr lang="en-US" altLang="ja-JP" dirty="0">
+                <a:solidFill>
+                  <a:schemeClr val="tx1">
+                    <a:lumMod val="50000"/>
+                    <a:lumOff val="50000"/>
+                  </a:schemeClr>
+                </a:solidFill>
+              </a:rPr>
+              <a:t>A</a:t>
+            </a:r>
+            <a:r>
+              <a:rPr lang="ja-JP" altLang="en-US">
+                <a:solidFill>
+                  <a:schemeClr val="tx1">
+                    <a:lumMod val="50000"/>
+                    <a:lumOff val="50000"/>
+                  </a:schemeClr>
+                </a:solidFill>
+              </a:rPr>
+              <a:t>から集合</a:t>
+            </a:r>
+            <a:r>
+              <a:rPr lang="en-US" altLang="ja-JP" dirty="0">
+                <a:solidFill>
+                  <a:schemeClr val="tx1">
+                    <a:lumMod val="50000"/>
+                    <a:lumOff val="50000"/>
+                  </a:schemeClr>
+                </a:solidFill>
+              </a:rPr>
+              <a:t>A</a:t>
+            </a:r>
+            <a:r>
+              <a:rPr lang="ja-JP" altLang="en-US">
+                <a:solidFill>
+                  <a:schemeClr val="tx1">
+                    <a:lumMod val="50000"/>
+                    <a:lumOff val="50000"/>
+                  </a:schemeClr>
+                </a:solidFill>
+              </a:rPr>
+              <a:t>への全単射</a:t>
+            </a:r>
+            <a:endParaRPr kumimoji="1" lang="en-US" altLang="ja-JP" dirty="0">
+              <a:solidFill>
+                <a:schemeClr val="tx1">
+                  <a:lumMod val="50000"/>
+                  <a:lumOff val="50000"/>
+                </a:schemeClr>
+              </a:solidFill>
+            </a:endParaRPr>
+          </a:p>
+          <a:p>
+            <a:r>
+              <a:rPr lang="ja-JP" altLang="en-US"/>
+              <a:t>行列群：</a:t>
+            </a:r>
+            <a:r>
+              <a:rPr lang="ja-JP" altLang="en-US">
+                <a:solidFill>
+                  <a:schemeClr val="tx1">
+                    <a:lumMod val="50000"/>
+                    <a:lumOff val="50000"/>
+                  </a:schemeClr>
+                </a:solidFill>
+              </a:rPr>
+              <a:t>正則行列を集めた群</a:t>
+            </a:r>
+            <a:endParaRPr lang="en-US" altLang="ja-JP" dirty="0">
+              <a:solidFill>
+                <a:schemeClr val="tx1">
+                  <a:lumMod val="50000"/>
+                  <a:lumOff val="50000"/>
+                </a:schemeClr>
+              </a:solidFill>
+            </a:endParaRPr>
+          </a:p>
+          <a:p>
+            <a:r>
+              <a:rPr kumimoji="1" lang="ja-JP" altLang="en-US"/>
+              <a:t>変換群</a:t>
+            </a:r>
+            <a:r>
+              <a:rPr lang="ja-JP" altLang="en-US"/>
+              <a:t>：</a:t>
+            </a:r>
+            <a:r>
+              <a:rPr lang="ja-JP" altLang="en-US">
+                <a:solidFill>
+                  <a:schemeClr val="tx1">
+                    <a:lumMod val="50000"/>
+                    <a:lumOff val="50000"/>
+                  </a:schemeClr>
+                </a:solidFill>
+              </a:rPr>
+              <a:t>集合</a:t>
+            </a:r>
+            <a:r>
+              <a:rPr lang="en-US" altLang="ja-JP" dirty="0">
+                <a:solidFill>
+                  <a:schemeClr val="tx1">
+                    <a:lumMod val="50000"/>
+                    <a:lumOff val="50000"/>
+                  </a:schemeClr>
+                </a:solidFill>
+              </a:rPr>
+              <a:t>A</a:t>
+            </a:r>
+            <a:r>
+              <a:rPr lang="ja-JP" altLang="en-US">
+                <a:solidFill>
+                  <a:schemeClr val="tx1">
+                    <a:lumMod val="50000"/>
+                    <a:lumOff val="50000"/>
+                  </a:schemeClr>
+                </a:solidFill>
+              </a:rPr>
+              <a:t>から集合</a:t>
+            </a:r>
+            <a:r>
+              <a:rPr lang="en-US" altLang="ja-JP" dirty="0">
+                <a:solidFill>
+                  <a:schemeClr val="tx1">
+                    <a:lumMod val="50000"/>
+                    <a:lumOff val="50000"/>
+                  </a:schemeClr>
+                </a:solidFill>
+              </a:rPr>
+              <a:t>A</a:t>
+            </a:r>
+            <a:r>
+              <a:rPr lang="ja-JP" altLang="en-US">
+                <a:solidFill>
+                  <a:schemeClr val="tx1">
+                    <a:lumMod val="50000"/>
+                    <a:lumOff val="50000"/>
+                  </a:schemeClr>
+                </a:solidFill>
+              </a:rPr>
+              <a:t>への構造を保つ写像全体の集合．</a:t>
+            </a:r>
+            <a:br>
+              <a:rPr lang="en-US" altLang="ja-JP" dirty="0">
+                <a:solidFill>
+                  <a:schemeClr val="tx1">
+                    <a:lumMod val="50000"/>
+                    <a:lumOff val="50000"/>
+                  </a:schemeClr>
+                </a:solidFill>
+              </a:rPr>
+            </a:br>
+            <a:r>
+              <a:rPr lang="en-US" altLang="ja-JP" dirty="0">
+                <a:solidFill>
+                  <a:schemeClr val="tx1">
+                    <a:lumMod val="50000"/>
+                    <a:lumOff val="50000"/>
+                  </a:schemeClr>
+                </a:solidFill>
+              </a:rPr>
+              <a:t>		</a:t>
+            </a:r>
+            <a:r>
+              <a:rPr lang="ja-JP" altLang="en-US">
+                <a:solidFill>
+                  <a:schemeClr val="tx1">
+                    <a:lumMod val="50000"/>
+                    <a:lumOff val="50000"/>
+                  </a:schemeClr>
+                </a:solidFill>
+              </a:rPr>
+              <a:t>置換群と行列群は変換群の特別な場合</a:t>
+            </a:r>
+            <a:endParaRPr lang="en-US" altLang="ja-JP" dirty="0">
+              <a:solidFill>
+                <a:schemeClr val="tx1">
+                  <a:lumMod val="50000"/>
+                  <a:lumOff val="50000"/>
+                </a:schemeClr>
+              </a:solidFill>
+            </a:endParaRPr>
+          </a:p>
+          <a:p>
+            <a:r>
+              <a:rPr kumimoji="1" lang="ja-JP" altLang="en-US"/>
+              <a:t>位相群・代数群</a:t>
+            </a:r>
+            <a:r>
+              <a:rPr lang="ja-JP" altLang="en-US"/>
+              <a:t>：</a:t>
+            </a:r>
+            <a:r>
+              <a:rPr lang="ja-JP" altLang="en-US">
+                <a:solidFill>
+                  <a:schemeClr val="tx1">
+                    <a:lumMod val="50000"/>
+                    <a:lumOff val="50000"/>
+                  </a:schemeClr>
+                </a:solidFill>
+              </a:rPr>
+              <a:t>変換群の構造に連続性を加えたもの</a:t>
+            </a:r>
+            <a:endParaRPr lang="en-US" altLang="ja-JP" dirty="0">
+              <a:solidFill>
+                <a:schemeClr val="tx1">
+                  <a:lumMod val="50000"/>
+                  <a:lumOff val="50000"/>
+                </a:schemeClr>
+              </a:solidFill>
+            </a:endParaRPr>
+          </a:p>
+          <a:p>
+            <a:pPr marL="0" indent="0">
+              <a:buNone/>
+            </a:pPr>
+            <a:endParaRPr lang="en-US" altLang="ja-JP" dirty="0">
+              <a:solidFill>
+                <a:schemeClr val="tx1">
+                  <a:lumMod val="50000"/>
+                  <a:lumOff val="50000"/>
+                </a:schemeClr>
+              </a:solidFill>
+            </a:endParaRPr>
+          </a:p>
+          <a:p>
+            <a:pPr marL="0" indent="0">
+              <a:buNone/>
+            </a:pPr>
+            <a:r>
+              <a:rPr lang="ja-JP" altLang="en-US"/>
+              <a:t>「作用」というもので群を分類している</a:t>
+            </a:r>
+            <a:endParaRPr lang="en-US" altLang="ja-JP" dirty="0"/>
+          </a:p>
+        </p:txBody>
+      </p:sp>
+    </p:spTree>
+    <p:extLst>
+      <p:ext uri="{BB962C8B-B14F-4D97-AF65-F5344CB8AC3E}">
+        <p14:creationId xmlns:p14="http://schemas.microsoft.com/office/powerpoint/2010/main" val="3985254540"/>
+      </p:ext>
+    </p:extLst>
+  </p:cSld>
+  <p:clrMapOvr>
+    <a:masterClrMapping/>
+  </p:clrMapOvr>
+</p:sld>
+</file>
+
 <file path=ppt/slides/slide3.xml><?xml version="1.0" encoding="utf-8"?>
 <p:sld xmlns:a="http://schemas.openxmlformats.org/drawingml/2006/main" xmlns:r="http://schemas.openxmlformats.org/officeDocument/2006/relationships" xmlns:p="http://schemas.openxmlformats.org/presentationml/2006/main">
   <p:cSld>
@@ -10844,7 +10950,7 @@
         <p:spPr/>
         <p:txBody>
           <a:bodyPr>
-            <a:normAutofit lnSpcReduction="10000"/>
+            <a:normAutofit/>
           </a:bodyPr>
           <a:lstStyle/>
           <a:p>
@@ -10857,11 +10963,18 @@
           <a:p>
             <a:r>
               <a:rPr kumimoji="1" lang="ja-JP" altLang="en-US"/>
-              <a:t>計算自体の関係を考えるので，対象物は数である必要はなくな</a:t>
+              <a:t>計算自体の関係を考えるので，対象は数である必要はなくな</a:t>
             </a:r>
             <a:r>
               <a:rPr lang="ja-JP" altLang="en-US"/>
-              <a:t>る．</a:t>
+              <a:t>る．現代数学では基本的に集合を対象とする．</a:t>
+            </a:r>
+            <a:endParaRPr kumimoji="1" lang="en-US" altLang="ja-JP" dirty="0"/>
+          </a:p>
+          <a:p>
+            <a:r>
+              <a:rPr lang="ja-JP" altLang="en-US"/>
+              <a:t>計算自体の関係とはなんぞや？</a:t>
             </a:r>
             <a:br>
               <a:rPr lang="en-US" altLang="ja-JP" dirty="0"/>
@@ -10872,29 +10985,7 @@
             </a:r>
             <a:r>
               <a:rPr lang="ja-JP" altLang="en-US"/>
-              <a:t>さらに</a:t>
-            </a:r>
-            <a:r>
-              <a:rPr kumimoji="1" lang="ja-JP" altLang="en-US"/>
-              <a:t>抽象的な思考ができる．</a:t>
-            </a:r>
-            <a:endParaRPr kumimoji="1" lang="en-US" altLang="ja-JP" dirty="0"/>
-          </a:p>
-          <a:p>
-            <a:r>
-              <a:rPr lang="ja-JP" altLang="en-US"/>
-              <a:t>計算自体の関係とはなんぞや？</a:t>
-            </a:r>
-            <a:br>
-              <a:rPr lang="en-US" altLang="ja-JP" dirty="0"/>
-            </a:br>
-            <a:r>
-              <a:rPr lang="en-US" altLang="ja-JP" dirty="0"/>
-              <a:t>	→</a:t>
-            </a:r>
-            <a:r>
-              <a:rPr lang="ja-JP" altLang="en-US"/>
-              <a:t>計算（演算，写像）がどのような構造をしているか</a:t>
+              <a:t>計算（演算，写像）がどのような構造をしているか．</a:t>
             </a:r>
             <a:endParaRPr lang="en-US" altLang="ja-JP" dirty="0"/>
           </a:p>
@@ -10920,14 +11011,7 @@
             </a:r>
             <a:r>
               <a:rPr kumimoji="1" lang="ja-JP" altLang="en-US"/>
-              <a:t>構造を「群（もしくは抽象群）」という</a:t>
-            </a:r>
-            <a:br>
-              <a:rPr kumimoji="1" lang="en-US" altLang="ja-JP" dirty="0"/>
-            </a:br>
-            <a:r>
-              <a:rPr kumimoji="1" lang="ja-JP" altLang="en-US"/>
-              <a:t>群は写像の集合</a:t>
+              <a:t>構造を「群（もしくは抽象群）」という．</a:t>
             </a:r>
           </a:p>
         </p:txBody>
@@ -10967,7 +11051,7 @@
           <p:cNvPr id="2" name="タイトル 1">
             <a:extLst>
               <a:ext uri="{FF2B5EF4-FFF2-40B4-BE49-F238E27FC236}">
-                <a16:creationId xmlns:a16="http://schemas.microsoft.com/office/drawing/2014/main" id="{721C6993-1234-7848-B600-AC0454A2EC61}"/>
+                <a16:creationId xmlns:a16="http://schemas.microsoft.com/office/drawing/2014/main" id="{07AC44CD-3254-E849-9B9D-65A759B6B5D0}"/>
               </a:ext>
             </a:extLst>
           </p:cNvPr>
@@ -10984,12 +11068,8 @@
           <a:lstStyle/>
           <a:p>
             <a:r>
-              <a:rPr lang="ja-JP" altLang="en-US"/>
-              <a:t>計算</a:t>
-            </a:r>
-            <a:r>
-              <a:rPr kumimoji="1" lang="ja-JP" altLang="en-US"/>
-              <a:t>に着目するとは</a:t>
+              <a:rPr kumimoji="1" lang="ja-JP" altLang="en-US"/>
+              <a:t>群とは？</a:t>
             </a:r>
           </a:p>
         </p:txBody>
@@ -10999,7 +11079,7 @@
           <p:cNvPr id="3" name="コンテンツ プレースホルダー 2">
             <a:extLst>
               <a:ext uri="{FF2B5EF4-FFF2-40B4-BE49-F238E27FC236}">
-                <a16:creationId xmlns:a16="http://schemas.microsoft.com/office/drawing/2014/main" id="{1D161B91-3540-F34A-83DA-68E854027669}"/>
+                <a16:creationId xmlns:a16="http://schemas.microsoft.com/office/drawing/2014/main" id="{C7CA7C95-7ECE-CC49-846B-46C083B48106}"/>
               </a:ext>
             </a:extLst>
           </p:cNvPr>
@@ -11016,69 +11096,38 @@
           <a:lstStyle/>
           <a:p>
             <a:r>
+              <a:rPr kumimoji="1" lang="ja-JP" altLang="en-US"/>
+              <a:t>集合はモノを集めただけ．</a:t>
+            </a:r>
+            <a:endParaRPr kumimoji="1" lang="en-US" altLang="ja-JP" dirty="0"/>
+          </a:p>
+          <a:p>
+            <a:r>
               <a:rPr lang="ja-JP" altLang="en-US"/>
-              <a:t>実数の和とベクトルの和を考えてみよう．</a:t>
-            </a:r>
+              <a:t>集合の中でも</a:t>
+            </a:r>
+            <a:r>
+              <a:rPr kumimoji="1" lang="ja-JP" altLang="en-US"/>
+              <a:t>，共通の演算ができるものを集めた集合を考える．</a:t>
+            </a:r>
+            <a:endParaRPr kumimoji="1" lang="en-US" altLang="ja-JP" dirty="0"/>
+          </a:p>
+          <a:p>
             <a:endParaRPr lang="en-US" altLang="ja-JP" dirty="0"/>
           </a:p>
           <a:p>
             <a:r>
-              <a:rPr kumimoji="1" lang="ja-JP" altLang="en-US"/>
-              <a:t>対象物に着目</a:t>
-            </a:r>
-            <a:br>
-              <a:rPr kumimoji="1" lang="en-US" altLang="ja-JP" dirty="0"/>
-            </a:br>
-            <a:r>
-              <a:rPr kumimoji="1" lang="en-US" altLang="ja-JP" dirty="0"/>
-              <a:t>→</a:t>
-            </a:r>
-            <a:r>
-              <a:rPr kumimoji="1" lang="ja-JP" altLang="en-US"/>
-              <a:t>実数とベクトルは全くの別物である</a:t>
-            </a:r>
-            <a:endParaRPr lang="en-US" altLang="ja-JP" dirty="0"/>
-          </a:p>
-          <a:p>
-            <a:r>
-              <a:rPr kumimoji="1" lang="ja-JP" altLang="en-US"/>
-              <a:t>演算に着目</a:t>
-            </a:r>
-            <a:br>
-              <a:rPr kumimoji="1" lang="en-US" altLang="ja-JP" dirty="0"/>
-            </a:br>
-            <a:r>
-              <a:rPr kumimoji="1" lang="en-US" altLang="ja-JP" dirty="0"/>
-              <a:t>→</a:t>
-            </a:r>
-            <a:r>
-              <a:rPr kumimoji="1" lang="ja-JP" altLang="en-US"/>
-              <a:t>同じ</a:t>
-            </a:r>
-            <a:r>
-              <a:rPr kumimoji="1" lang="en-US" altLang="ja-JP" dirty="0"/>
-              <a:t>”+”</a:t>
-            </a:r>
-            <a:r>
-              <a:rPr kumimoji="1" lang="ja-JP" altLang="en-US"/>
-              <a:t>という演算（写像）を考えた場合，実数であれベクトルであれ，この</a:t>
-            </a:r>
-            <a:r>
-              <a:rPr kumimoji="1" lang="en-US" altLang="ja-JP" dirty="0"/>
-              <a:t>”+”</a:t>
-            </a:r>
-            <a:r>
-              <a:rPr kumimoji="1" lang="ja-JP" altLang="en-US"/>
-              <a:t>という演算（＝写像）で包括することができる．</a:t>
-            </a:r>
-            <a:endParaRPr kumimoji="1" lang="en-US" altLang="ja-JP" dirty="0"/>
+              <a:rPr lang="ja-JP" altLang="en-US"/>
+              <a:t>この集合と演算を合わせたものを群という．</a:t>
+            </a:r>
+            <a:endParaRPr kumimoji="1" lang="ja-JP" altLang="en-US"/>
           </a:p>
         </p:txBody>
       </p:sp>
     </p:spTree>
     <p:extLst>
       <p:ext uri="{BB962C8B-B14F-4D97-AF65-F5344CB8AC3E}">
-        <p14:creationId xmlns:p14="http://schemas.microsoft.com/office/powerpoint/2010/main" val="646266918"/>
+        <p14:creationId xmlns:p14="http://schemas.microsoft.com/office/powerpoint/2010/main" val="3490278928"/>
       </p:ext>
     </p:extLst>
   </p:cSld>
@@ -11523,7 +11572,7 @@
           <p:cNvPr id="2" name="タイトル 1">
             <a:extLst>
               <a:ext uri="{FF2B5EF4-FFF2-40B4-BE49-F238E27FC236}">
-                <a16:creationId xmlns:a16="http://schemas.microsoft.com/office/drawing/2014/main" id="{9DA69A30-AF95-324B-A5E3-8B825D4CC415}"/>
+                <a16:creationId xmlns:a16="http://schemas.microsoft.com/office/drawing/2014/main" id="{F74B3020-F4CD-5E4A-A772-CCD193FF28DB}"/>
               </a:ext>
             </a:extLst>
           </p:cNvPr>
@@ -11541,311 +11590,254 @@
           <a:p>
             <a:r>
               <a:rPr kumimoji="1" lang="ja-JP" altLang="en-US"/>
-              <a:t>群の種類（クラス）</a:t>
+              <a:t>群の定義を見ていく</a:t>
             </a:r>
           </a:p>
         </p:txBody>
       </p:sp>
-      <p:sp>
-        <p:nvSpPr>
-          <p:cNvPr id="3" name="コンテンツ プレースホルダー 2">
-            <a:extLst>
-              <a:ext uri="{FF2B5EF4-FFF2-40B4-BE49-F238E27FC236}">
-                <a16:creationId xmlns:a16="http://schemas.microsoft.com/office/drawing/2014/main" id="{D8F413E1-9001-8A49-A818-51A435D1379A}"/>
-              </a:ext>
-            </a:extLst>
-          </p:cNvPr>
-          <p:cNvSpPr>
-            <a:spLocks noGrp="1"/>
-          </p:cNvSpPr>
-          <p:nvPr>
-            <p:ph idx="1"/>
-          </p:nvPr>
-        </p:nvSpPr>
-        <p:spPr>
-          <a:xfrm>
-            <a:off x="838200" y="1354238"/>
-            <a:ext cx="10515600" cy="4822725"/>
-          </a:xfrm>
-        </p:spPr>
-        <p:txBody>
-          <a:bodyPr>
-            <a:normAutofit/>
-          </a:bodyPr>
-          <a:lstStyle/>
-          <a:p>
-            <a:pPr marL="0" indent="0">
-              <a:buNone/>
-            </a:pPr>
-            <a:r>
-              <a:rPr kumimoji="1" lang="ja-JP" altLang="en-US"/>
-              <a:t>構造で分けた際に群の元（＝写像）の性質で分けることができる</a:t>
-            </a:r>
-            <a:endParaRPr kumimoji="1" lang="en-US" altLang="ja-JP" dirty="0"/>
-          </a:p>
-          <a:p>
-            <a:pPr marL="0" indent="0">
-              <a:buNone/>
-            </a:pPr>
-            <a:endParaRPr lang="en-US" altLang="ja-JP" dirty="0"/>
-          </a:p>
-          <a:p>
-            <a:r>
-              <a:rPr kumimoji="1" lang="ja-JP" altLang="en-US"/>
-              <a:t>置換群：</a:t>
-            </a:r>
-            <a:r>
-              <a:rPr lang="ja-JP" altLang="en-US">
-                <a:solidFill>
-                  <a:schemeClr val="tx1">
-                    <a:lumMod val="50000"/>
-                    <a:lumOff val="50000"/>
-                  </a:schemeClr>
-                </a:solidFill>
-              </a:rPr>
-              <a:t>任意の集合</a:t>
-            </a:r>
-            <a:r>
-              <a:rPr lang="en-US" altLang="ja-JP" dirty="0">
-                <a:solidFill>
-                  <a:schemeClr val="tx1">
-                    <a:lumMod val="50000"/>
-                    <a:lumOff val="50000"/>
-                  </a:schemeClr>
-                </a:solidFill>
-              </a:rPr>
-              <a:t>A</a:t>
-            </a:r>
-            <a:r>
-              <a:rPr lang="ja-JP" altLang="en-US">
-                <a:solidFill>
-                  <a:schemeClr val="tx1">
-                    <a:lumMod val="50000"/>
-                    <a:lumOff val="50000"/>
-                  </a:schemeClr>
-                </a:solidFill>
-              </a:rPr>
-              <a:t>から集合</a:t>
-            </a:r>
-            <a:r>
-              <a:rPr lang="en-US" altLang="ja-JP" dirty="0">
-                <a:solidFill>
-                  <a:schemeClr val="tx1">
-                    <a:lumMod val="50000"/>
-                    <a:lumOff val="50000"/>
-                  </a:schemeClr>
-                </a:solidFill>
-              </a:rPr>
-              <a:t>A</a:t>
-            </a:r>
-            <a:r>
-              <a:rPr lang="ja-JP" altLang="en-US">
-                <a:solidFill>
-                  <a:schemeClr val="tx1">
-                    <a:lumMod val="50000"/>
-                    <a:lumOff val="50000"/>
-                  </a:schemeClr>
-                </a:solidFill>
-              </a:rPr>
-              <a:t>への全単射</a:t>
-            </a:r>
-            <a:endParaRPr kumimoji="1" lang="en-US" altLang="ja-JP" dirty="0">
-              <a:solidFill>
-                <a:schemeClr val="tx1">
-                  <a:lumMod val="50000"/>
-                  <a:lumOff val="50000"/>
-                </a:schemeClr>
-              </a:solidFill>
-            </a:endParaRPr>
-          </a:p>
-          <a:p>
-            <a:r>
-              <a:rPr lang="ja-JP" altLang="en-US"/>
-              <a:t>行列群：</a:t>
-            </a:r>
-            <a:r>
-              <a:rPr lang="ja-JP" altLang="en-US">
-                <a:solidFill>
-                  <a:schemeClr val="tx1">
-                    <a:lumMod val="50000"/>
-                    <a:lumOff val="50000"/>
-                  </a:schemeClr>
-                </a:solidFill>
-              </a:rPr>
-              <a:t>正則行列を集めた群</a:t>
-            </a:r>
-            <a:endParaRPr lang="en-US" altLang="ja-JP" dirty="0">
-              <a:solidFill>
-                <a:schemeClr val="tx1">
-                  <a:lumMod val="50000"/>
-                  <a:lumOff val="50000"/>
-                </a:schemeClr>
-              </a:solidFill>
-            </a:endParaRPr>
-          </a:p>
-          <a:p>
-            <a:r>
-              <a:rPr kumimoji="1" lang="ja-JP" altLang="en-US"/>
-              <a:t>変換群</a:t>
-            </a:r>
-            <a:r>
-              <a:rPr lang="ja-JP" altLang="en-US"/>
-              <a:t>：</a:t>
-            </a:r>
-            <a:r>
-              <a:rPr lang="ja-JP" altLang="en-US">
-                <a:solidFill>
-                  <a:schemeClr val="tx1">
-                    <a:lumMod val="50000"/>
-                    <a:lumOff val="50000"/>
-                  </a:schemeClr>
-                </a:solidFill>
-              </a:rPr>
-              <a:t>集合</a:t>
-            </a:r>
-            <a:r>
-              <a:rPr lang="en-US" altLang="ja-JP" dirty="0">
-                <a:solidFill>
-                  <a:schemeClr val="tx1">
-                    <a:lumMod val="50000"/>
-                    <a:lumOff val="50000"/>
-                  </a:schemeClr>
-                </a:solidFill>
-              </a:rPr>
-              <a:t>A</a:t>
-            </a:r>
-            <a:r>
-              <a:rPr lang="ja-JP" altLang="en-US">
-                <a:solidFill>
-                  <a:schemeClr val="tx1">
-                    <a:lumMod val="50000"/>
-                    <a:lumOff val="50000"/>
-                  </a:schemeClr>
-                </a:solidFill>
-              </a:rPr>
-              <a:t>から集合</a:t>
-            </a:r>
-            <a:r>
-              <a:rPr lang="en-US" altLang="ja-JP" dirty="0">
-                <a:solidFill>
-                  <a:schemeClr val="tx1">
-                    <a:lumMod val="50000"/>
-                    <a:lumOff val="50000"/>
-                  </a:schemeClr>
-                </a:solidFill>
-              </a:rPr>
-              <a:t>A</a:t>
-            </a:r>
-            <a:r>
-              <a:rPr lang="ja-JP" altLang="en-US">
-                <a:solidFill>
-                  <a:schemeClr val="tx1">
-                    <a:lumMod val="50000"/>
-                    <a:lumOff val="50000"/>
-                  </a:schemeClr>
-                </a:solidFill>
-              </a:rPr>
-              <a:t>への構造を保つ写像全体の集合．</a:t>
-            </a:r>
-            <a:br>
-              <a:rPr lang="en-US" altLang="ja-JP" dirty="0">
-                <a:solidFill>
-                  <a:schemeClr val="tx1">
-                    <a:lumMod val="50000"/>
-                    <a:lumOff val="50000"/>
-                  </a:schemeClr>
-                </a:solidFill>
-              </a:rPr>
-            </a:br>
-            <a:r>
-              <a:rPr lang="en-US" altLang="ja-JP" dirty="0">
-                <a:solidFill>
-                  <a:schemeClr val="tx1">
-                    <a:lumMod val="50000"/>
-                    <a:lumOff val="50000"/>
-                  </a:schemeClr>
-                </a:solidFill>
-              </a:rPr>
-              <a:t>		</a:t>
-            </a:r>
-            <a:r>
-              <a:rPr lang="ja-JP" altLang="en-US">
-                <a:solidFill>
-                  <a:schemeClr val="tx1">
-                    <a:lumMod val="50000"/>
-                    <a:lumOff val="50000"/>
-                  </a:schemeClr>
-                </a:solidFill>
-              </a:rPr>
-              <a:t>置換群と行列群は変換群の特別な場合</a:t>
-            </a:r>
-            <a:endParaRPr lang="en-US" altLang="ja-JP" dirty="0">
-              <a:solidFill>
-                <a:schemeClr val="tx1">
-                  <a:lumMod val="50000"/>
-                  <a:lumOff val="50000"/>
-                </a:schemeClr>
-              </a:solidFill>
-            </a:endParaRPr>
-          </a:p>
-          <a:p>
-            <a:r>
-              <a:rPr kumimoji="1" lang="ja-JP" altLang="en-US"/>
-              <a:t>位相群・代数群</a:t>
-            </a:r>
-            <a:r>
-              <a:rPr lang="ja-JP" altLang="en-US"/>
-              <a:t>：</a:t>
-            </a:r>
-            <a:r>
-              <a:rPr lang="ja-JP" altLang="en-US">
-                <a:solidFill>
-                  <a:schemeClr val="tx1">
-                    <a:lumMod val="50000"/>
-                    <a:lumOff val="50000"/>
-                  </a:schemeClr>
-                </a:solidFill>
-              </a:rPr>
-              <a:t>変換群の構造に連続性を加えたもの</a:t>
-            </a:r>
-            <a:endParaRPr lang="en-US" altLang="ja-JP" dirty="0">
-              <a:solidFill>
-                <a:schemeClr val="tx1">
-                  <a:lumMod val="50000"/>
-                  <a:lumOff val="50000"/>
-                </a:schemeClr>
-              </a:solidFill>
-            </a:endParaRPr>
-          </a:p>
-          <a:p>
-            <a:pPr marL="0" indent="0">
-              <a:buNone/>
-            </a:pPr>
-            <a:endParaRPr lang="en-US" altLang="ja-JP" dirty="0">
-              <a:solidFill>
-                <a:schemeClr val="tx1">
-                  <a:lumMod val="50000"/>
-                  <a:lumOff val="50000"/>
-                </a:schemeClr>
-              </a:solidFill>
-            </a:endParaRPr>
-          </a:p>
-          <a:p>
-            <a:pPr marL="0" indent="0">
-              <a:buNone/>
-            </a:pPr>
-            <a:r>
-              <a:rPr lang="ja-JP" altLang="en-US"/>
-              <a:t>実は「作用」というもので群を分類している</a:t>
-            </a:r>
-            <a:endParaRPr lang="en-US" altLang="ja-JP" dirty="0"/>
-          </a:p>
-        </p:txBody>
-      </p:sp>
+      <mc:AlternateContent xmlns:mc="http://schemas.openxmlformats.org/markup-compatibility/2006">
+        <mc:Choice xmlns:a14="http://schemas.microsoft.com/office/drawing/2010/main" Requires="a14">
+          <p:sp>
+            <p:nvSpPr>
+              <p:cNvPr id="3" name="コンテンツ プレースホルダー 2">
+                <a:extLst>
+                  <a:ext uri="{FF2B5EF4-FFF2-40B4-BE49-F238E27FC236}">
+                    <a16:creationId xmlns:a16="http://schemas.microsoft.com/office/drawing/2014/main" id="{9409C43E-6ED9-F742-9D17-57ABED493EBF}"/>
+                  </a:ext>
+                </a:extLst>
+              </p:cNvPr>
+              <p:cNvSpPr>
+                <a:spLocks noGrp="1"/>
+              </p:cNvSpPr>
+              <p:nvPr>
+                <p:ph idx="1"/>
+              </p:nvPr>
+            </p:nvSpPr>
+            <p:spPr/>
+            <p:txBody>
+              <a:bodyPr/>
+              <a:lstStyle/>
+              <a:p>
+                <a:r>
+                  <a:rPr kumimoji="1" lang="ja-JP" altLang="en-US"/>
+                  <a:t>群の定義</a:t>
+                </a:r>
+                <a:endParaRPr kumimoji="1" lang="en-US" altLang="ja-JP" dirty="0"/>
+              </a:p>
+              <a:p>
+                <a:r>
+                  <a:rPr lang="ja-JP" altLang="en-US"/>
+                  <a:t>群の派生</a:t>
+                </a:r>
+                <a:endParaRPr lang="en-US" altLang="ja-JP" dirty="0"/>
+              </a:p>
+              <a:p>
+                <a:r>
+                  <a:rPr kumimoji="1" lang="ja-JP" altLang="en-US"/>
+                  <a:t>群の例：</a:t>
+                </a:r>
+                <a:r>
+                  <a:rPr lang="fr-CA" altLang="ja" dirty="0"/>
+                  <a:t> </a:t>
+                </a:r>
+                <a14:m>
+                  <m:oMath xmlns:m="http://schemas.openxmlformats.org/officeDocument/2006/math">
+                    <m:r>
+                      <m:rPr>
+                        <m:sty m:val="p"/>
+                      </m:rPr>
+                      <a:rPr lang="fr-CA" altLang="ja">
+                        <a:latin typeface="Cambria Math" panose="02040503050406030204" pitchFamily="18" charset="0"/>
+                      </a:rPr>
+                      <m:t>G</m:t>
+                    </m:r>
+                    <m:r>
+                      <m:rPr>
+                        <m:sty m:val="p"/>
+                      </m:rPr>
+                      <a:rPr lang="en-US" altLang="ja">
+                        <a:latin typeface="Cambria Math" panose="02040503050406030204" pitchFamily="18" charset="0"/>
+                      </a:rPr>
+                      <m:t>L</m:t>
+                    </m:r>
+                    <m:d>
+                      <m:dPr>
+                        <m:ctrlPr>
+                          <a:rPr lang="en-US" altLang="ja" i="1">
+                            <a:latin typeface="Cambria Math" panose="02040503050406030204" pitchFamily="18" charset="0"/>
+                          </a:rPr>
+                        </m:ctrlPr>
+                      </m:dPr>
+                      <m:e>
+                        <m:r>
+                          <m:rPr>
+                            <m:sty m:val="p"/>
+                          </m:rPr>
+                          <a:rPr lang="en-US" altLang="ja">
+                            <a:latin typeface="Cambria Math" panose="02040503050406030204" pitchFamily="18" charset="0"/>
+                          </a:rPr>
+                          <m:t>n</m:t>
+                        </m:r>
+                        <m:r>
+                          <a:rPr lang="en-US" altLang="ja">
+                            <a:latin typeface="Cambria Math" panose="02040503050406030204" pitchFamily="18" charset="0"/>
+                          </a:rPr>
+                          <m:t>;</m:t>
+                        </m:r>
+                        <m:r>
+                          <a:rPr lang="en-US" altLang="ja">
+                            <a:latin typeface="Cambria Math" panose="02040503050406030204" pitchFamily="18" charset="0"/>
+                            <a:ea typeface="Cambria Math" panose="02040503050406030204" pitchFamily="18" charset="0"/>
+                          </a:rPr>
+                          <m:t>ℂ</m:t>
+                        </m:r>
+                      </m:e>
+                    </m:d>
+                  </m:oMath>
+                </a14:m>
+                <a:endParaRPr kumimoji="1" lang="en-US" altLang="ja-JP" dirty="0"/>
+              </a:p>
+              <a:p>
+                <a:r>
+                  <a:rPr lang="ja-JP" altLang="en-US"/>
+                  <a:t>部分群</a:t>
+                </a:r>
+                <a:endParaRPr lang="en-US" altLang="ja-JP" dirty="0"/>
+              </a:p>
+              <a:p>
+                <a:pPr lvl="1"/>
+                <a:r>
+                  <a:rPr kumimoji="1" lang="ja-JP" altLang="en-US"/>
+                  <a:t>定義</a:t>
+                </a:r>
+                <a:r>
+                  <a:rPr lang="ja-JP" altLang="en-US"/>
+                  <a:t>・性質</a:t>
+                </a:r>
+                <a:endParaRPr lang="en-US" altLang="ja-JP" dirty="0"/>
+              </a:p>
+              <a:p>
+                <a:pPr lvl="1"/>
+                <a:r>
+                  <a:rPr kumimoji="1" lang="ja-JP" altLang="en-US"/>
+                  <a:t>例：</a:t>
+                </a:r>
+                <a:r>
+                  <a:rPr lang="en-US" altLang="ja-JP" dirty="0"/>
+                  <a:t> </a:t>
+                </a:r>
+                <a14:m>
+                  <m:oMath xmlns:m="http://schemas.openxmlformats.org/officeDocument/2006/math">
+                    <m:r>
+                      <m:rPr>
+                        <m:sty m:val="p"/>
+                      </m:rPr>
+                      <a:rPr lang="en-US" altLang="ja-JP">
+                        <a:latin typeface="Cambria Math" panose="02040503050406030204" pitchFamily="18" charset="0"/>
+                      </a:rPr>
+                      <m:t>O</m:t>
+                    </m:r>
+                    <m:d>
+                      <m:dPr>
+                        <m:ctrlPr>
+                          <a:rPr lang="en-US" altLang="ja" i="1">
+                            <a:latin typeface="Cambria Math" panose="02040503050406030204" pitchFamily="18" charset="0"/>
+                          </a:rPr>
+                        </m:ctrlPr>
+                      </m:dPr>
+                      <m:e>
+                        <m:r>
+                          <m:rPr>
+                            <m:sty m:val="p"/>
+                          </m:rPr>
+                          <a:rPr lang="en-US" altLang="ja">
+                            <a:latin typeface="Cambria Math" panose="02040503050406030204" pitchFamily="18" charset="0"/>
+                          </a:rPr>
+                          <m:t>n</m:t>
+                        </m:r>
+                      </m:e>
+                    </m:d>
+                    <m:r>
+                      <a:rPr lang="en-US" altLang="ja" i="1">
+                        <a:latin typeface="Cambria Math" panose="02040503050406030204" pitchFamily="18" charset="0"/>
+                        <a:ea typeface="Cambria Math" panose="02040503050406030204" pitchFamily="18" charset="0"/>
+                      </a:rPr>
+                      <m:t> </m:t>
+                    </m:r>
+                  </m:oMath>
+                </a14:m>
+                <a:endParaRPr kumimoji="1" lang="en-US" altLang="ja-JP" dirty="0"/>
+              </a:p>
+              <a:p>
+                <a:r>
+                  <a:rPr lang="ja-JP" altLang="en-US"/>
+                  <a:t>群の作用</a:t>
+                </a:r>
+                <a:endParaRPr lang="en-US" altLang="ja-JP" dirty="0"/>
+              </a:p>
+              <a:p>
+                <a:pPr lvl="1"/>
+                <a:r>
+                  <a:rPr lang="ja-JP" altLang="en-US"/>
+                  <a:t>定義</a:t>
+                </a:r>
+                <a:endParaRPr lang="en-US" altLang="ja-JP" dirty="0"/>
+              </a:p>
+              <a:p>
+                <a:pPr lvl="1"/>
+                <a:r>
+                  <a:rPr lang="ja-JP" altLang="en-US"/>
+                  <a:t>例：</a:t>
+                </a:r>
+                <a:endParaRPr lang="en-US" altLang="ja-JP" dirty="0"/>
+              </a:p>
+            </p:txBody>
+          </p:sp>
+        </mc:Choice>
+        <mc:Fallback>
+          <p:sp>
+            <p:nvSpPr>
+              <p:cNvPr id="3" name="コンテンツ プレースホルダー 2">
+                <a:extLst>
+                  <a:ext uri="{FF2B5EF4-FFF2-40B4-BE49-F238E27FC236}">
+                    <a16:creationId xmlns:a16="http://schemas.microsoft.com/office/drawing/2014/main" id="{9409C43E-6ED9-F742-9D17-57ABED493EBF}"/>
+                  </a:ext>
+                </a:extLst>
+              </p:cNvPr>
+              <p:cNvSpPr>
+                <a:spLocks noGrp="1" noRot="1" noChangeAspect="1" noMove="1" noResize="1" noEditPoints="1" noAdjustHandles="1" noChangeArrowheads="1" noChangeShapeType="1" noTextEdit="1"/>
+              </p:cNvSpPr>
+              <p:nvPr>
+                <p:ph idx="1"/>
+              </p:nvPr>
+            </p:nvSpPr>
+            <p:spPr>
+              <a:blipFill>
+                <a:blip r:embed="rId2"/>
+                <a:stretch>
+                  <a:fillRect l="-965" t="-2632"/>
+                </a:stretch>
+              </a:blipFill>
+            </p:spPr>
+            <p:txBody>
+              <a:bodyPr/>
+              <a:lstStyle/>
+              <a:p>
+                <a:r>
+                  <a:rPr lang="ja-JP" altLang="en-US">
+                    <a:noFill/>
+                  </a:rPr>
+                  <a:t> </a:t>
+                </a:r>
+              </a:p>
+            </p:txBody>
+          </p:sp>
+        </mc:Fallback>
+      </mc:AlternateContent>
     </p:spTree>
     <p:extLst>
       <p:ext uri="{BB962C8B-B14F-4D97-AF65-F5344CB8AC3E}">
-        <p14:creationId xmlns:p14="http://schemas.microsoft.com/office/powerpoint/2010/main" val="3985254540"/>
+        <p14:creationId xmlns:p14="http://schemas.microsoft.com/office/powerpoint/2010/main" val="898711353"/>
       </p:ext>
     </p:extLst>
   </p:cSld>
@@ -11877,7 +11869,7 @@
           <p:cNvPr id="2" name="タイトル 1">
             <a:extLst>
               <a:ext uri="{FF2B5EF4-FFF2-40B4-BE49-F238E27FC236}">
-                <a16:creationId xmlns:a16="http://schemas.microsoft.com/office/drawing/2014/main" id="{3FADE1B3-2A00-6944-8C45-6FCF6E2330EC}"/>
+                <a16:creationId xmlns:a16="http://schemas.microsoft.com/office/drawing/2014/main" id="{0AA80DD3-7B55-5E4C-BC50-93BA664AAE9D}"/>
               </a:ext>
             </a:extLst>
           </p:cNvPr>
@@ -11895,147 +11887,824 @@
           <a:p>
             <a:r>
               <a:rPr kumimoji="1" lang="ja-JP" altLang="en-US"/>
-              <a:t>群の作用</a:t>
+              <a:t>群の定義</a:t>
             </a:r>
           </a:p>
         </p:txBody>
       </p:sp>
-      <p:sp>
-        <p:nvSpPr>
-          <p:cNvPr id="3" name="コンテンツ プレースホルダー 2">
-            <a:extLst>
-              <a:ext uri="{FF2B5EF4-FFF2-40B4-BE49-F238E27FC236}">
-                <a16:creationId xmlns:a16="http://schemas.microsoft.com/office/drawing/2014/main" id="{E071A807-CA15-154A-B850-00A7C062A62E}"/>
-              </a:ext>
-            </a:extLst>
-          </p:cNvPr>
-          <p:cNvSpPr>
-            <a:spLocks noGrp="1"/>
-          </p:cNvSpPr>
-          <p:nvPr>
-            <p:ph idx="1"/>
-          </p:nvPr>
-        </p:nvSpPr>
-        <p:spPr/>
-        <p:txBody>
-          <a:bodyPr/>
-          <a:lstStyle/>
-          <a:p>
-            <a:r>
-              <a:rPr kumimoji="1" lang="ja-JP" altLang="en-US"/>
-              <a:t>群</a:t>
-            </a:r>
-            <a:r>
-              <a:rPr kumimoji="1" lang="en-US" altLang="ja-JP" dirty="0"/>
-              <a:t>G</a:t>
-            </a:r>
-            <a:r>
-              <a:rPr kumimoji="1" lang="ja-JP" altLang="en-US"/>
-              <a:t>の元が集合</a:t>
-            </a:r>
-            <a:r>
-              <a:rPr kumimoji="1" lang="en-US" altLang="ja-JP" dirty="0"/>
-              <a:t>A</a:t>
-            </a:r>
-            <a:r>
-              <a:rPr kumimoji="1" lang="ja-JP" altLang="en-US"/>
-              <a:t>から集合</a:t>
-            </a:r>
-            <a:r>
-              <a:rPr kumimoji="1" lang="en-US" altLang="ja-JP" dirty="0"/>
-              <a:t>A</a:t>
-            </a:r>
-            <a:r>
-              <a:rPr lang="ja-JP" altLang="en-US"/>
-              <a:t>へと</a:t>
-            </a:r>
-            <a:r>
-              <a:rPr kumimoji="1" lang="ja-JP" altLang="en-US"/>
-              <a:t>写す写像となる時</a:t>
-            </a:r>
-            <a:br>
-              <a:rPr kumimoji="1" lang="en-US" altLang="ja-JP" dirty="0"/>
-            </a:br>
-            <a:r>
-              <a:rPr kumimoji="1" lang="ja-JP" altLang="en-US"/>
-              <a:t>「群</a:t>
-            </a:r>
-            <a:r>
-              <a:rPr kumimoji="1" lang="en-US" altLang="ja-JP" dirty="0"/>
-              <a:t>G</a:t>
-            </a:r>
-            <a:r>
-              <a:rPr kumimoji="1" lang="ja-JP" altLang="en-US"/>
-              <a:t>の集合</a:t>
-            </a:r>
-            <a:r>
-              <a:rPr kumimoji="1" lang="en-US" altLang="ja-JP" dirty="0"/>
-              <a:t>A</a:t>
-            </a:r>
-            <a:r>
-              <a:rPr kumimoji="1" lang="ja-JP" altLang="en-US"/>
-              <a:t>への作用」という．</a:t>
-            </a:r>
-            <a:br>
-              <a:rPr kumimoji="1" lang="en-US" altLang="ja-JP" dirty="0"/>
-            </a:br>
-            <a:endParaRPr kumimoji="1" lang="en-US" altLang="ja-JP" dirty="0"/>
-          </a:p>
-          <a:p>
-            <a:r>
-              <a:rPr lang="ja-JP" altLang="en-US"/>
-              <a:t>集合に対して群の性質を適用させている</a:t>
-            </a:r>
-            <a:endParaRPr lang="en-US" altLang="ja-JP" dirty="0"/>
-          </a:p>
-          <a:p>
-            <a:endParaRPr lang="en-US" altLang="ja-JP" dirty="0"/>
-          </a:p>
-          <a:p>
-            <a:r>
-              <a:rPr lang="ja-JP" altLang="en-US"/>
-              <a:t>（例）二次元ユークリッド平面</a:t>
-            </a:r>
-            <a:endParaRPr lang="en-US" altLang="ja-JP" dirty="0"/>
-          </a:p>
-          <a:p>
-            <a:pPr lvl="1"/>
-            <a:r>
-              <a:rPr lang="ja-JP" altLang="en-US"/>
-              <a:t>平行移動，回転，拡大，反転</a:t>
-            </a:r>
-            <a:endParaRPr lang="en-US" altLang="ja-JP" dirty="0"/>
-          </a:p>
-          <a:p>
-            <a:pPr lvl="1"/>
-            <a:r>
-              <a:rPr lang="ja-JP" altLang="en-US"/>
-              <a:t>上記</a:t>
-            </a:r>
-            <a:r>
-              <a:rPr lang="en-US" altLang="ja-JP" dirty="0"/>
-              <a:t>4</a:t>
-            </a:r>
-            <a:r>
-              <a:rPr lang="ja-JP" altLang="en-US"/>
-              <a:t>つの変換（写像）は平面から平面に，性質を保ちながら写している．</a:t>
-            </a:r>
-            <a:endParaRPr lang="en-US" altLang="ja-JP" dirty="0"/>
-          </a:p>
-          <a:p>
-            <a:pPr lvl="1"/>
-            <a:r>
-              <a:rPr lang="ja-JP" altLang="en-US"/>
-              <a:t>正方形は回転させても正方形だよね</a:t>
-            </a:r>
-            <a:endParaRPr lang="en-US" altLang="ja-JP" dirty="0"/>
-          </a:p>
-        </p:txBody>
-      </p:sp>
+      <mc:AlternateContent xmlns:mc="http://schemas.openxmlformats.org/markup-compatibility/2006">
+        <mc:Choice xmlns:a14="http://schemas.microsoft.com/office/drawing/2010/main" Requires="a14">
+          <p:sp>
+            <p:nvSpPr>
+              <p:cNvPr id="3" name="コンテンツ プレースホルダー 2">
+                <a:extLst>
+                  <a:ext uri="{FF2B5EF4-FFF2-40B4-BE49-F238E27FC236}">
+                    <a16:creationId xmlns:a16="http://schemas.microsoft.com/office/drawing/2014/main" id="{3DC394E8-B340-1042-958B-08B9A42809D5}"/>
+                  </a:ext>
+                </a:extLst>
+              </p:cNvPr>
+              <p:cNvSpPr>
+                <a:spLocks noGrp="1"/>
+              </p:cNvSpPr>
+              <p:nvPr>
+                <p:ph idx="1"/>
+              </p:nvPr>
+            </p:nvSpPr>
+            <p:spPr>
+              <a:xfrm>
+                <a:off x="838200" y="1342663"/>
+                <a:ext cx="10515600" cy="5031069"/>
+              </a:xfrm>
+            </p:spPr>
+            <p:txBody>
+              <a:bodyPr>
+                <a:normAutofit/>
+              </a:bodyPr>
+              <a:lstStyle/>
+              <a:p>
+                <a:pPr lvl="0">
+                  <a:buAutoNum type="arabicPeriod"/>
+                </a:pPr>
+                <a:r>
+                  <a:rPr lang="ja-JP" altLang="en-US"/>
+                  <a:t>閉包</a:t>
+                </a:r>
+                <a:r>
+                  <a:rPr lang="en-US" altLang="ja-JP" dirty="0"/>
+                  <a:t> </a:t>
+                </a:r>
+                <a:r>
+                  <a:rPr lang="en-US" altLang="ja-JP" sz="2000" i="1" dirty="0">
+                    <a:solidFill>
+                      <a:schemeClr val="tx1">
+                        <a:lumMod val="50000"/>
+                        <a:lumOff val="50000"/>
+                      </a:schemeClr>
+                    </a:solidFill>
+                    <a:latin typeface="Times New Roman" panose="02020603050405020304" pitchFamily="18" charset="0"/>
+                    <a:cs typeface="Times New Roman" panose="02020603050405020304" pitchFamily="18" charset="0"/>
+                  </a:rPr>
+                  <a:t>closure</a:t>
+                </a:r>
+                <a:br>
+                  <a:rPr lang="ja-JP" altLang="en-US"/>
+                </a:br>
+                <a:r>
+                  <a:rPr lang="ja-JP" altLang="en-US"/>
+                  <a:t>　</a:t>
+                </a:r>
+                <a14:m>
+                  <m:oMath xmlns:m="http://schemas.openxmlformats.org/officeDocument/2006/math">
+                    <m:r>
+                      <a:rPr lang="ja-JP" altLang="en-US" i="1">
+                        <a:latin typeface="Cambria Math" panose="02040503050406030204" pitchFamily="18" charset="0"/>
+                      </a:rPr>
+                      <m:t>∀</m:t>
+                    </m:r>
+                    <m:r>
+                      <a:rPr lang="en-US" altLang="ja-JP" i="1">
+                        <a:latin typeface="Cambria Math" panose="02040503050406030204" pitchFamily="18" charset="0"/>
+                      </a:rPr>
+                      <m:t>𝑎</m:t>
+                    </m:r>
+                    <m:r>
+                      <a:rPr lang="en-US" altLang="ja-JP" i="1">
+                        <a:latin typeface="Cambria Math" panose="02040503050406030204" pitchFamily="18" charset="0"/>
+                      </a:rPr>
+                      <m:t>,</m:t>
+                    </m:r>
+                    <m:r>
+                      <a:rPr lang="en-US" altLang="ja-JP" i="1">
+                        <a:latin typeface="Cambria Math" panose="02040503050406030204" pitchFamily="18" charset="0"/>
+                      </a:rPr>
+                      <m:t>𝑏</m:t>
+                    </m:r>
+                    <m:r>
+                      <a:rPr lang="en-US" altLang="ja-JP" i="1">
+                        <a:latin typeface="Cambria Math" panose="02040503050406030204" pitchFamily="18" charset="0"/>
+                        <a:ea typeface="Cambria Math" panose="02040503050406030204" pitchFamily="18" charset="0"/>
+                      </a:rPr>
+                      <m:t>∈</m:t>
+                    </m:r>
+                    <m:r>
+                      <a:rPr lang="en-US" altLang="ja-JP" i="1">
+                        <a:latin typeface="Cambria Math" panose="02040503050406030204" pitchFamily="18" charset="0"/>
+                        <a:ea typeface="Cambria Math" panose="02040503050406030204" pitchFamily="18" charset="0"/>
+                      </a:rPr>
+                      <m:t>𝐺</m:t>
+                    </m:r>
+                    <m:r>
+                      <a:rPr lang="en-US" altLang="ja-JP" i="1">
+                        <a:latin typeface="Cambria Math" panose="02040503050406030204" pitchFamily="18" charset="0"/>
+                        <a:ea typeface="Cambria Math" panose="02040503050406030204" pitchFamily="18" charset="0"/>
+                      </a:rPr>
+                      <m:t>, </m:t>
+                    </m:r>
+                    <m:r>
+                      <a:rPr lang="en-US" altLang="ja-JP" i="1">
+                        <a:latin typeface="Cambria Math" panose="02040503050406030204" pitchFamily="18" charset="0"/>
+                        <a:ea typeface="Cambria Math" panose="02040503050406030204" pitchFamily="18" charset="0"/>
+                      </a:rPr>
+                      <m:t>𝑎𝑏</m:t>
+                    </m:r>
+                    <m:r>
+                      <a:rPr lang="en-US" altLang="ja-JP" i="1">
+                        <a:latin typeface="Cambria Math" panose="02040503050406030204" pitchFamily="18" charset="0"/>
+                        <a:ea typeface="Cambria Math" panose="02040503050406030204" pitchFamily="18" charset="0"/>
+                      </a:rPr>
+                      <m:t>∈</m:t>
+                    </m:r>
+                    <m:r>
+                      <a:rPr lang="en-US" altLang="ja-JP" i="1">
+                        <a:latin typeface="Cambria Math" panose="02040503050406030204" pitchFamily="18" charset="0"/>
+                        <a:ea typeface="Cambria Math" panose="02040503050406030204" pitchFamily="18" charset="0"/>
+                      </a:rPr>
+                      <m:t>𝐺</m:t>
+                    </m:r>
+                  </m:oMath>
+                </a14:m>
+                <a:br>
+                  <a:rPr lang="en-US" altLang="ja-JP" dirty="0"/>
+                </a:br>
+                <a:endParaRPr lang="ja-JP" altLang="en-US" dirty="0"/>
+              </a:p>
+              <a:p>
+                <a:pPr>
+                  <a:buFont typeface="Arial"/>
+                  <a:buAutoNum type="arabicPeriod"/>
+                </a:pPr>
+                <a:r>
+                  <a:rPr lang="ja-JP" altLang="en-US"/>
+                  <a:t>結合法則</a:t>
+                </a:r>
+                <a:r>
+                  <a:rPr lang="en-US" altLang="ja-JP" dirty="0"/>
+                  <a:t> </a:t>
+                </a:r>
+                <a:r>
+                  <a:rPr lang="en-US" altLang="ja-JP" sz="2000" i="1" dirty="0">
+                    <a:solidFill>
+                      <a:schemeClr val="tx1">
+                        <a:lumMod val="50000"/>
+                        <a:lumOff val="50000"/>
+                      </a:schemeClr>
+                    </a:solidFill>
+                    <a:latin typeface="Times New Roman" panose="02020603050405020304" pitchFamily="18" charset="0"/>
+                    <a:cs typeface="Times New Roman" panose="02020603050405020304" pitchFamily="18" charset="0"/>
+                  </a:rPr>
+                  <a:t>associativity</a:t>
+                </a:r>
+                <a:br>
+                  <a:rPr lang="ja-JP" altLang="en-US" dirty="0"/>
+                </a:br>
+                <a:r>
+                  <a:rPr lang="ja-JP" altLang="en-US" dirty="0"/>
+                  <a:t>　</a:t>
+                </a:r>
+                <a14:m>
+                  <m:oMath xmlns:m="http://schemas.openxmlformats.org/officeDocument/2006/math">
+                    <m:r>
+                      <a:rPr lang="ja-JP" altLang="en-US" i="1">
+                        <a:latin typeface="Cambria Math" panose="02040503050406030204" pitchFamily="18" charset="0"/>
+                      </a:rPr>
+                      <m:t>∀</m:t>
+                    </m:r>
+                    <m:r>
+                      <a:rPr lang="en-US" altLang="ja-JP" i="1">
+                        <a:latin typeface="Cambria Math" panose="02040503050406030204" pitchFamily="18" charset="0"/>
+                      </a:rPr>
+                      <m:t>𝑎</m:t>
+                    </m:r>
+                    <m:r>
+                      <a:rPr lang="en-US" altLang="ja-JP" i="1">
+                        <a:latin typeface="Cambria Math" panose="02040503050406030204" pitchFamily="18" charset="0"/>
+                      </a:rPr>
+                      <m:t>,∀</m:t>
+                    </m:r>
+                    <m:r>
+                      <a:rPr lang="en-US" altLang="ja-JP" i="1">
+                        <a:latin typeface="Cambria Math" panose="02040503050406030204" pitchFamily="18" charset="0"/>
+                      </a:rPr>
+                      <m:t>𝑏</m:t>
+                    </m:r>
+                    <m:r>
+                      <a:rPr lang="en-US" altLang="ja-JP" i="1">
+                        <a:latin typeface="Cambria Math" panose="02040503050406030204" pitchFamily="18" charset="0"/>
+                      </a:rPr>
+                      <m:t>,</m:t>
+                    </m:r>
+                    <m:r>
+                      <a:rPr lang="ja-JP" altLang="en-US" i="1">
+                        <a:latin typeface="Cambria Math" panose="02040503050406030204" pitchFamily="18" charset="0"/>
+                      </a:rPr>
+                      <m:t>∀</m:t>
+                    </m:r>
+                    <m:r>
+                      <a:rPr lang="en-US" altLang="ja-JP" i="1">
+                        <a:latin typeface="Cambria Math" panose="02040503050406030204" pitchFamily="18" charset="0"/>
+                      </a:rPr>
+                      <m:t>𝑐</m:t>
+                    </m:r>
+                    <m:r>
+                      <a:rPr lang="en-US" altLang="ja-JP" i="1">
+                        <a:latin typeface="Cambria Math" panose="02040503050406030204" pitchFamily="18" charset="0"/>
+                        <a:ea typeface="Cambria Math" panose="02040503050406030204" pitchFamily="18" charset="0"/>
+                      </a:rPr>
+                      <m:t>∈</m:t>
+                    </m:r>
+                    <m:r>
+                      <a:rPr lang="en-US" altLang="ja-JP" i="1">
+                        <a:latin typeface="Cambria Math" panose="02040503050406030204" pitchFamily="18" charset="0"/>
+                        <a:ea typeface="Cambria Math" panose="02040503050406030204" pitchFamily="18" charset="0"/>
+                      </a:rPr>
+                      <m:t>𝐺</m:t>
+                    </m:r>
+                    <m:r>
+                      <a:rPr lang="en-US" altLang="ja-JP" i="1">
+                        <a:latin typeface="Cambria Math" panose="02040503050406030204" pitchFamily="18" charset="0"/>
+                        <a:ea typeface="Cambria Math" panose="02040503050406030204" pitchFamily="18" charset="0"/>
+                      </a:rPr>
+                      <m:t>, </m:t>
+                    </m:r>
+                    <m:r>
+                      <a:rPr lang="en-US" altLang="ja-JP" i="1">
+                        <a:latin typeface="Cambria Math" panose="02040503050406030204" pitchFamily="18" charset="0"/>
+                        <a:ea typeface="Cambria Math" panose="02040503050406030204" pitchFamily="18" charset="0"/>
+                      </a:rPr>
+                      <m:t>𝑎</m:t>
+                    </m:r>
+                    <m:r>
+                      <a:rPr lang="en-US" altLang="ja-JP" i="1">
+                        <a:latin typeface="Cambria Math" panose="02040503050406030204" pitchFamily="18" charset="0"/>
+                        <a:ea typeface="Cambria Math" panose="02040503050406030204" pitchFamily="18" charset="0"/>
+                      </a:rPr>
+                      <m:t>∙</m:t>
+                    </m:r>
+                    <m:d>
+                      <m:dPr>
+                        <m:ctrlPr>
+                          <a:rPr lang="en-US" altLang="ja-JP" i="1">
+                            <a:latin typeface="Cambria Math" panose="02040503050406030204" pitchFamily="18" charset="0"/>
+                            <a:ea typeface="Cambria Math" panose="02040503050406030204" pitchFamily="18" charset="0"/>
+                          </a:rPr>
+                        </m:ctrlPr>
+                      </m:dPr>
+                      <m:e>
+                        <m:r>
+                          <a:rPr lang="en-US" altLang="ja-JP" i="1">
+                            <a:latin typeface="Cambria Math" panose="02040503050406030204" pitchFamily="18" charset="0"/>
+                            <a:ea typeface="Cambria Math" panose="02040503050406030204" pitchFamily="18" charset="0"/>
+                          </a:rPr>
+                          <m:t>𝑏</m:t>
+                        </m:r>
+                        <m:r>
+                          <a:rPr lang="en-US" altLang="ja-JP" i="1">
+                            <a:latin typeface="Cambria Math" panose="02040503050406030204" pitchFamily="18" charset="0"/>
+                            <a:ea typeface="Cambria Math" panose="02040503050406030204" pitchFamily="18" charset="0"/>
+                          </a:rPr>
+                          <m:t>∙</m:t>
+                        </m:r>
+                        <m:r>
+                          <a:rPr lang="en-US" altLang="ja-JP" i="1">
+                            <a:latin typeface="Cambria Math" panose="02040503050406030204" pitchFamily="18" charset="0"/>
+                            <a:ea typeface="Cambria Math" panose="02040503050406030204" pitchFamily="18" charset="0"/>
+                          </a:rPr>
+                          <m:t>𝑐</m:t>
+                        </m:r>
+                      </m:e>
+                    </m:d>
+                    <m:r>
+                      <a:rPr lang="en-US" altLang="ja-JP" i="1">
+                        <a:latin typeface="Cambria Math" panose="02040503050406030204" pitchFamily="18" charset="0"/>
+                        <a:ea typeface="Cambria Math" panose="02040503050406030204" pitchFamily="18" charset="0"/>
+                      </a:rPr>
+                      <m:t>=</m:t>
+                    </m:r>
+                    <m:d>
+                      <m:dPr>
+                        <m:ctrlPr>
+                          <a:rPr lang="en-US" altLang="ja-JP" i="1">
+                            <a:latin typeface="Cambria Math" panose="02040503050406030204" pitchFamily="18" charset="0"/>
+                            <a:ea typeface="Cambria Math" panose="02040503050406030204" pitchFamily="18" charset="0"/>
+                          </a:rPr>
+                        </m:ctrlPr>
+                      </m:dPr>
+                      <m:e>
+                        <m:r>
+                          <a:rPr lang="en-US" altLang="ja-JP" i="1">
+                            <a:latin typeface="Cambria Math" panose="02040503050406030204" pitchFamily="18" charset="0"/>
+                            <a:ea typeface="Cambria Math" panose="02040503050406030204" pitchFamily="18" charset="0"/>
+                          </a:rPr>
+                          <m:t>𝑎</m:t>
+                        </m:r>
+                        <m:r>
+                          <a:rPr lang="en-US" altLang="ja-JP" i="1">
+                            <a:latin typeface="Cambria Math" panose="02040503050406030204" pitchFamily="18" charset="0"/>
+                            <a:ea typeface="Cambria Math" panose="02040503050406030204" pitchFamily="18" charset="0"/>
+                          </a:rPr>
+                          <m:t>∙</m:t>
+                        </m:r>
+                        <m:r>
+                          <a:rPr lang="en-US" altLang="ja-JP" i="1">
+                            <a:latin typeface="Cambria Math" panose="02040503050406030204" pitchFamily="18" charset="0"/>
+                            <a:ea typeface="Cambria Math" panose="02040503050406030204" pitchFamily="18" charset="0"/>
+                          </a:rPr>
+                          <m:t>𝑏</m:t>
+                        </m:r>
+                      </m:e>
+                    </m:d>
+                    <m:r>
+                      <a:rPr lang="en-US" altLang="ja-JP" i="1">
+                        <a:latin typeface="Cambria Math" panose="02040503050406030204" pitchFamily="18" charset="0"/>
+                        <a:ea typeface="Cambria Math" panose="02040503050406030204" pitchFamily="18" charset="0"/>
+                      </a:rPr>
+                      <m:t>∙</m:t>
+                    </m:r>
+                    <m:r>
+                      <a:rPr lang="en-US" altLang="ja-JP" i="1">
+                        <a:latin typeface="Cambria Math" panose="02040503050406030204" pitchFamily="18" charset="0"/>
+                        <a:ea typeface="Cambria Math" panose="02040503050406030204" pitchFamily="18" charset="0"/>
+                      </a:rPr>
+                      <m:t>𝑐</m:t>
+                    </m:r>
+                  </m:oMath>
+                </a14:m>
+                <a:br>
+                  <a:rPr lang="en-US" altLang="ja-JP" dirty="0">
+                    <a:ea typeface="Cambria Math" panose="02040503050406030204" pitchFamily="18" charset="0"/>
+                  </a:rPr>
+                </a:br>
+                <a:endParaRPr lang="en-US" altLang="ja-JP" dirty="0">
+                  <a:ea typeface="Cambria Math" panose="02040503050406030204" pitchFamily="18" charset="0"/>
+                </a:endParaRPr>
+              </a:p>
+              <a:p>
+                <a:pPr>
+                  <a:buFont typeface="Arial"/>
+                  <a:buAutoNum type="arabicPeriod"/>
+                </a:pPr>
+                <a:r>
+                  <a:rPr lang="ja-JP" altLang="en-US" dirty="0"/>
+                  <a:t>単位元</a:t>
+                </a:r>
+                <a:r>
+                  <a:rPr lang="ja-JP" altLang="en-US"/>
+                  <a:t>の存在</a:t>
+                </a:r>
+                <a:r>
+                  <a:rPr lang="en-US" altLang="ja-JP" dirty="0"/>
+                  <a:t> </a:t>
+                </a:r>
+                <a:r>
+                  <a:rPr lang="en-US" altLang="ja-JP" sz="2000" i="1" dirty="0">
+                    <a:solidFill>
+                      <a:schemeClr val="tx1">
+                        <a:lumMod val="50000"/>
+                        <a:lumOff val="50000"/>
+                      </a:schemeClr>
+                    </a:solidFill>
+                    <a:latin typeface="Times New Roman" panose="02020603050405020304" pitchFamily="18" charset="0"/>
+                    <a:cs typeface="Times New Roman" panose="02020603050405020304" pitchFamily="18" charset="0"/>
+                  </a:rPr>
+                  <a:t>identity element</a:t>
+                </a:r>
+                <a:br>
+                  <a:rPr lang="en-US" altLang="ja-JP" dirty="0"/>
+                </a:br>
+                <a:r>
+                  <a:rPr lang="ja-JP" altLang="en-US" dirty="0"/>
+                  <a:t>　</a:t>
+                </a:r>
+                <a14:m>
+                  <m:oMath xmlns:m="http://schemas.openxmlformats.org/officeDocument/2006/math">
+                    <m:r>
+                      <a:rPr lang="en-US" altLang="ja-JP" i="1">
+                        <a:latin typeface="Cambria Math" panose="02040503050406030204" pitchFamily="18" charset="0"/>
+                        <a:ea typeface="Cambria Math" panose="02040503050406030204" pitchFamily="18" charset="0"/>
+                      </a:rPr>
+                      <m:t>∃</m:t>
+                    </m:r>
+                    <m:r>
+                      <a:rPr lang="en-US" altLang="ja-JP" i="1">
+                        <a:latin typeface="Cambria Math" panose="02040503050406030204" pitchFamily="18" charset="0"/>
+                        <a:ea typeface="Cambria Math" panose="02040503050406030204" pitchFamily="18" charset="0"/>
+                      </a:rPr>
+                      <m:t>𝑒</m:t>
+                    </m:r>
+                    <m:r>
+                      <a:rPr lang="en-US" altLang="ja-JP" i="1">
+                        <a:latin typeface="Cambria Math" panose="02040503050406030204" pitchFamily="18" charset="0"/>
+                        <a:ea typeface="Cambria Math" panose="02040503050406030204" pitchFamily="18" charset="0"/>
+                      </a:rPr>
+                      <m:t>∈</m:t>
+                    </m:r>
+                    <m:r>
+                      <a:rPr lang="en-US" altLang="ja-JP" i="1">
+                        <a:latin typeface="Cambria Math" panose="02040503050406030204" pitchFamily="18" charset="0"/>
+                        <a:ea typeface="Cambria Math" panose="02040503050406030204" pitchFamily="18" charset="0"/>
+                      </a:rPr>
+                      <m:t>𝐺</m:t>
+                    </m:r>
+                    <m:r>
+                      <a:rPr lang="en-US" altLang="ja-JP" i="1">
+                        <a:latin typeface="Cambria Math" panose="02040503050406030204" pitchFamily="18" charset="0"/>
+                        <a:ea typeface="Cambria Math" panose="02040503050406030204" pitchFamily="18" charset="0"/>
+                      </a:rPr>
+                      <m:t>, </m:t>
+                    </m:r>
+                    <m:r>
+                      <a:rPr lang="ja-JP" altLang="en-US" i="1">
+                        <a:latin typeface="Cambria Math" panose="02040503050406030204" pitchFamily="18" charset="0"/>
+                      </a:rPr>
+                      <m:t>∀</m:t>
+                    </m:r>
+                    <m:r>
+                      <a:rPr lang="en-US" altLang="ja-JP" i="1">
+                        <a:latin typeface="Cambria Math" panose="02040503050406030204" pitchFamily="18" charset="0"/>
+                        <a:ea typeface="Cambria Math" panose="02040503050406030204" pitchFamily="18" charset="0"/>
+                      </a:rPr>
+                      <m:t>𝑎</m:t>
+                    </m:r>
+                    <m:r>
+                      <a:rPr lang="en-US" altLang="ja-JP" i="1">
+                        <a:latin typeface="Cambria Math" panose="02040503050406030204" pitchFamily="18" charset="0"/>
+                        <a:ea typeface="Cambria Math" panose="02040503050406030204" pitchFamily="18" charset="0"/>
+                      </a:rPr>
+                      <m:t>∈</m:t>
+                    </m:r>
+                    <m:r>
+                      <a:rPr lang="en-US" altLang="ja-JP" i="1">
+                        <a:latin typeface="Cambria Math" panose="02040503050406030204" pitchFamily="18" charset="0"/>
+                        <a:ea typeface="Cambria Math" panose="02040503050406030204" pitchFamily="18" charset="0"/>
+                      </a:rPr>
+                      <m:t>𝐺</m:t>
+                    </m:r>
+                    <m:r>
+                      <a:rPr lang="en-US" altLang="ja-JP" i="1">
+                        <a:latin typeface="Cambria Math" panose="02040503050406030204" pitchFamily="18" charset="0"/>
+                        <a:ea typeface="Cambria Math" panose="02040503050406030204" pitchFamily="18" charset="0"/>
+                      </a:rPr>
+                      <m:t>, </m:t>
+                    </m:r>
+                    <m:r>
+                      <a:rPr lang="en-US" altLang="ja-JP" i="1">
+                        <a:latin typeface="Cambria Math" panose="02040503050406030204" pitchFamily="18" charset="0"/>
+                        <a:ea typeface="Cambria Math" panose="02040503050406030204" pitchFamily="18" charset="0"/>
+                      </a:rPr>
+                      <m:t>𝑎</m:t>
+                    </m:r>
+                    <m:r>
+                      <a:rPr lang="en-US" altLang="ja-JP" i="1">
+                        <a:latin typeface="Cambria Math" panose="02040503050406030204" pitchFamily="18" charset="0"/>
+                        <a:ea typeface="Cambria Math" panose="02040503050406030204" pitchFamily="18" charset="0"/>
+                      </a:rPr>
+                      <m:t>∙</m:t>
+                    </m:r>
+                    <m:r>
+                      <a:rPr lang="en-US" altLang="ja-JP" i="1">
+                        <a:latin typeface="Cambria Math" panose="02040503050406030204" pitchFamily="18" charset="0"/>
+                        <a:ea typeface="Cambria Math" panose="02040503050406030204" pitchFamily="18" charset="0"/>
+                      </a:rPr>
+                      <m:t>𝑒</m:t>
+                    </m:r>
+                    <m:r>
+                      <a:rPr lang="en-US" altLang="ja-JP" i="1">
+                        <a:latin typeface="Cambria Math" panose="02040503050406030204" pitchFamily="18" charset="0"/>
+                        <a:ea typeface="Cambria Math" panose="02040503050406030204" pitchFamily="18" charset="0"/>
+                      </a:rPr>
+                      <m:t>=</m:t>
+                    </m:r>
+                    <m:r>
+                      <a:rPr lang="en-US" altLang="ja-JP" i="1">
+                        <a:latin typeface="Cambria Math" panose="02040503050406030204" pitchFamily="18" charset="0"/>
+                        <a:ea typeface="Cambria Math" panose="02040503050406030204" pitchFamily="18" charset="0"/>
+                      </a:rPr>
+                      <m:t>𝑒</m:t>
+                    </m:r>
+                    <m:r>
+                      <a:rPr lang="en-US" altLang="ja-JP" i="1">
+                        <a:latin typeface="Cambria Math" panose="02040503050406030204" pitchFamily="18" charset="0"/>
+                        <a:ea typeface="Cambria Math" panose="02040503050406030204" pitchFamily="18" charset="0"/>
+                      </a:rPr>
+                      <m:t>∙</m:t>
+                    </m:r>
+                    <m:r>
+                      <a:rPr lang="en-US" altLang="ja-JP" i="1">
+                        <a:latin typeface="Cambria Math" panose="02040503050406030204" pitchFamily="18" charset="0"/>
+                        <a:ea typeface="Cambria Math" panose="02040503050406030204" pitchFamily="18" charset="0"/>
+                      </a:rPr>
+                      <m:t>𝑎</m:t>
+                    </m:r>
+                    <m:r>
+                      <a:rPr lang="en-US" altLang="ja-JP" i="1">
+                        <a:latin typeface="Cambria Math" panose="02040503050406030204" pitchFamily="18" charset="0"/>
+                        <a:ea typeface="Cambria Math" panose="02040503050406030204" pitchFamily="18" charset="0"/>
+                      </a:rPr>
+                      <m:t>=</m:t>
+                    </m:r>
+                    <m:r>
+                      <a:rPr lang="en-US" altLang="ja-JP" i="1">
+                        <a:latin typeface="Cambria Math" panose="02040503050406030204" pitchFamily="18" charset="0"/>
+                        <a:ea typeface="Cambria Math" panose="02040503050406030204" pitchFamily="18" charset="0"/>
+                      </a:rPr>
+                      <m:t>𝑎</m:t>
+                    </m:r>
+                  </m:oMath>
+                </a14:m>
+                <a:br>
+                  <a:rPr lang="ja-JP" altLang="en-US"/>
+                </a:br>
+                <a:endParaRPr lang="fr-CA" altLang="ja-JP" dirty="0"/>
+              </a:p>
+              <a:p>
+                <a:pPr>
+                  <a:spcBef>
+                    <a:spcPts val="0"/>
+                  </a:spcBef>
+                  <a:buFont typeface="Arial"/>
+                  <a:buAutoNum type="arabicPeriod"/>
+                </a:pPr>
+                <a:r>
+                  <a:rPr lang="ja-JP" altLang="en-US" dirty="0"/>
+                  <a:t>逆元</a:t>
+                </a:r>
+                <a:r>
+                  <a:rPr lang="ja-JP" altLang="en-US"/>
+                  <a:t>の存在</a:t>
+                </a:r>
+                <a:r>
+                  <a:rPr lang="en-US" altLang="ja-JP" dirty="0"/>
+                  <a:t> </a:t>
+                </a:r>
+                <a:r>
+                  <a:rPr lang="en-US" altLang="ja-JP" sz="2000" i="1" dirty="0">
+                    <a:solidFill>
+                      <a:schemeClr val="tx1">
+                        <a:lumMod val="50000"/>
+                        <a:lumOff val="50000"/>
+                      </a:schemeClr>
+                    </a:solidFill>
+                    <a:latin typeface="Times New Roman" panose="02020603050405020304" pitchFamily="18" charset="0"/>
+                    <a:cs typeface="Times New Roman" panose="02020603050405020304" pitchFamily="18" charset="0"/>
+                  </a:rPr>
+                  <a:t>inverse element</a:t>
+                </a:r>
+                <a:br>
+                  <a:rPr lang="en-US" altLang="ja-JP" dirty="0"/>
+                </a:br>
+                <a:r>
+                  <a:rPr lang="ja-JP" altLang="en-US" dirty="0"/>
+                  <a:t>　</a:t>
+                </a:r>
+                <a14:m>
+                  <m:oMath xmlns:m="http://schemas.openxmlformats.org/officeDocument/2006/math">
+                    <m:r>
+                      <a:rPr lang="ja-JP" altLang="en-US" i="1">
+                        <a:latin typeface="Cambria Math" panose="02040503050406030204" pitchFamily="18" charset="0"/>
+                      </a:rPr>
+                      <m:t>∀</m:t>
+                    </m:r>
+                    <m:r>
+                      <a:rPr lang="en-US" altLang="ja-JP" i="1">
+                        <a:latin typeface="Cambria Math" panose="02040503050406030204" pitchFamily="18" charset="0"/>
+                      </a:rPr>
+                      <m:t>𝑎</m:t>
+                    </m:r>
+                    <m:r>
+                      <a:rPr lang="en-US" altLang="ja-JP" i="1">
+                        <a:latin typeface="Cambria Math" panose="02040503050406030204" pitchFamily="18" charset="0"/>
+                        <a:ea typeface="Cambria Math" panose="02040503050406030204" pitchFamily="18" charset="0"/>
+                      </a:rPr>
+                      <m:t>∈</m:t>
+                    </m:r>
+                    <m:r>
+                      <a:rPr lang="en-US" altLang="ja-JP" i="1">
+                        <a:latin typeface="Cambria Math" panose="02040503050406030204" pitchFamily="18" charset="0"/>
+                        <a:ea typeface="Cambria Math" panose="02040503050406030204" pitchFamily="18" charset="0"/>
+                      </a:rPr>
+                      <m:t>𝐺</m:t>
+                    </m:r>
+                    <m:r>
+                      <a:rPr lang="en-US" altLang="ja-JP" i="1">
+                        <a:latin typeface="Cambria Math" panose="02040503050406030204" pitchFamily="18" charset="0"/>
+                        <a:ea typeface="Cambria Math" panose="02040503050406030204" pitchFamily="18" charset="0"/>
+                      </a:rPr>
+                      <m:t>,∃</m:t>
+                    </m:r>
+                    <m:sSup>
+                      <m:sSupPr>
+                        <m:ctrlPr>
+                          <a:rPr lang="en-US" altLang="ja-JP" i="1">
+                            <a:latin typeface="Cambria Math" panose="02040503050406030204" pitchFamily="18" charset="0"/>
+                            <a:ea typeface="Cambria Math" panose="02040503050406030204" pitchFamily="18" charset="0"/>
+                          </a:rPr>
+                        </m:ctrlPr>
+                      </m:sSupPr>
+                      <m:e>
+                        <m:r>
+                          <a:rPr lang="en-US" altLang="ja-JP" i="1">
+                            <a:latin typeface="Cambria Math" panose="02040503050406030204" pitchFamily="18" charset="0"/>
+                            <a:ea typeface="Cambria Math" panose="02040503050406030204" pitchFamily="18" charset="0"/>
+                          </a:rPr>
+                          <m:t>𝑎</m:t>
+                        </m:r>
+                      </m:e>
+                      <m:sup>
+                        <m:r>
+                          <a:rPr lang="en-US" altLang="ja-JP" i="1">
+                            <a:latin typeface="Cambria Math" panose="02040503050406030204" pitchFamily="18" charset="0"/>
+                            <a:ea typeface="Cambria Math" panose="02040503050406030204" pitchFamily="18" charset="0"/>
+                          </a:rPr>
+                          <m:t>−1</m:t>
+                        </m:r>
+                      </m:sup>
+                    </m:sSup>
+                    <m:r>
+                      <a:rPr lang="en-US" altLang="ja-JP" i="1">
+                        <a:latin typeface="Cambria Math" panose="02040503050406030204" pitchFamily="18" charset="0"/>
+                        <a:ea typeface="Cambria Math" panose="02040503050406030204" pitchFamily="18" charset="0"/>
+                      </a:rPr>
+                      <m:t>∈</m:t>
+                    </m:r>
+                    <m:r>
+                      <a:rPr lang="en-US" altLang="ja-JP" i="1">
+                        <a:latin typeface="Cambria Math" panose="02040503050406030204" pitchFamily="18" charset="0"/>
+                        <a:ea typeface="Cambria Math" panose="02040503050406030204" pitchFamily="18" charset="0"/>
+                      </a:rPr>
+                      <m:t>𝐺</m:t>
+                    </m:r>
+                    <m:r>
+                      <a:rPr lang="en-US" altLang="ja-JP" i="1">
+                        <a:latin typeface="Cambria Math" panose="02040503050406030204" pitchFamily="18" charset="0"/>
+                        <a:ea typeface="Cambria Math" panose="02040503050406030204" pitchFamily="18" charset="0"/>
+                      </a:rPr>
+                      <m:t>,</m:t>
+                    </m:r>
+                    <m:r>
+                      <a:rPr lang="en-US" altLang="ja-JP" i="1">
+                        <a:latin typeface="Cambria Math" panose="02040503050406030204" pitchFamily="18" charset="0"/>
+                        <a:ea typeface="Cambria Math" panose="02040503050406030204" pitchFamily="18" charset="0"/>
+                      </a:rPr>
+                      <m:t>𝑎</m:t>
+                    </m:r>
+                    <m:r>
+                      <a:rPr lang="en-US" altLang="ja-JP" i="1">
+                        <a:latin typeface="Cambria Math" panose="02040503050406030204" pitchFamily="18" charset="0"/>
+                        <a:ea typeface="Cambria Math" panose="02040503050406030204" pitchFamily="18" charset="0"/>
+                      </a:rPr>
+                      <m:t>∙</m:t>
+                    </m:r>
+                    <m:sSup>
+                      <m:sSupPr>
+                        <m:ctrlPr>
+                          <a:rPr lang="en-US" altLang="ja-JP" i="1">
+                            <a:latin typeface="Cambria Math" panose="02040503050406030204" pitchFamily="18" charset="0"/>
+                            <a:ea typeface="Cambria Math" panose="02040503050406030204" pitchFamily="18" charset="0"/>
+                          </a:rPr>
+                        </m:ctrlPr>
+                      </m:sSupPr>
+                      <m:e>
+                        <m:r>
+                          <a:rPr lang="en-US" altLang="ja-JP" i="1">
+                            <a:latin typeface="Cambria Math" panose="02040503050406030204" pitchFamily="18" charset="0"/>
+                            <a:ea typeface="Cambria Math" panose="02040503050406030204" pitchFamily="18" charset="0"/>
+                          </a:rPr>
+                          <m:t>𝑎</m:t>
+                        </m:r>
+                      </m:e>
+                      <m:sup>
+                        <m:r>
+                          <a:rPr lang="en-US" altLang="ja-JP" i="1">
+                            <a:latin typeface="Cambria Math" panose="02040503050406030204" pitchFamily="18" charset="0"/>
+                            <a:ea typeface="Cambria Math" panose="02040503050406030204" pitchFamily="18" charset="0"/>
+                          </a:rPr>
+                          <m:t>−1</m:t>
+                        </m:r>
+                      </m:sup>
+                    </m:sSup>
+                    <m:r>
+                      <a:rPr lang="en-US" altLang="ja-JP" i="1">
+                        <a:latin typeface="Cambria Math" panose="02040503050406030204" pitchFamily="18" charset="0"/>
+                        <a:ea typeface="Cambria Math" panose="02040503050406030204" pitchFamily="18" charset="0"/>
+                      </a:rPr>
+                      <m:t>=</m:t>
+                    </m:r>
+                    <m:sSup>
+                      <m:sSupPr>
+                        <m:ctrlPr>
+                          <a:rPr lang="en-US" altLang="ja-JP" i="1">
+                            <a:latin typeface="Cambria Math" panose="02040503050406030204" pitchFamily="18" charset="0"/>
+                            <a:ea typeface="Cambria Math" panose="02040503050406030204" pitchFamily="18" charset="0"/>
+                          </a:rPr>
+                        </m:ctrlPr>
+                      </m:sSupPr>
+                      <m:e>
+                        <m:r>
+                          <a:rPr lang="en-US" altLang="ja-JP" i="1">
+                            <a:latin typeface="Cambria Math" panose="02040503050406030204" pitchFamily="18" charset="0"/>
+                            <a:ea typeface="Cambria Math" panose="02040503050406030204" pitchFamily="18" charset="0"/>
+                          </a:rPr>
+                          <m:t>𝑎</m:t>
+                        </m:r>
+                      </m:e>
+                      <m:sup>
+                        <m:r>
+                          <a:rPr lang="en-US" altLang="ja-JP" i="1">
+                            <a:latin typeface="Cambria Math" panose="02040503050406030204" pitchFamily="18" charset="0"/>
+                            <a:ea typeface="Cambria Math" panose="02040503050406030204" pitchFamily="18" charset="0"/>
+                          </a:rPr>
+                          <m:t>−1</m:t>
+                        </m:r>
+                      </m:sup>
+                    </m:sSup>
+                    <m:r>
+                      <a:rPr lang="en-US" altLang="ja-JP" i="1">
+                        <a:latin typeface="Cambria Math" panose="02040503050406030204" pitchFamily="18" charset="0"/>
+                        <a:ea typeface="Cambria Math" panose="02040503050406030204" pitchFamily="18" charset="0"/>
+                      </a:rPr>
+                      <m:t>∙</m:t>
+                    </m:r>
+                    <m:r>
+                      <a:rPr lang="en-US" altLang="ja-JP" i="1">
+                        <a:latin typeface="Cambria Math" panose="02040503050406030204" pitchFamily="18" charset="0"/>
+                        <a:ea typeface="Cambria Math" panose="02040503050406030204" pitchFamily="18" charset="0"/>
+                      </a:rPr>
+                      <m:t>𝑎</m:t>
+                    </m:r>
+                    <m:r>
+                      <a:rPr lang="en-US" altLang="ja-JP" i="1">
+                        <a:latin typeface="Cambria Math" panose="02040503050406030204" pitchFamily="18" charset="0"/>
+                        <a:ea typeface="Cambria Math" panose="02040503050406030204" pitchFamily="18" charset="0"/>
+                      </a:rPr>
+                      <m:t>=</m:t>
+                    </m:r>
+                    <m:r>
+                      <a:rPr lang="en-US" altLang="ja-JP" i="1">
+                        <a:latin typeface="Cambria Math" panose="02040503050406030204" pitchFamily="18" charset="0"/>
+                        <a:ea typeface="Cambria Math" panose="02040503050406030204" pitchFamily="18" charset="0"/>
+                      </a:rPr>
+                      <m:t>𝑒</m:t>
+                    </m:r>
+                  </m:oMath>
+                </a14:m>
+                <a:br>
+                  <a:rPr lang="en-US" altLang="ja-JP" dirty="0">
+                    <a:ea typeface="Cambria Math" panose="02040503050406030204" pitchFamily="18" charset="0"/>
+                  </a:rPr>
+                </a:br>
+                <a:endParaRPr lang="ja-JP" altLang="en-US"/>
+              </a:p>
+            </p:txBody>
+          </p:sp>
+        </mc:Choice>
+        <mc:Fallback>
+          <p:sp>
+            <p:nvSpPr>
+              <p:cNvPr id="3" name="コンテンツ プレースホルダー 2">
+                <a:extLst>
+                  <a:ext uri="{FF2B5EF4-FFF2-40B4-BE49-F238E27FC236}">
+                    <a16:creationId xmlns:a16="http://schemas.microsoft.com/office/drawing/2014/main" id="{3DC394E8-B340-1042-958B-08B9A42809D5}"/>
+                  </a:ext>
+                </a:extLst>
+              </p:cNvPr>
+              <p:cNvSpPr>
+                <a:spLocks noGrp="1" noRot="1" noChangeAspect="1" noMove="1" noResize="1" noEditPoints="1" noAdjustHandles="1" noChangeArrowheads="1" noChangeShapeType="1" noTextEdit="1"/>
+              </p:cNvSpPr>
+              <p:nvPr>
+                <p:ph idx="1"/>
+              </p:nvPr>
+            </p:nvSpPr>
+            <p:spPr>
+              <a:xfrm>
+                <a:off x="838200" y="1342663"/>
+                <a:ext cx="10515600" cy="5031069"/>
+              </a:xfrm>
+              <a:blipFill>
+                <a:blip r:embed="rId2"/>
+                <a:stretch>
+                  <a:fillRect l="-1206" t="-2519"/>
+                </a:stretch>
+              </a:blipFill>
+            </p:spPr>
+            <p:txBody>
+              <a:bodyPr/>
+              <a:lstStyle/>
+              <a:p>
+                <a:r>
+                  <a:rPr lang="ja-JP" altLang="en-US">
+                    <a:noFill/>
+                  </a:rPr>
+                  <a:t> </a:t>
+                </a:r>
+              </a:p>
+            </p:txBody>
+          </p:sp>
+        </mc:Fallback>
+      </mc:AlternateContent>
     </p:spTree>
     <p:extLst>
       <p:ext uri="{BB962C8B-B14F-4D97-AF65-F5344CB8AC3E}">
-        <p14:creationId xmlns:p14="http://schemas.microsoft.com/office/powerpoint/2010/main" val="1124779067"/>
+        <p14:creationId xmlns:p14="http://schemas.microsoft.com/office/powerpoint/2010/main" val="358005465"/>
       </p:ext>
     </p:extLst>
   </p:cSld>

</xml_diff>